<commit_message>
Gonna delete some shit
</commit_message>
<xml_diff>
--- a/Documentation/Cornett_Leach_Presentation.pptx
+++ b/Documentation/Cornett_Leach_Presentation.pptx
@@ -7022,7 +7022,7 @@
         <p:spPr/>
         <p:txBody>
           <a:bodyPr>
-            <a:normAutofit fontScale="40000" lnSpcReduction="20000"/>
+            <a:normAutofit fontScale="32500" lnSpcReduction="20000"/>
           </a:bodyPr>
           <a:lstStyle/>
           <a:p>
@@ -7100,13 +7100,18 @@
             </a:pPr>
             <a:r>
               <a:rPr lang="en-US" dirty="0"/>
-              <a:t>Dataset overview (include RGB of each) - # images, features, sets (talk about features per point </a:t>
-            </a:r>
-            <a:r>
-              <a:rPr lang="en-US"/>
-              <a:t>per image)</a:t>
-            </a:r>
-            <a:endParaRPr lang="en-US" dirty="0"/>
+              <a:t>Dataset overview (include RGB of each) - # images, features, sets (talk about features per point per image)</a:t>
+            </a:r>
+          </a:p>
+          <a:p>
+            <a:pPr marL="514350" indent="-514350">
+              <a:buFont typeface="+mj-lt"/>
+              <a:buAutoNum type="arabicPeriod"/>
+            </a:pPr>
+            <a:r>
+              <a:rPr lang="en-US" dirty="0"/>
+              <a:t>Feature space 1 (multispectral responses) – Feature Space 2 (multispectral responses + spatial coordinates)</a:t>
+            </a:r>
           </a:p>
           <a:p>
             <a:pPr marL="514350" indent="-514350">
@@ -7348,6 +7353,182 @@
           </a:prstGeom>
         </p:spPr>
       </p:pic>
+      <p:sp>
+        <p:nvSpPr>
+          <p:cNvPr id="6" name="Content Placeholder 2">
+            <a:extLst>
+              <a:ext uri="{FF2B5EF4-FFF2-40B4-BE49-F238E27FC236}">
+                <a16:creationId xmlns:a16="http://schemas.microsoft.com/office/drawing/2014/main" id="{62282964-932C-4502-992C-6DE688BD32E3}"/>
+              </a:ext>
+            </a:extLst>
+          </p:cNvPr>
+          <p:cNvSpPr txBox="1">
+            <a:spLocks/>
+          </p:cNvSpPr>
+          <p:nvPr/>
+        </p:nvSpPr>
+        <p:spPr>
+          <a:xfrm>
+            <a:off x="457200" y="1200151"/>
+            <a:ext cx="8229600" cy="3394472"/>
+          </a:xfrm>
+          <a:prstGeom prst="rect">
+            <a:avLst/>
+          </a:prstGeom>
+        </p:spPr>
+        <p:txBody>
+          <a:bodyPr vert="horz" lIns="91440" tIns="45720" rIns="91440" bIns="45720" rtlCol="0">
+            <a:normAutofit/>
+          </a:bodyPr>
+          <a:lstStyle>
+            <a:lvl1pPr marL="342900" indent="-342900" algn="l" defTabSz="457200" rtl="0" eaLnBrk="1" latinLnBrk="0" hangingPunct="1">
+              <a:spcBef>
+                <a:spcPct val="20000"/>
+              </a:spcBef>
+              <a:buFont typeface="Arial"/>
+              <a:buChar char="•"/>
+              <a:defRPr sz="3200" kern="1200">
+                <a:solidFill>
+                  <a:srgbClr val="3B3C3E"/>
+                </a:solidFill>
+                <a:latin typeface="Arial"/>
+                <a:ea typeface="+mn-ea"/>
+                <a:cs typeface="Arial"/>
+              </a:defRPr>
+            </a:lvl1pPr>
+            <a:lvl2pPr marL="742950" indent="-285750" algn="l" defTabSz="457200" rtl="0" eaLnBrk="1" latinLnBrk="0" hangingPunct="1">
+              <a:spcBef>
+                <a:spcPct val="20000"/>
+              </a:spcBef>
+              <a:buFont typeface="Arial"/>
+              <a:buChar char="•"/>
+              <a:defRPr sz="2800" kern="1200">
+                <a:solidFill>
+                  <a:srgbClr val="3B3C3E"/>
+                </a:solidFill>
+                <a:latin typeface="Arial"/>
+                <a:ea typeface="+mn-ea"/>
+                <a:cs typeface="Arial"/>
+              </a:defRPr>
+            </a:lvl2pPr>
+            <a:lvl3pPr marL="1143000" indent="-228600" algn="l" defTabSz="457200" rtl="0" eaLnBrk="1" latinLnBrk="0" hangingPunct="1">
+              <a:spcBef>
+                <a:spcPct val="20000"/>
+              </a:spcBef>
+              <a:buFont typeface="Arial"/>
+              <a:buChar char="•"/>
+              <a:defRPr sz="2400" kern="1200">
+                <a:solidFill>
+                  <a:srgbClr val="3B3C3E"/>
+                </a:solidFill>
+                <a:latin typeface="Arial"/>
+                <a:ea typeface="+mn-ea"/>
+                <a:cs typeface="Arial"/>
+              </a:defRPr>
+            </a:lvl3pPr>
+            <a:lvl4pPr marL="1600200" indent="-228600" algn="l" defTabSz="457200" rtl="0" eaLnBrk="1" latinLnBrk="0" hangingPunct="1">
+              <a:spcBef>
+                <a:spcPct val="20000"/>
+              </a:spcBef>
+              <a:buFont typeface="Arial"/>
+              <a:buChar char="•"/>
+              <a:defRPr sz="2000" kern="1200">
+                <a:solidFill>
+                  <a:srgbClr val="3B3C3E"/>
+                </a:solidFill>
+                <a:latin typeface="Arial"/>
+                <a:ea typeface="+mn-ea"/>
+                <a:cs typeface="Arial"/>
+              </a:defRPr>
+            </a:lvl4pPr>
+            <a:lvl5pPr marL="2057400" indent="-228600" algn="l" defTabSz="457200" rtl="0" eaLnBrk="1" latinLnBrk="0" hangingPunct="1">
+              <a:spcBef>
+                <a:spcPct val="20000"/>
+              </a:spcBef>
+              <a:buFont typeface="Arial"/>
+              <a:buChar char="•"/>
+              <a:defRPr sz="2000" kern="1200">
+                <a:solidFill>
+                  <a:srgbClr val="3B3C3E"/>
+                </a:solidFill>
+                <a:latin typeface="Arial"/>
+                <a:ea typeface="+mn-ea"/>
+                <a:cs typeface="Arial"/>
+              </a:defRPr>
+            </a:lvl5pPr>
+            <a:lvl6pPr marL="2514600" indent="-228600" algn="l" defTabSz="457200" rtl="0" eaLnBrk="1" latinLnBrk="0" hangingPunct="1">
+              <a:spcBef>
+                <a:spcPct val="20000"/>
+              </a:spcBef>
+              <a:buFont typeface="Arial"/>
+              <a:buChar char="•"/>
+              <a:defRPr sz="2000" kern="1200">
+                <a:solidFill>
+                  <a:schemeClr val="tx1"/>
+                </a:solidFill>
+                <a:latin typeface="+mn-lt"/>
+                <a:ea typeface="+mn-ea"/>
+                <a:cs typeface="+mn-cs"/>
+              </a:defRPr>
+            </a:lvl6pPr>
+            <a:lvl7pPr marL="2971800" indent="-228600" algn="l" defTabSz="457200" rtl="0" eaLnBrk="1" latinLnBrk="0" hangingPunct="1">
+              <a:spcBef>
+                <a:spcPct val="20000"/>
+              </a:spcBef>
+              <a:buFont typeface="Arial"/>
+              <a:buChar char="•"/>
+              <a:defRPr sz="2000" kern="1200">
+                <a:solidFill>
+                  <a:schemeClr val="tx1"/>
+                </a:solidFill>
+                <a:latin typeface="+mn-lt"/>
+                <a:ea typeface="+mn-ea"/>
+                <a:cs typeface="+mn-cs"/>
+              </a:defRPr>
+            </a:lvl7pPr>
+            <a:lvl8pPr marL="3429000" indent="-228600" algn="l" defTabSz="457200" rtl="0" eaLnBrk="1" latinLnBrk="0" hangingPunct="1">
+              <a:spcBef>
+                <a:spcPct val="20000"/>
+              </a:spcBef>
+              <a:buFont typeface="Arial"/>
+              <a:buChar char="•"/>
+              <a:defRPr sz="2000" kern="1200">
+                <a:solidFill>
+                  <a:schemeClr val="tx1"/>
+                </a:solidFill>
+                <a:latin typeface="+mn-lt"/>
+                <a:ea typeface="+mn-ea"/>
+                <a:cs typeface="+mn-cs"/>
+              </a:defRPr>
+            </a:lvl8pPr>
+            <a:lvl9pPr marL="3886200" indent="-228600" algn="l" defTabSz="457200" rtl="0" eaLnBrk="1" latinLnBrk="0" hangingPunct="1">
+              <a:spcBef>
+                <a:spcPct val="20000"/>
+              </a:spcBef>
+              <a:buFont typeface="Arial"/>
+              <a:buChar char="•"/>
+              <a:defRPr sz="2000" kern="1200">
+                <a:solidFill>
+                  <a:schemeClr val="tx1"/>
+                </a:solidFill>
+                <a:latin typeface="+mn-lt"/>
+                <a:ea typeface="+mn-ea"/>
+                <a:cs typeface="+mn-cs"/>
+              </a:defRPr>
+            </a:lvl9pPr>
+          </a:lstStyle>
+          <a:p>
+            <a:r>
+              <a:rPr lang="en-US"/>
+              <a:t>Standard RGB</a:t>
+            </a:r>
+            <a:endParaRPr lang="en-US" dirty="0"/>
+          </a:p>
+          <a:p>
+            <a:endParaRPr lang="en-US" dirty="0"/>
+          </a:p>
+        </p:txBody>
+      </p:sp>
     </p:spTree>
     <p:extLst>
       <p:ext uri="{BB962C8B-B14F-4D97-AF65-F5344CB8AC3E}">

</xml_diff>

<commit_message>
Moved kmeans functions into Multispectral file
Organization of code updates
</commit_message>
<xml_diff>
--- a/Documentation/Cornett_Leach_Presentation.pptx
+++ b/Documentation/Cornett_Leach_Presentation.pptx
@@ -7140,8 +7140,13 @@
             </a:pPr>
             <a:r>
               <a:rPr lang="en-US" dirty="0"/>
-              <a:t>Mean shift overview</a:t>
-            </a:r>
+              <a:t>Mean shift overview – how we determined a good </a:t>
+            </a:r>
+            <a:r>
+              <a:rPr lang="en-US"/>
+              <a:t>window size</a:t>
+            </a:r>
+            <a:endParaRPr lang="en-US" dirty="0"/>
           </a:p>
           <a:p>
             <a:pPr marL="514350" indent="-514350">

</xml_diff>

<commit_message>
Updates to power points
</commit_message>
<xml_diff>
--- a/Documentation/Cornett_Leach_Presentation.pptx
+++ b/Documentation/Cornett_Leach_Presentation.pptx
@@ -13,8 +13,9 @@
     <p:sldId id="266" r:id="rId7"/>
     <p:sldId id="265" r:id="rId8"/>
     <p:sldId id="263" r:id="rId9"/>
-    <p:sldId id="264" r:id="rId10"/>
-    <p:sldId id="262" r:id="rId11"/>
+    <p:sldId id="267" r:id="rId10"/>
+    <p:sldId id="264" r:id="rId11"/>
+    <p:sldId id="262" r:id="rId12"/>
   </p:sldIdLst>
   <p:sldSz cx="9144000" cy="5143500" type="screen16x9"/>
   <p:notesSz cx="6858000" cy="9144000"/>
@@ -130,6 +131,3496 @@
     </p:ext>
   </p:extLst>
 </p:presentation>
+</file>
+
+<file path=ppt/diagrams/colors1.xml><?xml version="1.0" encoding="utf-8"?>
+<dgm:colorsDef xmlns:dgm="http://schemas.openxmlformats.org/drawingml/2006/diagram" xmlns:a="http://schemas.openxmlformats.org/drawingml/2006/main" uniqueId="urn:microsoft.com/office/officeart/2005/8/colors/accent1_2">
+  <dgm:title val=""/>
+  <dgm:desc val=""/>
+  <dgm:catLst>
+    <dgm:cat type="accent1" pri="11200"/>
+  </dgm:catLst>
+  <dgm:styleLbl name="node0">
+    <dgm:fillClrLst meth="repeat">
+      <a:schemeClr val="accent1"/>
+    </dgm:fillClrLst>
+    <dgm:linClrLst meth="repeat">
+      <a:schemeClr val="lt1"/>
+    </dgm:linClrLst>
+    <dgm:effectClrLst/>
+    <dgm:txLinClrLst/>
+    <dgm:txFillClrLst/>
+    <dgm:txEffectClrLst/>
+  </dgm:styleLbl>
+  <dgm:styleLbl name="alignNode1">
+    <dgm:fillClrLst meth="repeat">
+      <a:schemeClr val="accent1"/>
+    </dgm:fillClrLst>
+    <dgm:linClrLst meth="repeat">
+      <a:schemeClr val="accent1"/>
+    </dgm:linClrLst>
+    <dgm:effectClrLst/>
+    <dgm:txLinClrLst/>
+    <dgm:txFillClrLst/>
+    <dgm:txEffectClrLst/>
+  </dgm:styleLbl>
+  <dgm:styleLbl name="node1">
+    <dgm:fillClrLst meth="repeat">
+      <a:schemeClr val="accent1"/>
+    </dgm:fillClrLst>
+    <dgm:linClrLst meth="repeat">
+      <a:schemeClr val="lt1"/>
+    </dgm:linClrLst>
+    <dgm:effectClrLst/>
+    <dgm:txLinClrLst/>
+    <dgm:txFillClrLst/>
+    <dgm:txEffectClrLst/>
+  </dgm:styleLbl>
+  <dgm:styleLbl name="lnNode1">
+    <dgm:fillClrLst meth="repeat">
+      <a:schemeClr val="accent1"/>
+    </dgm:fillClrLst>
+    <dgm:linClrLst meth="repeat">
+      <a:schemeClr val="lt1"/>
+    </dgm:linClrLst>
+    <dgm:effectClrLst/>
+    <dgm:txLinClrLst/>
+    <dgm:txFillClrLst/>
+    <dgm:txEffectClrLst/>
+  </dgm:styleLbl>
+  <dgm:styleLbl name="vennNode1">
+    <dgm:fillClrLst meth="repeat">
+      <a:schemeClr val="accent1">
+        <a:alpha val="50000"/>
+      </a:schemeClr>
+    </dgm:fillClrLst>
+    <dgm:linClrLst meth="repeat">
+      <a:schemeClr val="lt1"/>
+    </dgm:linClrLst>
+    <dgm:effectClrLst/>
+    <dgm:txLinClrLst/>
+    <dgm:txFillClrLst/>
+    <dgm:txEffectClrLst/>
+  </dgm:styleLbl>
+  <dgm:styleLbl name="node2">
+    <dgm:fillClrLst meth="repeat">
+      <a:schemeClr val="accent1"/>
+    </dgm:fillClrLst>
+    <dgm:linClrLst meth="repeat">
+      <a:schemeClr val="lt1"/>
+    </dgm:linClrLst>
+    <dgm:effectClrLst/>
+    <dgm:txLinClrLst/>
+    <dgm:txFillClrLst/>
+    <dgm:txEffectClrLst/>
+  </dgm:styleLbl>
+  <dgm:styleLbl name="node3">
+    <dgm:fillClrLst meth="repeat">
+      <a:schemeClr val="accent1"/>
+    </dgm:fillClrLst>
+    <dgm:linClrLst meth="repeat">
+      <a:schemeClr val="lt1"/>
+    </dgm:linClrLst>
+    <dgm:effectClrLst/>
+    <dgm:txLinClrLst/>
+    <dgm:txFillClrLst/>
+    <dgm:txEffectClrLst/>
+  </dgm:styleLbl>
+  <dgm:styleLbl name="node4">
+    <dgm:fillClrLst meth="repeat">
+      <a:schemeClr val="accent1"/>
+    </dgm:fillClrLst>
+    <dgm:linClrLst meth="repeat">
+      <a:schemeClr val="lt1"/>
+    </dgm:linClrLst>
+    <dgm:effectClrLst/>
+    <dgm:txLinClrLst/>
+    <dgm:txFillClrLst/>
+    <dgm:txEffectClrLst/>
+  </dgm:styleLbl>
+  <dgm:styleLbl name="fgImgPlace1">
+    <dgm:fillClrLst meth="repeat">
+      <a:schemeClr val="accent1">
+        <a:tint val="50000"/>
+      </a:schemeClr>
+    </dgm:fillClrLst>
+    <dgm:linClrLst meth="repeat">
+      <a:schemeClr val="lt1"/>
+    </dgm:linClrLst>
+    <dgm:effectClrLst/>
+    <dgm:txLinClrLst/>
+    <dgm:txFillClrLst meth="repeat">
+      <a:schemeClr val="lt1"/>
+    </dgm:txFillClrLst>
+    <dgm:txEffectClrLst/>
+  </dgm:styleLbl>
+  <dgm:styleLbl name="alignImgPlace1">
+    <dgm:fillClrLst meth="repeat">
+      <a:schemeClr val="accent1">
+        <a:tint val="50000"/>
+      </a:schemeClr>
+    </dgm:fillClrLst>
+    <dgm:linClrLst meth="repeat">
+      <a:schemeClr val="lt1"/>
+    </dgm:linClrLst>
+    <dgm:effectClrLst/>
+    <dgm:txLinClrLst/>
+    <dgm:txFillClrLst meth="repeat">
+      <a:schemeClr val="lt1"/>
+    </dgm:txFillClrLst>
+    <dgm:txEffectClrLst/>
+  </dgm:styleLbl>
+  <dgm:styleLbl name="bgImgPlace1">
+    <dgm:fillClrLst meth="repeat">
+      <a:schemeClr val="accent1">
+        <a:tint val="50000"/>
+      </a:schemeClr>
+    </dgm:fillClrLst>
+    <dgm:linClrLst meth="repeat">
+      <a:schemeClr val="lt1"/>
+    </dgm:linClrLst>
+    <dgm:effectClrLst/>
+    <dgm:txLinClrLst/>
+    <dgm:txFillClrLst meth="repeat">
+      <a:schemeClr val="lt1"/>
+    </dgm:txFillClrLst>
+    <dgm:txEffectClrLst/>
+  </dgm:styleLbl>
+  <dgm:styleLbl name="sibTrans2D1">
+    <dgm:fillClrLst meth="repeat">
+      <a:schemeClr val="accent1">
+        <a:tint val="60000"/>
+      </a:schemeClr>
+    </dgm:fillClrLst>
+    <dgm:linClrLst meth="repeat">
+      <a:schemeClr val="accent1">
+        <a:tint val="60000"/>
+      </a:schemeClr>
+    </dgm:linClrLst>
+    <dgm:effectClrLst/>
+    <dgm:txLinClrLst/>
+    <dgm:txFillClrLst/>
+    <dgm:txEffectClrLst/>
+  </dgm:styleLbl>
+  <dgm:styleLbl name="fgSibTrans2D1">
+    <dgm:fillClrLst meth="repeat">
+      <a:schemeClr val="accent1">
+        <a:tint val="60000"/>
+      </a:schemeClr>
+    </dgm:fillClrLst>
+    <dgm:linClrLst meth="repeat">
+      <a:schemeClr val="accent1">
+        <a:tint val="60000"/>
+      </a:schemeClr>
+    </dgm:linClrLst>
+    <dgm:effectClrLst/>
+    <dgm:txLinClrLst/>
+    <dgm:txFillClrLst/>
+    <dgm:txEffectClrLst/>
+  </dgm:styleLbl>
+  <dgm:styleLbl name="bgSibTrans2D1">
+    <dgm:fillClrLst meth="repeat">
+      <a:schemeClr val="accent1">
+        <a:tint val="60000"/>
+      </a:schemeClr>
+    </dgm:fillClrLst>
+    <dgm:linClrLst meth="repeat">
+      <a:schemeClr val="accent1">
+        <a:tint val="60000"/>
+      </a:schemeClr>
+    </dgm:linClrLst>
+    <dgm:effectClrLst/>
+    <dgm:txLinClrLst/>
+    <dgm:txFillClrLst/>
+    <dgm:txEffectClrLst/>
+  </dgm:styleLbl>
+  <dgm:styleLbl name="sibTrans1D1">
+    <dgm:fillClrLst meth="repeat">
+      <a:schemeClr val="accent1"/>
+    </dgm:fillClrLst>
+    <dgm:linClrLst meth="repeat">
+      <a:schemeClr val="accent1"/>
+    </dgm:linClrLst>
+    <dgm:effectClrLst/>
+    <dgm:txLinClrLst/>
+    <dgm:txFillClrLst meth="repeat">
+      <a:schemeClr val="tx1"/>
+    </dgm:txFillClrLst>
+    <dgm:txEffectClrLst/>
+  </dgm:styleLbl>
+  <dgm:styleLbl name="callout">
+    <dgm:fillClrLst meth="repeat">
+      <a:schemeClr val="accent1"/>
+    </dgm:fillClrLst>
+    <dgm:linClrLst meth="repeat">
+      <a:schemeClr val="accent1">
+        <a:tint val="50000"/>
+      </a:schemeClr>
+    </dgm:linClrLst>
+    <dgm:effectClrLst/>
+    <dgm:txLinClrLst/>
+    <dgm:txFillClrLst meth="repeat">
+      <a:schemeClr val="tx1"/>
+    </dgm:txFillClrLst>
+    <dgm:txEffectClrLst/>
+  </dgm:styleLbl>
+  <dgm:styleLbl name="asst0">
+    <dgm:fillClrLst meth="repeat">
+      <a:schemeClr val="accent1"/>
+    </dgm:fillClrLst>
+    <dgm:linClrLst meth="repeat">
+      <a:schemeClr val="lt1"/>
+    </dgm:linClrLst>
+    <dgm:effectClrLst/>
+    <dgm:txLinClrLst/>
+    <dgm:txFillClrLst/>
+    <dgm:txEffectClrLst/>
+  </dgm:styleLbl>
+  <dgm:styleLbl name="asst1">
+    <dgm:fillClrLst meth="repeat">
+      <a:schemeClr val="accent1"/>
+    </dgm:fillClrLst>
+    <dgm:linClrLst meth="repeat">
+      <a:schemeClr val="lt1"/>
+    </dgm:linClrLst>
+    <dgm:effectClrLst/>
+    <dgm:txLinClrLst/>
+    <dgm:txFillClrLst/>
+    <dgm:txEffectClrLst/>
+  </dgm:styleLbl>
+  <dgm:styleLbl name="asst2">
+    <dgm:fillClrLst meth="repeat">
+      <a:schemeClr val="accent1"/>
+    </dgm:fillClrLst>
+    <dgm:linClrLst meth="repeat">
+      <a:schemeClr val="lt1"/>
+    </dgm:linClrLst>
+    <dgm:effectClrLst/>
+    <dgm:txLinClrLst/>
+    <dgm:txFillClrLst/>
+    <dgm:txEffectClrLst/>
+  </dgm:styleLbl>
+  <dgm:styleLbl name="asst3">
+    <dgm:fillClrLst meth="repeat">
+      <a:schemeClr val="accent1"/>
+    </dgm:fillClrLst>
+    <dgm:linClrLst meth="repeat">
+      <a:schemeClr val="lt1"/>
+    </dgm:linClrLst>
+    <dgm:effectClrLst/>
+    <dgm:txLinClrLst/>
+    <dgm:txFillClrLst/>
+    <dgm:txEffectClrLst/>
+  </dgm:styleLbl>
+  <dgm:styleLbl name="asst4">
+    <dgm:fillClrLst meth="repeat">
+      <a:schemeClr val="accent1"/>
+    </dgm:fillClrLst>
+    <dgm:linClrLst meth="repeat">
+      <a:schemeClr val="lt1"/>
+    </dgm:linClrLst>
+    <dgm:effectClrLst/>
+    <dgm:txLinClrLst/>
+    <dgm:txFillClrLst/>
+    <dgm:txEffectClrLst/>
+  </dgm:styleLbl>
+  <dgm:styleLbl name="parChTrans2D1">
+    <dgm:fillClrLst meth="repeat">
+      <a:schemeClr val="accent1">
+        <a:tint val="60000"/>
+      </a:schemeClr>
+    </dgm:fillClrLst>
+    <dgm:linClrLst meth="repeat">
+      <a:schemeClr val="accent1">
+        <a:tint val="60000"/>
+      </a:schemeClr>
+    </dgm:linClrLst>
+    <dgm:effectClrLst/>
+    <dgm:txLinClrLst/>
+    <dgm:txFillClrLst meth="repeat">
+      <a:schemeClr val="lt1"/>
+    </dgm:txFillClrLst>
+    <dgm:txEffectClrLst/>
+  </dgm:styleLbl>
+  <dgm:styleLbl name="parChTrans2D2">
+    <dgm:fillClrLst meth="repeat">
+      <a:schemeClr val="accent1"/>
+    </dgm:fillClrLst>
+    <dgm:linClrLst meth="repeat">
+      <a:schemeClr val="accent1"/>
+    </dgm:linClrLst>
+    <dgm:effectClrLst/>
+    <dgm:txLinClrLst/>
+    <dgm:txFillClrLst meth="repeat">
+      <a:schemeClr val="lt1"/>
+    </dgm:txFillClrLst>
+    <dgm:txEffectClrLst/>
+  </dgm:styleLbl>
+  <dgm:styleLbl name="parChTrans2D3">
+    <dgm:fillClrLst meth="repeat">
+      <a:schemeClr val="accent1"/>
+    </dgm:fillClrLst>
+    <dgm:linClrLst meth="repeat">
+      <a:schemeClr val="accent1"/>
+    </dgm:linClrLst>
+    <dgm:effectClrLst/>
+    <dgm:txLinClrLst/>
+    <dgm:txFillClrLst meth="repeat">
+      <a:schemeClr val="lt1"/>
+    </dgm:txFillClrLst>
+    <dgm:txEffectClrLst/>
+  </dgm:styleLbl>
+  <dgm:styleLbl name="parChTrans2D4">
+    <dgm:fillClrLst meth="repeat">
+      <a:schemeClr val="accent1"/>
+    </dgm:fillClrLst>
+    <dgm:linClrLst meth="repeat">
+      <a:schemeClr val="accent1"/>
+    </dgm:linClrLst>
+    <dgm:effectClrLst/>
+    <dgm:txLinClrLst/>
+    <dgm:txFillClrLst meth="repeat">
+      <a:schemeClr val="lt1"/>
+    </dgm:txFillClrLst>
+    <dgm:txEffectClrLst/>
+  </dgm:styleLbl>
+  <dgm:styleLbl name="parChTrans1D1">
+    <dgm:fillClrLst meth="repeat">
+      <a:schemeClr val="accent1"/>
+    </dgm:fillClrLst>
+    <dgm:linClrLst meth="repeat">
+      <a:schemeClr val="accent1">
+        <a:shade val="60000"/>
+      </a:schemeClr>
+    </dgm:linClrLst>
+    <dgm:effectClrLst/>
+    <dgm:txLinClrLst/>
+    <dgm:txFillClrLst meth="repeat">
+      <a:schemeClr val="tx1"/>
+    </dgm:txFillClrLst>
+    <dgm:txEffectClrLst/>
+  </dgm:styleLbl>
+  <dgm:styleLbl name="parChTrans1D2">
+    <dgm:fillClrLst meth="repeat">
+      <a:schemeClr val="accent1"/>
+    </dgm:fillClrLst>
+    <dgm:linClrLst meth="repeat">
+      <a:schemeClr val="accent1">
+        <a:shade val="60000"/>
+      </a:schemeClr>
+    </dgm:linClrLst>
+    <dgm:effectClrLst/>
+    <dgm:txLinClrLst/>
+    <dgm:txFillClrLst meth="repeat">
+      <a:schemeClr val="tx1"/>
+    </dgm:txFillClrLst>
+    <dgm:txEffectClrLst/>
+  </dgm:styleLbl>
+  <dgm:styleLbl name="parChTrans1D3">
+    <dgm:fillClrLst meth="repeat">
+      <a:schemeClr val="accent1"/>
+    </dgm:fillClrLst>
+    <dgm:linClrLst meth="repeat">
+      <a:schemeClr val="accent1">
+        <a:shade val="80000"/>
+      </a:schemeClr>
+    </dgm:linClrLst>
+    <dgm:effectClrLst/>
+    <dgm:txLinClrLst/>
+    <dgm:txFillClrLst meth="repeat">
+      <a:schemeClr val="tx1"/>
+    </dgm:txFillClrLst>
+    <dgm:txEffectClrLst/>
+  </dgm:styleLbl>
+  <dgm:styleLbl name="parChTrans1D4">
+    <dgm:fillClrLst meth="repeat">
+      <a:schemeClr val="accent1"/>
+    </dgm:fillClrLst>
+    <dgm:linClrLst meth="repeat">
+      <a:schemeClr val="accent1">
+        <a:shade val="80000"/>
+      </a:schemeClr>
+    </dgm:linClrLst>
+    <dgm:effectClrLst/>
+    <dgm:txLinClrLst/>
+    <dgm:txFillClrLst meth="repeat">
+      <a:schemeClr val="tx1"/>
+    </dgm:txFillClrLst>
+    <dgm:txEffectClrLst/>
+  </dgm:styleLbl>
+  <dgm:styleLbl name="fgAcc1">
+    <dgm:fillClrLst meth="repeat">
+      <a:schemeClr val="lt1">
+        <a:alpha val="90000"/>
+      </a:schemeClr>
+    </dgm:fillClrLst>
+    <dgm:linClrLst meth="repeat">
+      <a:schemeClr val="accent1"/>
+    </dgm:linClrLst>
+    <dgm:effectClrLst/>
+    <dgm:txLinClrLst/>
+    <dgm:txFillClrLst meth="repeat">
+      <a:schemeClr val="dk1"/>
+    </dgm:txFillClrLst>
+    <dgm:txEffectClrLst/>
+  </dgm:styleLbl>
+  <dgm:styleLbl name="conFgAcc1">
+    <dgm:fillClrLst meth="repeat">
+      <a:schemeClr val="lt1">
+        <a:alpha val="90000"/>
+      </a:schemeClr>
+    </dgm:fillClrLst>
+    <dgm:linClrLst meth="repeat">
+      <a:schemeClr val="accent1"/>
+    </dgm:linClrLst>
+    <dgm:effectClrLst/>
+    <dgm:txLinClrLst/>
+    <dgm:txFillClrLst meth="repeat">
+      <a:schemeClr val="dk1"/>
+    </dgm:txFillClrLst>
+    <dgm:txEffectClrLst/>
+  </dgm:styleLbl>
+  <dgm:styleLbl name="alignAcc1">
+    <dgm:fillClrLst meth="repeat">
+      <a:schemeClr val="lt1">
+        <a:alpha val="90000"/>
+      </a:schemeClr>
+    </dgm:fillClrLst>
+    <dgm:linClrLst meth="repeat">
+      <a:schemeClr val="accent1"/>
+    </dgm:linClrLst>
+    <dgm:effectClrLst/>
+    <dgm:txLinClrLst/>
+    <dgm:txFillClrLst meth="repeat">
+      <a:schemeClr val="dk1"/>
+    </dgm:txFillClrLst>
+    <dgm:txEffectClrLst/>
+  </dgm:styleLbl>
+  <dgm:styleLbl name="trAlignAcc1">
+    <dgm:fillClrLst meth="repeat">
+      <a:schemeClr val="lt1">
+        <a:alpha val="40000"/>
+      </a:schemeClr>
+    </dgm:fillClrLst>
+    <dgm:linClrLst meth="repeat">
+      <a:schemeClr val="accent1"/>
+    </dgm:linClrLst>
+    <dgm:effectClrLst/>
+    <dgm:txLinClrLst/>
+    <dgm:txFillClrLst meth="repeat">
+      <a:schemeClr val="dk1"/>
+    </dgm:txFillClrLst>
+    <dgm:txEffectClrLst/>
+  </dgm:styleLbl>
+  <dgm:styleLbl name="bgAcc1">
+    <dgm:fillClrLst meth="repeat">
+      <a:schemeClr val="lt1">
+        <a:alpha val="90000"/>
+      </a:schemeClr>
+    </dgm:fillClrLst>
+    <dgm:linClrLst meth="repeat">
+      <a:schemeClr val="accent1"/>
+    </dgm:linClrLst>
+    <dgm:effectClrLst/>
+    <dgm:txLinClrLst/>
+    <dgm:txFillClrLst meth="repeat">
+      <a:schemeClr val="dk1"/>
+    </dgm:txFillClrLst>
+    <dgm:txEffectClrLst/>
+  </dgm:styleLbl>
+  <dgm:styleLbl name="solidFgAcc1">
+    <dgm:fillClrLst meth="repeat">
+      <a:schemeClr val="lt1"/>
+    </dgm:fillClrLst>
+    <dgm:linClrLst meth="repeat">
+      <a:schemeClr val="accent1"/>
+    </dgm:linClrLst>
+    <dgm:effectClrLst/>
+    <dgm:txLinClrLst/>
+    <dgm:txFillClrLst meth="repeat">
+      <a:schemeClr val="dk1"/>
+    </dgm:txFillClrLst>
+    <dgm:txEffectClrLst/>
+  </dgm:styleLbl>
+  <dgm:styleLbl name="solidAlignAcc1">
+    <dgm:fillClrLst meth="repeat">
+      <a:schemeClr val="lt1"/>
+    </dgm:fillClrLst>
+    <dgm:linClrLst meth="repeat">
+      <a:schemeClr val="accent1"/>
+    </dgm:linClrLst>
+    <dgm:effectClrLst/>
+    <dgm:txLinClrLst/>
+    <dgm:txFillClrLst meth="repeat">
+      <a:schemeClr val="dk1"/>
+    </dgm:txFillClrLst>
+    <dgm:txEffectClrLst/>
+  </dgm:styleLbl>
+  <dgm:styleLbl name="solidBgAcc1">
+    <dgm:fillClrLst meth="repeat">
+      <a:schemeClr val="lt1"/>
+    </dgm:fillClrLst>
+    <dgm:linClrLst meth="repeat">
+      <a:schemeClr val="accent1"/>
+    </dgm:linClrLst>
+    <dgm:effectClrLst/>
+    <dgm:txLinClrLst/>
+    <dgm:txFillClrLst meth="repeat">
+      <a:schemeClr val="dk1"/>
+    </dgm:txFillClrLst>
+    <dgm:txEffectClrLst/>
+  </dgm:styleLbl>
+  <dgm:styleLbl name="fgAccFollowNode1">
+    <dgm:fillClrLst meth="repeat">
+      <a:schemeClr val="accent1">
+        <a:alpha val="90000"/>
+        <a:tint val="40000"/>
+      </a:schemeClr>
+    </dgm:fillClrLst>
+    <dgm:linClrLst meth="repeat">
+      <a:schemeClr val="accent1">
+        <a:alpha val="90000"/>
+        <a:tint val="40000"/>
+      </a:schemeClr>
+    </dgm:linClrLst>
+    <dgm:effectClrLst/>
+    <dgm:txLinClrLst/>
+    <dgm:txFillClrLst meth="repeat">
+      <a:schemeClr val="dk1"/>
+    </dgm:txFillClrLst>
+    <dgm:txEffectClrLst/>
+  </dgm:styleLbl>
+  <dgm:styleLbl name="alignAccFollowNode1">
+    <dgm:fillClrLst meth="repeat">
+      <a:schemeClr val="accent1">
+        <a:alpha val="90000"/>
+        <a:tint val="40000"/>
+      </a:schemeClr>
+    </dgm:fillClrLst>
+    <dgm:linClrLst meth="repeat">
+      <a:schemeClr val="accent1">
+        <a:alpha val="90000"/>
+        <a:tint val="40000"/>
+      </a:schemeClr>
+    </dgm:linClrLst>
+    <dgm:effectClrLst/>
+    <dgm:txLinClrLst/>
+    <dgm:txFillClrLst meth="repeat">
+      <a:schemeClr val="dk1"/>
+    </dgm:txFillClrLst>
+    <dgm:txEffectClrLst/>
+  </dgm:styleLbl>
+  <dgm:styleLbl name="bgAccFollowNode1">
+    <dgm:fillClrLst meth="repeat">
+      <a:schemeClr val="accent1">
+        <a:alpha val="90000"/>
+        <a:tint val="40000"/>
+      </a:schemeClr>
+    </dgm:fillClrLst>
+    <dgm:linClrLst meth="repeat">
+      <a:schemeClr val="accent1">
+        <a:alpha val="90000"/>
+        <a:tint val="40000"/>
+      </a:schemeClr>
+    </dgm:linClrLst>
+    <dgm:effectClrLst/>
+    <dgm:txLinClrLst/>
+    <dgm:txFillClrLst meth="repeat">
+      <a:schemeClr val="dk1"/>
+    </dgm:txFillClrLst>
+    <dgm:txEffectClrLst/>
+  </dgm:styleLbl>
+  <dgm:styleLbl name="fgAcc0">
+    <dgm:fillClrLst meth="repeat">
+      <a:schemeClr val="lt1">
+        <a:alpha val="90000"/>
+      </a:schemeClr>
+    </dgm:fillClrLst>
+    <dgm:linClrLst meth="repeat">
+      <a:schemeClr val="accent1"/>
+    </dgm:linClrLst>
+    <dgm:effectClrLst/>
+    <dgm:txLinClrLst/>
+    <dgm:txFillClrLst meth="repeat">
+      <a:schemeClr val="dk1"/>
+    </dgm:txFillClrLst>
+    <dgm:txEffectClrLst/>
+  </dgm:styleLbl>
+  <dgm:styleLbl name="fgAcc2">
+    <dgm:fillClrLst meth="repeat">
+      <a:schemeClr val="lt1">
+        <a:alpha val="90000"/>
+      </a:schemeClr>
+    </dgm:fillClrLst>
+    <dgm:linClrLst meth="repeat">
+      <a:schemeClr val="accent1"/>
+    </dgm:linClrLst>
+    <dgm:effectClrLst/>
+    <dgm:txLinClrLst/>
+    <dgm:txFillClrLst meth="repeat">
+      <a:schemeClr val="dk1"/>
+    </dgm:txFillClrLst>
+    <dgm:txEffectClrLst/>
+  </dgm:styleLbl>
+  <dgm:styleLbl name="fgAcc3">
+    <dgm:fillClrLst meth="repeat">
+      <a:schemeClr val="lt1">
+        <a:alpha val="90000"/>
+      </a:schemeClr>
+    </dgm:fillClrLst>
+    <dgm:linClrLst meth="repeat">
+      <a:schemeClr val="accent1"/>
+    </dgm:linClrLst>
+    <dgm:effectClrLst/>
+    <dgm:txLinClrLst/>
+    <dgm:txFillClrLst meth="repeat">
+      <a:schemeClr val="dk1"/>
+    </dgm:txFillClrLst>
+    <dgm:txEffectClrLst/>
+  </dgm:styleLbl>
+  <dgm:styleLbl name="fgAcc4">
+    <dgm:fillClrLst meth="repeat">
+      <a:schemeClr val="lt1">
+        <a:alpha val="90000"/>
+      </a:schemeClr>
+    </dgm:fillClrLst>
+    <dgm:linClrLst meth="repeat">
+      <a:schemeClr val="accent1"/>
+    </dgm:linClrLst>
+    <dgm:effectClrLst/>
+    <dgm:txLinClrLst/>
+    <dgm:txFillClrLst meth="repeat">
+      <a:schemeClr val="dk1"/>
+    </dgm:txFillClrLst>
+    <dgm:txEffectClrLst/>
+  </dgm:styleLbl>
+  <dgm:styleLbl name="bgShp">
+    <dgm:fillClrLst meth="repeat">
+      <a:schemeClr val="accent1">
+        <a:tint val="40000"/>
+      </a:schemeClr>
+    </dgm:fillClrLst>
+    <dgm:linClrLst meth="repeat">
+      <a:schemeClr val="accent1"/>
+    </dgm:linClrLst>
+    <dgm:effectClrLst/>
+    <dgm:txLinClrLst/>
+    <dgm:txFillClrLst meth="repeat">
+      <a:schemeClr val="dk1"/>
+    </dgm:txFillClrLst>
+    <dgm:txEffectClrLst/>
+  </dgm:styleLbl>
+  <dgm:styleLbl name="dkBgShp">
+    <dgm:fillClrLst meth="repeat">
+      <a:schemeClr val="accent1">
+        <a:shade val="80000"/>
+      </a:schemeClr>
+    </dgm:fillClrLst>
+    <dgm:linClrLst meth="repeat">
+      <a:schemeClr val="accent1"/>
+    </dgm:linClrLst>
+    <dgm:effectClrLst/>
+    <dgm:txLinClrLst/>
+    <dgm:txFillClrLst meth="repeat">
+      <a:schemeClr val="lt1"/>
+    </dgm:txFillClrLst>
+    <dgm:txEffectClrLst/>
+  </dgm:styleLbl>
+  <dgm:styleLbl name="trBgShp">
+    <dgm:fillClrLst meth="repeat">
+      <a:schemeClr val="accent1">
+        <a:tint val="50000"/>
+        <a:alpha val="40000"/>
+      </a:schemeClr>
+    </dgm:fillClrLst>
+    <dgm:linClrLst meth="repeat">
+      <a:schemeClr val="accent1"/>
+    </dgm:linClrLst>
+    <dgm:effectClrLst/>
+    <dgm:txLinClrLst/>
+    <dgm:txFillClrLst meth="repeat">
+      <a:schemeClr val="lt1"/>
+    </dgm:txFillClrLst>
+    <dgm:txEffectClrLst/>
+  </dgm:styleLbl>
+  <dgm:styleLbl name="fgShp">
+    <dgm:fillClrLst meth="repeat">
+      <a:schemeClr val="accent1">
+        <a:tint val="60000"/>
+      </a:schemeClr>
+    </dgm:fillClrLst>
+    <dgm:linClrLst meth="repeat">
+      <a:schemeClr val="lt1"/>
+    </dgm:linClrLst>
+    <dgm:effectClrLst/>
+    <dgm:txLinClrLst/>
+    <dgm:txFillClrLst meth="repeat">
+      <a:schemeClr val="dk1"/>
+    </dgm:txFillClrLst>
+    <dgm:txEffectClrLst/>
+  </dgm:styleLbl>
+  <dgm:styleLbl name="revTx">
+    <dgm:fillClrLst meth="repeat">
+      <a:schemeClr val="lt1">
+        <a:alpha val="0"/>
+      </a:schemeClr>
+    </dgm:fillClrLst>
+    <dgm:linClrLst meth="repeat">
+      <a:schemeClr val="dk1">
+        <a:alpha val="0"/>
+      </a:schemeClr>
+    </dgm:linClrLst>
+    <dgm:effectClrLst/>
+    <dgm:txLinClrLst/>
+    <dgm:txFillClrLst meth="repeat">
+      <a:schemeClr val="tx1"/>
+    </dgm:txFillClrLst>
+    <dgm:txEffectClrLst/>
+  </dgm:styleLbl>
+</dgm:colorsDef>
+</file>
+
+<file path=ppt/diagrams/data1.xml><?xml version="1.0" encoding="utf-8"?>
+<dgm:dataModel xmlns:dgm="http://schemas.openxmlformats.org/drawingml/2006/diagram" xmlns:a="http://schemas.openxmlformats.org/drawingml/2006/main">
+  <dgm:ptLst>
+    <dgm:pt modelId="{959A77CF-1DC2-47C9-B3FB-40CF24E2DCC4}" type="doc">
+      <dgm:prSet loTypeId="urn:microsoft.com/office/officeart/2005/8/layout/process1" loCatId="process" qsTypeId="urn:microsoft.com/office/officeart/2005/8/quickstyle/simple5" qsCatId="simple" csTypeId="urn:microsoft.com/office/officeart/2005/8/colors/accent1_2" csCatId="accent1" phldr="1"/>
+      <dgm:spPr/>
+    </dgm:pt>
+    <dgm:pt modelId="{A7034632-05B9-4A12-AFE0-9781C5E36ACD}">
+      <dgm:prSet phldrT="[Text]"/>
+      <dgm:spPr/>
+      <dgm:t>
+        <a:bodyPr/>
+        <a:lstStyle/>
+        <a:p>
+          <a:r>
+            <a:rPr lang="en-US" dirty="0"/>
+            <a:t>Multispectral Image Directory</a:t>
+          </a:r>
+        </a:p>
+      </dgm:t>
+    </dgm:pt>
+    <dgm:pt modelId="{72A80159-344A-42B4-B843-0D86E5FB74D1}" type="parTrans" cxnId="{D15C913B-F4BA-4323-BF7B-D110EA8C09AF}">
+      <dgm:prSet/>
+      <dgm:spPr/>
+      <dgm:t>
+        <a:bodyPr/>
+        <a:lstStyle/>
+        <a:p>
+          <a:endParaRPr lang="en-US"/>
+        </a:p>
+      </dgm:t>
+    </dgm:pt>
+    <dgm:pt modelId="{AAB73A28-CA1A-435E-B027-FFA19B2AF413}" type="sibTrans" cxnId="{D15C913B-F4BA-4323-BF7B-D110EA8C09AF}">
+      <dgm:prSet/>
+      <dgm:spPr/>
+      <dgm:t>
+        <a:bodyPr/>
+        <a:lstStyle/>
+        <a:p>
+          <a:endParaRPr lang="en-US"/>
+        </a:p>
+      </dgm:t>
+    </dgm:pt>
+    <dgm:pt modelId="{2B227131-361E-4B86-AABB-DB05FEE2BEB2}">
+      <dgm:prSet phldrT="[Text]"/>
+      <dgm:spPr/>
+      <dgm:t>
+        <a:bodyPr/>
+        <a:lstStyle/>
+        <a:p>
+          <a:r>
+            <a:rPr lang="en-US" dirty="0"/>
+            <a:t>Segment (K-means, Mean Shift, etc.)</a:t>
+          </a:r>
+        </a:p>
+      </dgm:t>
+    </dgm:pt>
+    <dgm:pt modelId="{128E75E2-B37A-4EE4-B43B-263FE020A82B}" type="parTrans" cxnId="{EA39CB42-259F-42AA-B556-8F0CE4070DEF}">
+      <dgm:prSet/>
+      <dgm:spPr/>
+      <dgm:t>
+        <a:bodyPr/>
+        <a:lstStyle/>
+        <a:p>
+          <a:endParaRPr lang="en-US"/>
+        </a:p>
+      </dgm:t>
+    </dgm:pt>
+    <dgm:pt modelId="{DC99A0A4-4513-4114-8352-DDF2E1F106F2}" type="sibTrans" cxnId="{EA39CB42-259F-42AA-B556-8F0CE4070DEF}">
+      <dgm:prSet/>
+      <dgm:spPr/>
+      <dgm:t>
+        <a:bodyPr/>
+        <a:lstStyle/>
+        <a:p>
+          <a:endParaRPr lang="en-US"/>
+        </a:p>
+      </dgm:t>
+    </dgm:pt>
+    <dgm:pt modelId="{A0788EB1-9749-474C-BC83-EE1B97B162B4}">
+      <dgm:prSet phldrT="[Text]"/>
+      <dgm:spPr/>
+      <dgm:t>
+        <a:bodyPr/>
+        <a:lstStyle/>
+        <a:p>
+          <a:r>
+            <a:rPr lang="en-US" dirty="0"/>
+            <a:t>Interpret RGB Image from Multispectral</a:t>
+          </a:r>
+        </a:p>
+      </dgm:t>
+    </dgm:pt>
+    <dgm:pt modelId="{170DCCEF-BF3A-4275-BA33-1FE032CC01C8}" type="parTrans" cxnId="{E81988D1-8FBD-4C54-981B-6C6F93FC18D2}">
+      <dgm:prSet/>
+      <dgm:spPr/>
+      <dgm:t>
+        <a:bodyPr/>
+        <a:lstStyle/>
+        <a:p>
+          <a:endParaRPr lang="en-US"/>
+        </a:p>
+      </dgm:t>
+    </dgm:pt>
+    <dgm:pt modelId="{EB99C3BD-AA0E-4D1C-9BB7-9B3BCD03CCD9}" type="sibTrans" cxnId="{E81988D1-8FBD-4C54-981B-6C6F93FC18D2}">
+      <dgm:prSet/>
+      <dgm:spPr/>
+      <dgm:t>
+        <a:bodyPr/>
+        <a:lstStyle/>
+        <a:p>
+          <a:endParaRPr lang="en-US"/>
+        </a:p>
+      </dgm:t>
+    </dgm:pt>
+    <dgm:pt modelId="{4C24307F-6040-471C-8BF7-F5D15731C6DE}">
+      <dgm:prSet phldrT="[Text]"/>
+      <dgm:spPr/>
+      <dgm:t>
+        <a:bodyPr/>
+        <a:lstStyle/>
+        <a:p>
+          <a:r>
+            <a:rPr lang="en-US" dirty="0"/>
+            <a:t>Color Segments Based from Labels</a:t>
+          </a:r>
+        </a:p>
+      </dgm:t>
+    </dgm:pt>
+    <dgm:pt modelId="{54641548-C013-4605-A2C4-6C4B87D9A842}" type="parTrans" cxnId="{B3C69A4C-5302-4162-A284-3C3FDDA77C3A}">
+      <dgm:prSet/>
+      <dgm:spPr/>
+      <dgm:t>
+        <a:bodyPr/>
+        <a:lstStyle/>
+        <a:p>
+          <a:endParaRPr lang="en-US"/>
+        </a:p>
+      </dgm:t>
+    </dgm:pt>
+    <dgm:pt modelId="{B19B1BEC-4EBD-40A2-A3E8-F89E7BF352CC}" type="sibTrans" cxnId="{B3C69A4C-5302-4162-A284-3C3FDDA77C3A}">
+      <dgm:prSet/>
+      <dgm:spPr/>
+      <dgm:t>
+        <a:bodyPr/>
+        <a:lstStyle/>
+        <a:p>
+          <a:endParaRPr lang="en-US"/>
+        </a:p>
+      </dgm:t>
+    </dgm:pt>
+    <dgm:pt modelId="{E16ED38E-4345-4117-8364-017DEF6D385A}">
+      <dgm:prSet phldrT="[Text]"/>
+      <dgm:spPr/>
+      <dgm:t>
+        <a:bodyPr/>
+        <a:lstStyle/>
+        <a:p>
+          <a:r>
+            <a:rPr lang="en-US"/>
+            <a:t>Merge Channels</a:t>
+          </a:r>
+          <a:endParaRPr lang="en-US" dirty="0"/>
+        </a:p>
+      </dgm:t>
+    </dgm:pt>
+    <dgm:pt modelId="{E3D491B7-1726-49F9-A4A1-7036B4FF0DD4}" type="parTrans" cxnId="{5A5E98B5-0C0C-41A6-9874-794E6D31718C}">
+      <dgm:prSet/>
+      <dgm:spPr/>
+      <dgm:t>
+        <a:bodyPr/>
+        <a:lstStyle/>
+        <a:p>
+          <a:endParaRPr lang="en-US"/>
+        </a:p>
+      </dgm:t>
+    </dgm:pt>
+    <dgm:pt modelId="{4BE46C63-49D8-465B-B666-1A3DF165F8B9}" type="sibTrans" cxnId="{5A5E98B5-0C0C-41A6-9874-794E6D31718C}">
+      <dgm:prSet/>
+      <dgm:spPr/>
+      <dgm:t>
+        <a:bodyPr/>
+        <a:lstStyle/>
+        <a:p>
+          <a:endParaRPr lang="en-US"/>
+        </a:p>
+      </dgm:t>
+    </dgm:pt>
+    <dgm:pt modelId="{3D8F15F3-0191-4E63-80A9-8A22C89269A0}">
+      <dgm:prSet phldrT="[Text]"/>
+      <dgm:spPr/>
+      <dgm:t>
+        <a:bodyPr/>
+        <a:lstStyle/>
+        <a:p>
+          <a:r>
+            <a:rPr lang="en-US" dirty="0"/>
+            <a:t>PCA ?</a:t>
+          </a:r>
+        </a:p>
+      </dgm:t>
+    </dgm:pt>
+    <dgm:pt modelId="{663F048B-C466-4B19-A996-EC59DA8831AE}" type="parTrans" cxnId="{CFB36CC9-DDAA-4812-87B8-2D27D4BE434D}">
+      <dgm:prSet/>
+      <dgm:spPr/>
+      <dgm:t>
+        <a:bodyPr/>
+        <a:lstStyle/>
+        <a:p>
+          <a:endParaRPr lang="en-US"/>
+        </a:p>
+      </dgm:t>
+    </dgm:pt>
+    <dgm:pt modelId="{6E36E383-D71A-4DE0-8C8C-B08830C21E8C}" type="sibTrans" cxnId="{CFB36CC9-DDAA-4812-87B8-2D27D4BE434D}">
+      <dgm:prSet/>
+      <dgm:spPr/>
+      <dgm:t>
+        <a:bodyPr/>
+        <a:lstStyle/>
+        <a:p>
+          <a:endParaRPr lang="en-US"/>
+        </a:p>
+      </dgm:t>
+    </dgm:pt>
+    <dgm:pt modelId="{F6AAF999-9AD2-428D-8BDC-62ABF6D26FFC}" type="pres">
+      <dgm:prSet presAssocID="{959A77CF-1DC2-47C9-B3FB-40CF24E2DCC4}" presName="Name0" presStyleCnt="0">
+        <dgm:presLayoutVars>
+          <dgm:dir/>
+          <dgm:resizeHandles val="exact"/>
+        </dgm:presLayoutVars>
+      </dgm:prSet>
+      <dgm:spPr/>
+    </dgm:pt>
+    <dgm:pt modelId="{19AE38CA-00CB-4316-A116-3873EDDD4FAF}" type="pres">
+      <dgm:prSet presAssocID="{A7034632-05B9-4A12-AFE0-9781C5E36ACD}" presName="node" presStyleLbl="node1" presStyleIdx="0" presStyleCnt="6">
+        <dgm:presLayoutVars>
+          <dgm:bulletEnabled val="1"/>
+        </dgm:presLayoutVars>
+      </dgm:prSet>
+      <dgm:spPr/>
+    </dgm:pt>
+    <dgm:pt modelId="{EA5F3925-1541-4332-A030-31B4259F97CC}" type="pres">
+      <dgm:prSet presAssocID="{AAB73A28-CA1A-435E-B027-FFA19B2AF413}" presName="sibTrans" presStyleLbl="sibTrans2D1" presStyleIdx="0" presStyleCnt="5"/>
+      <dgm:spPr/>
+    </dgm:pt>
+    <dgm:pt modelId="{1E31ED75-44EA-45D5-9C5F-9AAFDCC25043}" type="pres">
+      <dgm:prSet presAssocID="{AAB73A28-CA1A-435E-B027-FFA19B2AF413}" presName="connectorText" presStyleLbl="sibTrans2D1" presStyleIdx="0" presStyleCnt="5"/>
+      <dgm:spPr/>
+    </dgm:pt>
+    <dgm:pt modelId="{F198B279-D523-44C2-9FCC-C556D8F2D904}" type="pres">
+      <dgm:prSet presAssocID="{E16ED38E-4345-4117-8364-017DEF6D385A}" presName="node" presStyleLbl="node1" presStyleIdx="1" presStyleCnt="6">
+        <dgm:presLayoutVars>
+          <dgm:bulletEnabled val="1"/>
+        </dgm:presLayoutVars>
+      </dgm:prSet>
+      <dgm:spPr/>
+    </dgm:pt>
+    <dgm:pt modelId="{1F6593DD-96A7-49EF-8E21-5179CE022EE4}" type="pres">
+      <dgm:prSet presAssocID="{4BE46C63-49D8-465B-B666-1A3DF165F8B9}" presName="sibTrans" presStyleLbl="sibTrans2D1" presStyleIdx="1" presStyleCnt="5"/>
+      <dgm:spPr/>
+    </dgm:pt>
+    <dgm:pt modelId="{34933C34-E21A-472A-B7ED-D4D3F1218475}" type="pres">
+      <dgm:prSet presAssocID="{4BE46C63-49D8-465B-B666-1A3DF165F8B9}" presName="connectorText" presStyleLbl="sibTrans2D1" presStyleIdx="1" presStyleCnt="5"/>
+      <dgm:spPr/>
+    </dgm:pt>
+    <dgm:pt modelId="{97C130C5-91EA-4B43-9A5C-1C2ABEA7F697}" type="pres">
+      <dgm:prSet presAssocID="{2B227131-361E-4B86-AABB-DB05FEE2BEB2}" presName="node" presStyleLbl="node1" presStyleIdx="2" presStyleCnt="6">
+        <dgm:presLayoutVars>
+          <dgm:bulletEnabled val="1"/>
+        </dgm:presLayoutVars>
+      </dgm:prSet>
+      <dgm:spPr/>
+    </dgm:pt>
+    <dgm:pt modelId="{9C25FC62-51D7-4C18-AE07-BFE8CC2105D0}" type="pres">
+      <dgm:prSet presAssocID="{DC99A0A4-4513-4114-8352-DDF2E1F106F2}" presName="sibTrans" presStyleLbl="sibTrans2D1" presStyleIdx="2" presStyleCnt="5"/>
+      <dgm:spPr/>
+    </dgm:pt>
+    <dgm:pt modelId="{4D6D0119-E9BA-4D00-BA43-9215A6CE414A}" type="pres">
+      <dgm:prSet presAssocID="{DC99A0A4-4513-4114-8352-DDF2E1F106F2}" presName="connectorText" presStyleLbl="sibTrans2D1" presStyleIdx="2" presStyleCnt="5"/>
+      <dgm:spPr/>
+    </dgm:pt>
+    <dgm:pt modelId="{2676133C-56C1-41A8-85B2-4802CCD2D2FF}" type="pres">
+      <dgm:prSet presAssocID="{3D8F15F3-0191-4E63-80A9-8A22C89269A0}" presName="node" presStyleLbl="node1" presStyleIdx="3" presStyleCnt="6">
+        <dgm:presLayoutVars>
+          <dgm:bulletEnabled val="1"/>
+        </dgm:presLayoutVars>
+      </dgm:prSet>
+      <dgm:spPr/>
+    </dgm:pt>
+    <dgm:pt modelId="{E03B28B5-6B07-4BDF-B1B4-6937B85F9470}" type="pres">
+      <dgm:prSet presAssocID="{6E36E383-D71A-4DE0-8C8C-B08830C21E8C}" presName="sibTrans" presStyleLbl="sibTrans2D1" presStyleIdx="3" presStyleCnt="5"/>
+      <dgm:spPr/>
+    </dgm:pt>
+    <dgm:pt modelId="{1321B1F1-E503-41B4-B77C-0C4EE93C01A7}" type="pres">
+      <dgm:prSet presAssocID="{6E36E383-D71A-4DE0-8C8C-B08830C21E8C}" presName="connectorText" presStyleLbl="sibTrans2D1" presStyleIdx="3" presStyleCnt="5"/>
+      <dgm:spPr/>
+    </dgm:pt>
+    <dgm:pt modelId="{743AFEF7-DD53-47AF-A4E4-737632D4FABD}" type="pres">
+      <dgm:prSet presAssocID="{A0788EB1-9749-474C-BC83-EE1B97B162B4}" presName="node" presStyleLbl="node1" presStyleIdx="4" presStyleCnt="6">
+        <dgm:presLayoutVars>
+          <dgm:bulletEnabled val="1"/>
+        </dgm:presLayoutVars>
+      </dgm:prSet>
+      <dgm:spPr/>
+    </dgm:pt>
+    <dgm:pt modelId="{A63D60B0-5CBA-45C6-AC94-C0D379BE740B}" type="pres">
+      <dgm:prSet presAssocID="{EB99C3BD-AA0E-4D1C-9BB7-9B3BCD03CCD9}" presName="sibTrans" presStyleLbl="sibTrans2D1" presStyleIdx="4" presStyleCnt="5"/>
+      <dgm:spPr/>
+    </dgm:pt>
+    <dgm:pt modelId="{FCA0DC61-1ECC-4D53-802D-B9C2BB410DD1}" type="pres">
+      <dgm:prSet presAssocID="{EB99C3BD-AA0E-4D1C-9BB7-9B3BCD03CCD9}" presName="connectorText" presStyleLbl="sibTrans2D1" presStyleIdx="4" presStyleCnt="5"/>
+      <dgm:spPr/>
+    </dgm:pt>
+    <dgm:pt modelId="{1FEDB56D-50DA-4C97-B119-82CB0F7F6F83}" type="pres">
+      <dgm:prSet presAssocID="{4C24307F-6040-471C-8BF7-F5D15731C6DE}" presName="node" presStyleLbl="node1" presStyleIdx="5" presStyleCnt="6">
+        <dgm:presLayoutVars>
+          <dgm:bulletEnabled val="1"/>
+        </dgm:presLayoutVars>
+      </dgm:prSet>
+      <dgm:spPr/>
+    </dgm:pt>
+  </dgm:ptLst>
+  <dgm:cxnLst>
+    <dgm:cxn modelId="{3B2A7D12-65AB-4EDA-91D1-27C8054443CE}" type="presOf" srcId="{4C24307F-6040-471C-8BF7-F5D15731C6DE}" destId="{1FEDB56D-50DA-4C97-B119-82CB0F7F6F83}" srcOrd="0" destOrd="0" presId="urn:microsoft.com/office/officeart/2005/8/layout/process1"/>
+    <dgm:cxn modelId="{46EFD024-BAAC-4FD6-9725-B2BD15C0CFFA}" type="presOf" srcId="{DC99A0A4-4513-4114-8352-DDF2E1F106F2}" destId="{9C25FC62-51D7-4C18-AE07-BFE8CC2105D0}" srcOrd="0" destOrd="0" presId="urn:microsoft.com/office/officeart/2005/8/layout/process1"/>
+    <dgm:cxn modelId="{45586B29-146F-49D4-9C29-2D4D80F8D3D2}" type="presOf" srcId="{4BE46C63-49D8-465B-B666-1A3DF165F8B9}" destId="{1F6593DD-96A7-49EF-8E21-5179CE022EE4}" srcOrd="0" destOrd="0" presId="urn:microsoft.com/office/officeart/2005/8/layout/process1"/>
+    <dgm:cxn modelId="{E040AD2A-FF6D-42D9-90A6-D00760B5E650}" type="presOf" srcId="{EB99C3BD-AA0E-4D1C-9BB7-9B3BCD03CCD9}" destId="{FCA0DC61-1ECC-4D53-802D-B9C2BB410DD1}" srcOrd="1" destOrd="0" presId="urn:microsoft.com/office/officeart/2005/8/layout/process1"/>
+    <dgm:cxn modelId="{D15C913B-F4BA-4323-BF7B-D110EA8C09AF}" srcId="{959A77CF-1DC2-47C9-B3FB-40CF24E2DCC4}" destId="{A7034632-05B9-4A12-AFE0-9781C5E36ACD}" srcOrd="0" destOrd="0" parTransId="{72A80159-344A-42B4-B843-0D86E5FB74D1}" sibTransId="{AAB73A28-CA1A-435E-B027-FFA19B2AF413}"/>
+    <dgm:cxn modelId="{EA39CB42-259F-42AA-B556-8F0CE4070DEF}" srcId="{959A77CF-1DC2-47C9-B3FB-40CF24E2DCC4}" destId="{2B227131-361E-4B86-AABB-DB05FEE2BEB2}" srcOrd="2" destOrd="0" parTransId="{128E75E2-B37A-4EE4-B43B-263FE020A82B}" sibTransId="{DC99A0A4-4513-4114-8352-DDF2E1F106F2}"/>
+    <dgm:cxn modelId="{B1816649-1F52-4E03-8252-2C664A0FD3AD}" type="presOf" srcId="{EB99C3BD-AA0E-4D1C-9BB7-9B3BCD03CCD9}" destId="{A63D60B0-5CBA-45C6-AC94-C0D379BE740B}" srcOrd="0" destOrd="0" presId="urn:microsoft.com/office/officeart/2005/8/layout/process1"/>
+    <dgm:cxn modelId="{B3C69A4C-5302-4162-A284-3C3FDDA77C3A}" srcId="{959A77CF-1DC2-47C9-B3FB-40CF24E2DCC4}" destId="{4C24307F-6040-471C-8BF7-F5D15731C6DE}" srcOrd="5" destOrd="0" parTransId="{54641548-C013-4605-A2C4-6C4B87D9A842}" sibTransId="{B19B1BEC-4EBD-40A2-A3E8-F89E7BF352CC}"/>
+    <dgm:cxn modelId="{941F6776-117C-4DE8-BC12-1707194485C0}" type="presOf" srcId="{A7034632-05B9-4A12-AFE0-9781C5E36ACD}" destId="{19AE38CA-00CB-4316-A116-3873EDDD4FAF}" srcOrd="0" destOrd="0" presId="urn:microsoft.com/office/officeart/2005/8/layout/process1"/>
+    <dgm:cxn modelId="{A79E7E78-1752-479B-8F91-BAF169A8981D}" type="presOf" srcId="{959A77CF-1DC2-47C9-B3FB-40CF24E2DCC4}" destId="{F6AAF999-9AD2-428D-8BDC-62ABF6D26FFC}" srcOrd="0" destOrd="0" presId="urn:microsoft.com/office/officeart/2005/8/layout/process1"/>
+    <dgm:cxn modelId="{FD292859-0882-4EC1-9BA3-94C830358B5A}" type="presOf" srcId="{2B227131-361E-4B86-AABB-DB05FEE2BEB2}" destId="{97C130C5-91EA-4B43-9A5C-1C2ABEA7F697}" srcOrd="0" destOrd="0" presId="urn:microsoft.com/office/officeart/2005/8/layout/process1"/>
+    <dgm:cxn modelId="{61C9CDA5-21E8-4B4A-8F3B-D0F288A09E03}" type="presOf" srcId="{AAB73A28-CA1A-435E-B027-FFA19B2AF413}" destId="{EA5F3925-1541-4332-A030-31B4259F97CC}" srcOrd="0" destOrd="0" presId="urn:microsoft.com/office/officeart/2005/8/layout/process1"/>
+    <dgm:cxn modelId="{6EB829B1-5AC3-4EDA-853D-372FA5CAC956}" type="presOf" srcId="{4BE46C63-49D8-465B-B666-1A3DF165F8B9}" destId="{34933C34-E21A-472A-B7ED-D4D3F1218475}" srcOrd="1" destOrd="0" presId="urn:microsoft.com/office/officeart/2005/8/layout/process1"/>
+    <dgm:cxn modelId="{5A5E98B5-0C0C-41A6-9874-794E6D31718C}" srcId="{959A77CF-1DC2-47C9-B3FB-40CF24E2DCC4}" destId="{E16ED38E-4345-4117-8364-017DEF6D385A}" srcOrd="1" destOrd="0" parTransId="{E3D491B7-1726-49F9-A4A1-7036B4FF0DD4}" sibTransId="{4BE46C63-49D8-465B-B666-1A3DF165F8B9}"/>
+    <dgm:cxn modelId="{658FB1B6-F17A-40A9-8FD9-946A07E5AFDF}" type="presOf" srcId="{E16ED38E-4345-4117-8364-017DEF6D385A}" destId="{F198B279-D523-44C2-9FCC-C556D8F2D904}" srcOrd="0" destOrd="0" presId="urn:microsoft.com/office/officeart/2005/8/layout/process1"/>
+    <dgm:cxn modelId="{B9E6A6BC-7E88-4C6F-AA30-75E5F32CD5B0}" type="presOf" srcId="{3D8F15F3-0191-4E63-80A9-8A22C89269A0}" destId="{2676133C-56C1-41A8-85B2-4802CCD2D2FF}" srcOrd="0" destOrd="0" presId="urn:microsoft.com/office/officeart/2005/8/layout/process1"/>
+    <dgm:cxn modelId="{CFB36CC9-DDAA-4812-87B8-2D27D4BE434D}" srcId="{959A77CF-1DC2-47C9-B3FB-40CF24E2DCC4}" destId="{3D8F15F3-0191-4E63-80A9-8A22C89269A0}" srcOrd="3" destOrd="0" parTransId="{663F048B-C466-4B19-A996-EC59DA8831AE}" sibTransId="{6E36E383-D71A-4DE0-8C8C-B08830C21E8C}"/>
+    <dgm:cxn modelId="{E81988D1-8FBD-4C54-981B-6C6F93FC18D2}" srcId="{959A77CF-1DC2-47C9-B3FB-40CF24E2DCC4}" destId="{A0788EB1-9749-474C-BC83-EE1B97B162B4}" srcOrd="4" destOrd="0" parTransId="{170DCCEF-BF3A-4275-BA33-1FE032CC01C8}" sibTransId="{EB99C3BD-AA0E-4D1C-9BB7-9B3BCD03CCD9}"/>
+    <dgm:cxn modelId="{5D96F0D4-227D-402A-87BA-F8C90144D9FA}" type="presOf" srcId="{6E36E383-D71A-4DE0-8C8C-B08830C21E8C}" destId="{1321B1F1-E503-41B4-B77C-0C4EE93C01A7}" srcOrd="1" destOrd="0" presId="urn:microsoft.com/office/officeart/2005/8/layout/process1"/>
+    <dgm:cxn modelId="{2BA670DA-245E-48CC-908A-323FA093B327}" type="presOf" srcId="{6E36E383-D71A-4DE0-8C8C-B08830C21E8C}" destId="{E03B28B5-6B07-4BDF-B1B4-6937B85F9470}" srcOrd="0" destOrd="0" presId="urn:microsoft.com/office/officeart/2005/8/layout/process1"/>
+    <dgm:cxn modelId="{94180EE4-532A-4AE0-9576-D41E2400EFBC}" type="presOf" srcId="{A0788EB1-9749-474C-BC83-EE1B97B162B4}" destId="{743AFEF7-DD53-47AF-A4E4-737632D4FABD}" srcOrd="0" destOrd="0" presId="urn:microsoft.com/office/officeart/2005/8/layout/process1"/>
+    <dgm:cxn modelId="{E41E0FE7-EB5A-4E39-9FEB-1C240C448723}" type="presOf" srcId="{DC99A0A4-4513-4114-8352-DDF2E1F106F2}" destId="{4D6D0119-E9BA-4D00-BA43-9215A6CE414A}" srcOrd="1" destOrd="0" presId="urn:microsoft.com/office/officeart/2005/8/layout/process1"/>
+    <dgm:cxn modelId="{23D551FF-97CE-4C87-8CC8-EC4331F72B75}" type="presOf" srcId="{AAB73A28-CA1A-435E-B027-FFA19B2AF413}" destId="{1E31ED75-44EA-45D5-9C5F-9AAFDCC25043}" srcOrd="1" destOrd="0" presId="urn:microsoft.com/office/officeart/2005/8/layout/process1"/>
+    <dgm:cxn modelId="{D4950F51-5191-43C6-8CC8-A5BB4BA4C174}" type="presParOf" srcId="{F6AAF999-9AD2-428D-8BDC-62ABF6D26FFC}" destId="{19AE38CA-00CB-4316-A116-3873EDDD4FAF}" srcOrd="0" destOrd="0" presId="urn:microsoft.com/office/officeart/2005/8/layout/process1"/>
+    <dgm:cxn modelId="{CF6BF853-D8A8-49A1-A415-5BBA0A025925}" type="presParOf" srcId="{F6AAF999-9AD2-428D-8BDC-62ABF6D26FFC}" destId="{EA5F3925-1541-4332-A030-31B4259F97CC}" srcOrd="1" destOrd="0" presId="urn:microsoft.com/office/officeart/2005/8/layout/process1"/>
+    <dgm:cxn modelId="{552E1F96-076A-418E-A504-C57CB464FB94}" type="presParOf" srcId="{EA5F3925-1541-4332-A030-31B4259F97CC}" destId="{1E31ED75-44EA-45D5-9C5F-9AAFDCC25043}" srcOrd="0" destOrd="0" presId="urn:microsoft.com/office/officeart/2005/8/layout/process1"/>
+    <dgm:cxn modelId="{4CB4D126-52AE-4FC6-9A95-77DD33BB50F7}" type="presParOf" srcId="{F6AAF999-9AD2-428D-8BDC-62ABF6D26FFC}" destId="{F198B279-D523-44C2-9FCC-C556D8F2D904}" srcOrd="2" destOrd="0" presId="urn:microsoft.com/office/officeart/2005/8/layout/process1"/>
+    <dgm:cxn modelId="{766BA409-EA0B-4A51-9EDE-F55A89553833}" type="presParOf" srcId="{F6AAF999-9AD2-428D-8BDC-62ABF6D26FFC}" destId="{1F6593DD-96A7-49EF-8E21-5179CE022EE4}" srcOrd="3" destOrd="0" presId="urn:microsoft.com/office/officeart/2005/8/layout/process1"/>
+    <dgm:cxn modelId="{444DEB14-764C-4CBE-99D9-C34D3CA7456E}" type="presParOf" srcId="{1F6593DD-96A7-49EF-8E21-5179CE022EE4}" destId="{34933C34-E21A-472A-B7ED-D4D3F1218475}" srcOrd="0" destOrd="0" presId="urn:microsoft.com/office/officeart/2005/8/layout/process1"/>
+    <dgm:cxn modelId="{8AFA9198-8144-453B-AEBD-B99D4383505A}" type="presParOf" srcId="{F6AAF999-9AD2-428D-8BDC-62ABF6D26FFC}" destId="{97C130C5-91EA-4B43-9A5C-1C2ABEA7F697}" srcOrd="4" destOrd="0" presId="urn:microsoft.com/office/officeart/2005/8/layout/process1"/>
+    <dgm:cxn modelId="{EAEF36BC-F155-4226-8B26-86724A4DD5DC}" type="presParOf" srcId="{F6AAF999-9AD2-428D-8BDC-62ABF6D26FFC}" destId="{9C25FC62-51D7-4C18-AE07-BFE8CC2105D0}" srcOrd="5" destOrd="0" presId="urn:microsoft.com/office/officeart/2005/8/layout/process1"/>
+    <dgm:cxn modelId="{E0723538-6107-443C-B3BC-A00777B76BB2}" type="presParOf" srcId="{9C25FC62-51D7-4C18-AE07-BFE8CC2105D0}" destId="{4D6D0119-E9BA-4D00-BA43-9215A6CE414A}" srcOrd="0" destOrd="0" presId="urn:microsoft.com/office/officeart/2005/8/layout/process1"/>
+    <dgm:cxn modelId="{9D858B0C-B985-4643-A0DB-A8189757F4DA}" type="presParOf" srcId="{F6AAF999-9AD2-428D-8BDC-62ABF6D26FFC}" destId="{2676133C-56C1-41A8-85B2-4802CCD2D2FF}" srcOrd="6" destOrd="0" presId="urn:microsoft.com/office/officeart/2005/8/layout/process1"/>
+    <dgm:cxn modelId="{1B7CE074-E27A-4521-875C-FED474B7A1D9}" type="presParOf" srcId="{F6AAF999-9AD2-428D-8BDC-62ABF6D26FFC}" destId="{E03B28B5-6B07-4BDF-B1B4-6937B85F9470}" srcOrd="7" destOrd="0" presId="urn:microsoft.com/office/officeart/2005/8/layout/process1"/>
+    <dgm:cxn modelId="{F284D8F8-B72D-44B8-8C73-0D5C457291BC}" type="presParOf" srcId="{E03B28B5-6B07-4BDF-B1B4-6937B85F9470}" destId="{1321B1F1-E503-41B4-B77C-0C4EE93C01A7}" srcOrd="0" destOrd="0" presId="urn:microsoft.com/office/officeart/2005/8/layout/process1"/>
+    <dgm:cxn modelId="{DC5E2E58-40EF-414E-B568-CB59AE6653B2}" type="presParOf" srcId="{F6AAF999-9AD2-428D-8BDC-62ABF6D26FFC}" destId="{743AFEF7-DD53-47AF-A4E4-737632D4FABD}" srcOrd="8" destOrd="0" presId="urn:microsoft.com/office/officeart/2005/8/layout/process1"/>
+    <dgm:cxn modelId="{8A2E101C-9B31-40F7-8464-53CBCD504704}" type="presParOf" srcId="{F6AAF999-9AD2-428D-8BDC-62ABF6D26FFC}" destId="{A63D60B0-5CBA-45C6-AC94-C0D379BE740B}" srcOrd="9" destOrd="0" presId="urn:microsoft.com/office/officeart/2005/8/layout/process1"/>
+    <dgm:cxn modelId="{39A2F4C3-CCF4-4B4D-9846-ABA0AD239F70}" type="presParOf" srcId="{A63D60B0-5CBA-45C6-AC94-C0D379BE740B}" destId="{FCA0DC61-1ECC-4D53-802D-B9C2BB410DD1}" srcOrd="0" destOrd="0" presId="urn:microsoft.com/office/officeart/2005/8/layout/process1"/>
+    <dgm:cxn modelId="{844B3D51-137C-4D7C-ADF5-FDCDC973E73C}" type="presParOf" srcId="{F6AAF999-9AD2-428D-8BDC-62ABF6D26FFC}" destId="{1FEDB56D-50DA-4C97-B119-82CB0F7F6F83}" srcOrd="10" destOrd="0" presId="urn:microsoft.com/office/officeart/2005/8/layout/process1"/>
+  </dgm:cxnLst>
+  <dgm:bg/>
+  <dgm:whole/>
+  <dgm:extLst>
+    <a:ext uri="http://schemas.microsoft.com/office/drawing/2008/diagram">
+      <dsp:dataModelExt xmlns:dsp="http://schemas.microsoft.com/office/drawing/2008/diagram" relId="rId6" minVer="http://schemas.openxmlformats.org/drawingml/2006/diagram"/>
+    </a:ext>
+  </dgm:extLst>
+</dgm:dataModel>
+</file>
+
+<file path=ppt/diagrams/drawing1.xml><?xml version="1.0" encoding="utf-8"?>
+<dsp:drawing xmlns:dgm="http://schemas.openxmlformats.org/drawingml/2006/diagram" xmlns:dsp="http://schemas.microsoft.com/office/drawing/2008/diagram" xmlns:a="http://schemas.openxmlformats.org/drawingml/2006/main">
+  <dsp:spTree>
+    <dsp:nvGrpSpPr>
+      <dsp:cNvPr id="0" name=""/>
+      <dsp:cNvGrpSpPr/>
+    </dsp:nvGrpSpPr>
+    <dsp:grpSpPr/>
+    <dsp:sp modelId="{19AE38CA-00CB-4316-A116-3873EDDD4FAF}">
+      <dsp:nvSpPr>
+        <dsp:cNvPr id="0" name=""/>
+        <dsp:cNvSpPr/>
+      </dsp:nvSpPr>
+      <dsp:spPr>
+        <a:xfrm>
+          <a:off x="0" y="1827442"/>
+          <a:ext cx="966354" cy="742885"/>
+        </a:xfrm>
+        <a:prstGeom prst="roundRect">
+          <a:avLst>
+            <a:gd name="adj" fmla="val 10000"/>
+          </a:avLst>
+        </a:prstGeom>
+        <a:gradFill rotWithShape="0">
+          <a:gsLst>
+            <a:gs pos="0">
+              <a:schemeClr val="accent1">
+                <a:hueOff val="0"/>
+                <a:satOff val="0"/>
+                <a:lumOff val="0"/>
+                <a:alphaOff val="0"/>
+                <a:tint val="100000"/>
+                <a:shade val="100000"/>
+                <a:satMod val="130000"/>
+              </a:schemeClr>
+            </a:gs>
+            <a:gs pos="100000">
+              <a:schemeClr val="accent1">
+                <a:hueOff val="0"/>
+                <a:satOff val="0"/>
+                <a:lumOff val="0"/>
+                <a:alphaOff val="0"/>
+                <a:tint val="50000"/>
+                <a:shade val="100000"/>
+                <a:satMod val="350000"/>
+              </a:schemeClr>
+            </a:gs>
+          </a:gsLst>
+          <a:lin ang="16200000" scaled="0"/>
+        </a:gradFill>
+        <a:ln>
+          <a:noFill/>
+        </a:ln>
+        <a:effectLst>
+          <a:outerShdw blurRad="40000" dist="23000" dir="5400000" rotWithShape="0">
+            <a:srgbClr val="000000">
+              <a:alpha val="35000"/>
+            </a:srgbClr>
+          </a:outerShdw>
+        </a:effectLst>
+        <a:scene3d>
+          <a:camera prst="orthographicFront">
+            <a:rot lat="0" lon="0" rev="0"/>
+          </a:camera>
+          <a:lightRig rig="threePt" dir="t">
+            <a:rot lat="0" lon="0" rev="1200000"/>
+          </a:lightRig>
+        </a:scene3d>
+        <a:sp3d>
+          <a:bevelT w="63500" h="25400"/>
+        </a:sp3d>
+      </dsp:spPr>
+      <dsp:style>
+        <a:lnRef idx="0">
+          <a:scrgbClr r="0" g="0" b="0"/>
+        </a:lnRef>
+        <a:fillRef idx="3">
+          <a:scrgbClr r="0" g="0" b="0"/>
+        </a:fillRef>
+        <a:effectRef idx="3">
+          <a:scrgbClr r="0" g="0" b="0"/>
+        </a:effectRef>
+        <a:fontRef idx="minor">
+          <a:schemeClr val="lt1"/>
+        </a:fontRef>
+      </dsp:style>
+      <dsp:txBody>
+        <a:bodyPr spcFirstLastPara="0" vert="horz" wrap="square" lIns="41910" tIns="41910" rIns="41910" bIns="41910" numCol="1" spcCol="1270" anchor="ctr" anchorCtr="0">
+          <a:noAutofit/>
+        </a:bodyPr>
+        <a:lstStyle/>
+        <a:p>
+          <a:pPr marL="0" lvl="0" indent="0" algn="ctr" defTabSz="488950">
+            <a:lnSpc>
+              <a:spcPct val="90000"/>
+            </a:lnSpc>
+            <a:spcBef>
+              <a:spcPct val="0"/>
+            </a:spcBef>
+            <a:spcAft>
+              <a:spcPct val="35000"/>
+            </a:spcAft>
+            <a:buNone/>
+          </a:pPr>
+          <a:r>
+            <a:rPr lang="en-US" sz="1100" kern="1200" dirty="0"/>
+            <a:t>Multispectral Image Directory</a:t>
+          </a:r>
+        </a:p>
+      </dsp:txBody>
+      <dsp:txXfrm>
+        <a:off x="21758" y="1849200"/>
+        <a:ext cx="922838" cy="699369"/>
+      </dsp:txXfrm>
+    </dsp:sp>
+    <dsp:sp modelId="{EA5F3925-1541-4332-A030-31B4259F97CC}">
+      <dsp:nvSpPr>
+        <dsp:cNvPr id="0" name=""/>
+        <dsp:cNvSpPr/>
+      </dsp:nvSpPr>
+      <dsp:spPr>
+        <a:xfrm>
+          <a:off x="1062989" y="2079057"/>
+          <a:ext cx="204867" cy="239655"/>
+        </a:xfrm>
+        <a:prstGeom prst="rightArrow">
+          <a:avLst>
+            <a:gd name="adj1" fmla="val 60000"/>
+            <a:gd name="adj2" fmla="val 50000"/>
+          </a:avLst>
+        </a:prstGeom>
+        <a:gradFill rotWithShape="0">
+          <a:gsLst>
+            <a:gs pos="0">
+              <a:schemeClr val="accent1">
+                <a:tint val="60000"/>
+                <a:hueOff val="0"/>
+                <a:satOff val="0"/>
+                <a:lumOff val="0"/>
+                <a:alphaOff val="0"/>
+                <a:tint val="100000"/>
+                <a:shade val="100000"/>
+                <a:satMod val="130000"/>
+              </a:schemeClr>
+            </a:gs>
+            <a:gs pos="100000">
+              <a:schemeClr val="accent1">
+                <a:tint val="60000"/>
+                <a:hueOff val="0"/>
+                <a:satOff val="0"/>
+                <a:lumOff val="0"/>
+                <a:alphaOff val="0"/>
+                <a:tint val="50000"/>
+                <a:shade val="100000"/>
+                <a:satMod val="350000"/>
+              </a:schemeClr>
+            </a:gs>
+          </a:gsLst>
+          <a:lin ang="16200000" scaled="0"/>
+        </a:gradFill>
+        <a:ln>
+          <a:noFill/>
+        </a:ln>
+        <a:effectLst>
+          <a:outerShdw blurRad="40000" dist="23000" dir="5400000" rotWithShape="0">
+            <a:srgbClr val="000000">
+              <a:alpha val="35000"/>
+            </a:srgbClr>
+          </a:outerShdw>
+        </a:effectLst>
+        <a:scene3d>
+          <a:camera prst="orthographicFront">
+            <a:rot lat="0" lon="0" rev="0"/>
+          </a:camera>
+          <a:lightRig rig="threePt" dir="t">
+            <a:rot lat="0" lon="0" rev="1200000"/>
+          </a:lightRig>
+        </a:scene3d>
+        <a:sp3d>
+          <a:bevelT w="63500" h="25400"/>
+        </a:sp3d>
+      </dsp:spPr>
+      <dsp:style>
+        <a:lnRef idx="0">
+          <a:scrgbClr r="0" g="0" b="0"/>
+        </a:lnRef>
+        <a:fillRef idx="3">
+          <a:scrgbClr r="0" g="0" b="0"/>
+        </a:fillRef>
+        <a:effectRef idx="3">
+          <a:scrgbClr r="0" g="0" b="0"/>
+        </a:effectRef>
+        <a:fontRef idx="minor">
+          <a:schemeClr val="lt1"/>
+        </a:fontRef>
+      </dsp:style>
+      <dsp:txBody>
+        <a:bodyPr spcFirstLastPara="0" vert="horz" wrap="square" lIns="0" tIns="0" rIns="0" bIns="0" numCol="1" spcCol="1270" anchor="ctr" anchorCtr="0">
+          <a:noAutofit/>
+        </a:bodyPr>
+        <a:lstStyle/>
+        <a:p>
+          <a:pPr marL="0" lvl="0" indent="0" algn="ctr" defTabSz="400050">
+            <a:lnSpc>
+              <a:spcPct val="90000"/>
+            </a:lnSpc>
+            <a:spcBef>
+              <a:spcPct val="0"/>
+            </a:spcBef>
+            <a:spcAft>
+              <a:spcPct val="35000"/>
+            </a:spcAft>
+            <a:buNone/>
+          </a:pPr>
+          <a:endParaRPr lang="en-US" sz="900" kern="1200"/>
+        </a:p>
+      </dsp:txBody>
+      <dsp:txXfrm>
+        <a:off x="1062989" y="2126988"/>
+        <a:ext cx="143407" cy="143793"/>
+      </dsp:txXfrm>
+    </dsp:sp>
+    <dsp:sp modelId="{F198B279-D523-44C2-9FCC-C556D8F2D904}">
+      <dsp:nvSpPr>
+        <dsp:cNvPr id="0" name=""/>
+        <dsp:cNvSpPr/>
+      </dsp:nvSpPr>
+      <dsp:spPr>
+        <a:xfrm>
+          <a:off x="1352896" y="1827442"/>
+          <a:ext cx="966354" cy="742885"/>
+        </a:xfrm>
+        <a:prstGeom prst="roundRect">
+          <a:avLst>
+            <a:gd name="adj" fmla="val 10000"/>
+          </a:avLst>
+        </a:prstGeom>
+        <a:gradFill rotWithShape="0">
+          <a:gsLst>
+            <a:gs pos="0">
+              <a:schemeClr val="accent1">
+                <a:hueOff val="0"/>
+                <a:satOff val="0"/>
+                <a:lumOff val="0"/>
+                <a:alphaOff val="0"/>
+                <a:tint val="100000"/>
+                <a:shade val="100000"/>
+                <a:satMod val="130000"/>
+              </a:schemeClr>
+            </a:gs>
+            <a:gs pos="100000">
+              <a:schemeClr val="accent1">
+                <a:hueOff val="0"/>
+                <a:satOff val="0"/>
+                <a:lumOff val="0"/>
+                <a:alphaOff val="0"/>
+                <a:tint val="50000"/>
+                <a:shade val="100000"/>
+                <a:satMod val="350000"/>
+              </a:schemeClr>
+            </a:gs>
+          </a:gsLst>
+          <a:lin ang="16200000" scaled="0"/>
+        </a:gradFill>
+        <a:ln>
+          <a:noFill/>
+        </a:ln>
+        <a:effectLst>
+          <a:outerShdw blurRad="40000" dist="23000" dir="5400000" rotWithShape="0">
+            <a:srgbClr val="000000">
+              <a:alpha val="35000"/>
+            </a:srgbClr>
+          </a:outerShdw>
+        </a:effectLst>
+        <a:scene3d>
+          <a:camera prst="orthographicFront">
+            <a:rot lat="0" lon="0" rev="0"/>
+          </a:camera>
+          <a:lightRig rig="threePt" dir="t">
+            <a:rot lat="0" lon="0" rev="1200000"/>
+          </a:lightRig>
+        </a:scene3d>
+        <a:sp3d>
+          <a:bevelT w="63500" h="25400"/>
+        </a:sp3d>
+      </dsp:spPr>
+      <dsp:style>
+        <a:lnRef idx="0">
+          <a:scrgbClr r="0" g="0" b="0"/>
+        </a:lnRef>
+        <a:fillRef idx="3">
+          <a:scrgbClr r="0" g="0" b="0"/>
+        </a:fillRef>
+        <a:effectRef idx="3">
+          <a:scrgbClr r="0" g="0" b="0"/>
+        </a:effectRef>
+        <a:fontRef idx="minor">
+          <a:schemeClr val="lt1"/>
+        </a:fontRef>
+      </dsp:style>
+      <dsp:txBody>
+        <a:bodyPr spcFirstLastPara="0" vert="horz" wrap="square" lIns="41910" tIns="41910" rIns="41910" bIns="41910" numCol="1" spcCol="1270" anchor="ctr" anchorCtr="0">
+          <a:noAutofit/>
+        </a:bodyPr>
+        <a:lstStyle/>
+        <a:p>
+          <a:pPr marL="0" lvl="0" indent="0" algn="ctr" defTabSz="488950">
+            <a:lnSpc>
+              <a:spcPct val="90000"/>
+            </a:lnSpc>
+            <a:spcBef>
+              <a:spcPct val="0"/>
+            </a:spcBef>
+            <a:spcAft>
+              <a:spcPct val="35000"/>
+            </a:spcAft>
+            <a:buNone/>
+          </a:pPr>
+          <a:r>
+            <a:rPr lang="en-US" sz="1100" kern="1200"/>
+            <a:t>Merge Channels</a:t>
+          </a:r>
+          <a:endParaRPr lang="en-US" sz="1100" kern="1200" dirty="0"/>
+        </a:p>
+      </dsp:txBody>
+      <dsp:txXfrm>
+        <a:off x="1374654" y="1849200"/>
+        <a:ext cx="922838" cy="699369"/>
+      </dsp:txXfrm>
+    </dsp:sp>
+    <dsp:sp modelId="{1F6593DD-96A7-49EF-8E21-5179CE022EE4}">
+      <dsp:nvSpPr>
+        <dsp:cNvPr id="0" name=""/>
+        <dsp:cNvSpPr/>
+      </dsp:nvSpPr>
+      <dsp:spPr>
+        <a:xfrm>
+          <a:off x="2415886" y="2079057"/>
+          <a:ext cx="204867" cy="239655"/>
+        </a:xfrm>
+        <a:prstGeom prst="rightArrow">
+          <a:avLst>
+            <a:gd name="adj1" fmla="val 60000"/>
+            <a:gd name="adj2" fmla="val 50000"/>
+          </a:avLst>
+        </a:prstGeom>
+        <a:gradFill rotWithShape="0">
+          <a:gsLst>
+            <a:gs pos="0">
+              <a:schemeClr val="accent1">
+                <a:tint val="60000"/>
+                <a:hueOff val="0"/>
+                <a:satOff val="0"/>
+                <a:lumOff val="0"/>
+                <a:alphaOff val="0"/>
+                <a:tint val="100000"/>
+                <a:shade val="100000"/>
+                <a:satMod val="130000"/>
+              </a:schemeClr>
+            </a:gs>
+            <a:gs pos="100000">
+              <a:schemeClr val="accent1">
+                <a:tint val="60000"/>
+                <a:hueOff val="0"/>
+                <a:satOff val="0"/>
+                <a:lumOff val="0"/>
+                <a:alphaOff val="0"/>
+                <a:tint val="50000"/>
+                <a:shade val="100000"/>
+                <a:satMod val="350000"/>
+              </a:schemeClr>
+            </a:gs>
+          </a:gsLst>
+          <a:lin ang="16200000" scaled="0"/>
+        </a:gradFill>
+        <a:ln>
+          <a:noFill/>
+        </a:ln>
+        <a:effectLst>
+          <a:outerShdw blurRad="40000" dist="23000" dir="5400000" rotWithShape="0">
+            <a:srgbClr val="000000">
+              <a:alpha val="35000"/>
+            </a:srgbClr>
+          </a:outerShdw>
+        </a:effectLst>
+        <a:scene3d>
+          <a:camera prst="orthographicFront">
+            <a:rot lat="0" lon="0" rev="0"/>
+          </a:camera>
+          <a:lightRig rig="threePt" dir="t">
+            <a:rot lat="0" lon="0" rev="1200000"/>
+          </a:lightRig>
+        </a:scene3d>
+        <a:sp3d>
+          <a:bevelT w="63500" h="25400"/>
+        </a:sp3d>
+      </dsp:spPr>
+      <dsp:style>
+        <a:lnRef idx="0">
+          <a:scrgbClr r="0" g="0" b="0"/>
+        </a:lnRef>
+        <a:fillRef idx="3">
+          <a:scrgbClr r="0" g="0" b="0"/>
+        </a:fillRef>
+        <a:effectRef idx="3">
+          <a:scrgbClr r="0" g="0" b="0"/>
+        </a:effectRef>
+        <a:fontRef idx="minor">
+          <a:schemeClr val="lt1"/>
+        </a:fontRef>
+      </dsp:style>
+      <dsp:txBody>
+        <a:bodyPr spcFirstLastPara="0" vert="horz" wrap="square" lIns="0" tIns="0" rIns="0" bIns="0" numCol="1" spcCol="1270" anchor="ctr" anchorCtr="0">
+          <a:noAutofit/>
+        </a:bodyPr>
+        <a:lstStyle/>
+        <a:p>
+          <a:pPr marL="0" lvl="0" indent="0" algn="ctr" defTabSz="400050">
+            <a:lnSpc>
+              <a:spcPct val="90000"/>
+            </a:lnSpc>
+            <a:spcBef>
+              <a:spcPct val="0"/>
+            </a:spcBef>
+            <a:spcAft>
+              <a:spcPct val="35000"/>
+            </a:spcAft>
+            <a:buNone/>
+          </a:pPr>
+          <a:endParaRPr lang="en-US" sz="900" kern="1200"/>
+        </a:p>
+      </dsp:txBody>
+      <dsp:txXfrm>
+        <a:off x="2415886" y="2126988"/>
+        <a:ext cx="143407" cy="143793"/>
+      </dsp:txXfrm>
+    </dsp:sp>
+    <dsp:sp modelId="{97C130C5-91EA-4B43-9A5C-1C2ABEA7F697}">
+      <dsp:nvSpPr>
+        <dsp:cNvPr id="0" name=""/>
+        <dsp:cNvSpPr/>
+      </dsp:nvSpPr>
+      <dsp:spPr>
+        <a:xfrm>
+          <a:off x="2705792" y="1827442"/>
+          <a:ext cx="966354" cy="742885"/>
+        </a:xfrm>
+        <a:prstGeom prst="roundRect">
+          <a:avLst>
+            <a:gd name="adj" fmla="val 10000"/>
+          </a:avLst>
+        </a:prstGeom>
+        <a:gradFill rotWithShape="0">
+          <a:gsLst>
+            <a:gs pos="0">
+              <a:schemeClr val="accent1">
+                <a:hueOff val="0"/>
+                <a:satOff val="0"/>
+                <a:lumOff val="0"/>
+                <a:alphaOff val="0"/>
+                <a:tint val="100000"/>
+                <a:shade val="100000"/>
+                <a:satMod val="130000"/>
+              </a:schemeClr>
+            </a:gs>
+            <a:gs pos="100000">
+              <a:schemeClr val="accent1">
+                <a:hueOff val="0"/>
+                <a:satOff val="0"/>
+                <a:lumOff val="0"/>
+                <a:alphaOff val="0"/>
+                <a:tint val="50000"/>
+                <a:shade val="100000"/>
+                <a:satMod val="350000"/>
+              </a:schemeClr>
+            </a:gs>
+          </a:gsLst>
+          <a:lin ang="16200000" scaled="0"/>
+        </a:gradFill>
+        <a:ln>
+          <a:noFill/>
+        </a:ln>
+        <a:effectLst>
+          <a:outerShdw blurRad="40000" dist="23000" dir="5400000" rotWithShape="0">
+            <a:srgbClr val="000000">
+              <a:alpha val="35000"/>
+            </a:srgbClr>
+          </a:outerShdw>
+        </a:effectLst>
+        <a:scene3d>
+          <a:camera prst="orthographicFront">
+            <a:rot lat="0" lon="0" rev="0"/>
+          </a:camera>
+          <a:lightRig rig="threePt" dir="t">
+            <a:rot lat="0" lon="0" rev="1200000"/>
+          </a:lightRig>
+        </a:scene3d>
+        <a:sp3d>
+          <a:bevelT w="63500" h="25400"/>
+        </a:sp3d>
+      </dsp:spPr>
+      <dsp:style>
+        <a:lnRef idx="0">
+          <a:scrgbClr r="0" g="0" b="0"/>
+        </a:lnRef>
+        <a:fillRef idx="3">
+          <a:scrgbClr r="0" g="0" b="0"/>
+        </a:fillRef>
+        <a:effectRef idx="3">
+          <a:scrgbClr r="0" g="0" b="0"/>
+        </a:effectRef>
+        <a:fontRef idx="minor">
+          <a:schemeClr val="lt1"/>
+        </a:fontRef>
+      </dsp:style>
+      <dsp:txBody>
+        <a:bodyPr spcFirstLastPara="0" vert="horz" wrap="square" lIns="41910" tIns="41910" rIns="41910" bIns="41910" numCol="1" spcCol="1270" anchor="ctr" anchorCtr="0">
+          <a:noAutofit/>
+        </a:bodyPr>
+        <a:lstStyle/>
+        <a:p>
+          <a:pPr marL="0" lvl="0" indent="0" algn="ctr" defTabSz="488950">
+            <a:lnSpc>
+              <a:spcPct val="90000"/>
+            </a:lnSpc>
+            <a:spcBef>
+              <a:spcPct val="0"/>
+            </a:spcBef>
+            <a:spcAft>
+              <a:spcPct val="35000"/>
+            </a:spcAft>
+            <a:buNone/>
+          </a:pPr>
+          <a:r>
+            <a:rPr lang="en-US" sz="1100" kern="1200" dirty="0"/>
+            <a:t>Segment (K-means, Mean Shift, etc.)</a:t>
+          </a:r>
+        </a:p>
+      </dsp:txBody>
+      <dsp:txXfrm>
+        <a:off x="2727550" y="1849200"/>
+        <a:ext cx="922838" cy="699369"/>
+      </dsp:txXfrm>
+    </dsp:sp>
+    <dsp:sp modelId="{9C25FC62-51D7-4C18-AE07-BFE8CC2105D0}">
+      <dsp:nvSpPr>
+        <dsp:cNvPr id="0" name=""/>
+        <dsp:cNvSpPr/>
+      </dsp:nvSpPr>
+      <dsp:spPr>
+        <a:xfrm>
+          <a:off x="3768782" y="2079057"/>
+          <a:ext cx="204867" cy="239655"/>
+        </a:xfrm>
+        <a:prstGeom prst="rightArrow">
+          <a:avLst>
+            <a:gd name="adj1" fmla="val 60000"/>
+            <a:gd name="adj2" fmla="val 50000"/>
+          </a:avLst>
+        </a:prstGeom>
+        <a:gradFill rotWithShape="0">
+          <a:gsLst>
+            <a:gs pos="0">
+              <a:schemeClr val="accent1">
+                <a:tint val="60000"/>
+                <a:hueOff val="0"/>
+                <a:satOff val="0"/>
+                <a:lumOff val="0"/>
+                <a:alphaOff val="0"/>
+                <a:tint val="100000"/>
+                <a:shade val="100000"/>
+                <a:satMod val="130000"/>
+              </a:schemeClr>
+            </a:gs>
+            <a:gs pos="100000">
+              <a:schemeClr val="accent1">
+                <a:tint val="60000"/>
+                <a:hueOff val="0"/>
+                <a:satOff val="0"/>
+                <a:lumOff val="0"/>
+                <a:alphaOff val="0"/>
+                <a:tint val="50000"/>
+                <a:shade val="100000"/>
+                <a:satMod val="350000"/>
+              </a:schemeClr>
+            </a:gs>
+          </a:gsLst>
+          <a:lin ang="16200000" scaled="0"/>
+        </a:gradFill>
+        <a:ln>
+          <a:noFill/>
+        </a:ln>
+        <a:effectLst>
+          <a:outerShdw blurRad="40000" dist="23000" dir="5400000" rotWithShape="0">
+            <a:srgbClr val="000000">
+              <a:alpha val="35000"/>
+            </a:srgbClr>
+          </a:outerShdw>
+        </a:effectLst>
+        <a:scene3d>
+          <a:camera prst="orthographicFront">
+            <a:rot lat="0" lon="0" rev="0"/>
+          </a:camera>
+          <a:lightRig rig="threePt" dir="t">
+            <a:rot lat="0" lon="0" rev="1200000"/>
+          </a:lightRig>
+        </a:scene3d>
+        <a:sp3d>
+          <a:bevelT w="63500" h="25400"/>
+        </a:sp3d>
+      </dsp:spPr>
+      <dsp:style>
+        <a:lnRef idx="0">
+          <a:scrgbClr r="0" g="0" b="0"/>
+        </a:lnRef>
+        <a:fillRef idx="3">
+          <a:scrgbClr r="0" g="0" b="0"/>
+        </a:fillRef>
+        <a:effectRef idx="3">
+          <a:scrgbClr r="0" g="0" b="0"/>
+        </a:effectRef>
+        <a:fontRef idx="minor">
+          <a:schemeClr val="lt1"/>
+        </a:fontRef>
+      </dsp:style>
+      <dsp:txBody>
+        <a:bodyPr spcFirstLastPara="0" vert="horz" wrap="square" lIns="0" tIns="0" rIns="0" bIns="0" numCol="1" spcCol="1270" anchor="ctr" anchorCtr="0">
+          <a:noAutofit/>
+        </a:bodyPr>
+        <a:lstStyle/>
+        <a:p>
+          <a:pPr marL="0" lvl="0" indent="0" algn="ctr" defTabSz="400050">
+            <a:lnSpc>
+              <a:spcPct val="90000"/>
+            </a:lnSpc>
+            <a:spcBef>
+              <a:spcPct val="0"/>
+            </a:spcBef>
+            <a:spcAft>
+              <a:spcPct val="35000"/>
+            </a:spcAft>
+            <a:buNone/>
+          </a:pPr>
+          <a:endParaRPr lang="en-US" sz="900" kern="1200"/>
+        </a:p>
+      </dsp:txBody>
+      <dsp:txXfrm>
+        <a:off x="3768782" y="2126988"/>
+        <a:ext cx="143407" cy="143793"/>
+      </dsp:txXfrm>
+    </dsp:sp>
+    <dsp:sp modelId="{2676133C-56C1-41A8-85B2-4802CCD2D2FF}">
+      <dsp:nvSpPr>
+        <dsp:cNvPr id="0" name=""/>
+        <dsp:cNvSpPr/>
+      </dsp:nvSpPr>
+      <dsp:spPr>
+        <a:xfrm>
+          <a:off x="4058688" y="1827442"/>
+          <a:ext cx="966354" cy="742885"/>
+        </a:xfrm>
+        <a:prstGeom prst="roundRect">
+          <a:avLst>
+            <a:gd name="adj" fmla="val 10000"/>
+          </a:avLst>
+        </a:prstGeom>
+        <a:gradFill rotWithShape="0">
+          <a:gsLst>
+            <a:gs pos="0">
+              <a:schemeClr val="accent1">
+                <a:hueOff val="0"/>
+                <a:satOff val="0"/>
+                <a:lumOff val="0"/>
+                <a:alphaOff val="0"/>
+                <a:tint val="100000"/>
+                <a:shade val="100000"/>
+                <a:satMod val="130000"/>
+              </a:schemeClr>
+            </a:gs>
+            <a:gs pos="100000">
+              <a:schemeClr val="accent1">
+                <a:hueOff val="0"/>
+                <a:satOff val="0"/>
+                <a:lumOff val="0"/>
+                <a:alphaOff val="0"/>
+                <a:tint val="50000"/>
+                <a:shade val="100000"/>
+                <a:satMod val="350000"/>
+              </a:schemeClr>
+            </a:gs>
+          </a:gsLst>
+          <a:lin ang="16200000" scaled="0"/>
+        </a:gradFill>
+        <a:ln>
+          <a:noFill/>
+        </a:ln>
+        <a:effectLst>
+          <a:outerShdw blurRad="40000" dist="23000" dir="5400000" rotWithShape="0">
+            <a:srgbClr val="000000">
+              <a:alpha val="35000"/>
+            </a:srgbClr>
+          </a:outerShdw>
+        </a:effectLst>
+        <a:scene3d>
+          <a:camera prst="orthographicFront">
+            <a:rot lat="0" lon="0" rev="0"/>
+          </a:camera>
+          <a:lightRig rig="threePt" dir="t">
+            <a:rot lat="0" lon="0" rev="1200000"/>
+          </a:lightRig>
+        </a:scene3d>
+        <a:sp3d>
+          <a:bevelT w="63500" h="25400"/>
+        </a:sp3d>
+      </dsp:spPr>
+      <dsp:style>
+        <a:lnRef idx="0">
+          <a:scrgbClr r="0" g="0" b="0"/>
+        </a:lnRef>
+        <a:fillRef idx="3">
+          <a:scrgbClr r="0" g="0" b="0"/>
+        </a:fillRef>
+        <a:effectRef idx="3">
+          <a:scrgbClr r="0" g="0" b="0"/>
+        </a:effectRef>
+        <a:fontRef idx="minor">
+          <a:schemeClr val="lt1"/>
+        </a:fontRef>
+      </dsp:style>
+      <dsp:txBody>
+        <a:bodyPr spcFirstLastPara="0" vert="horz" wrap="square" lIns="41910" tIns="41910" rIns="41910" bIns="41910" numCol="1" spcCol="1270" anchor="ctr" anchorCtr="0">
+          <a:noAutofit/>
+        </a:bodyPr>
+        <a:lstStyle/>
+        <a:p>
+          <a:pPr marL="0" lvl="0" indent="0" algn="ctr" defTabSz="488950">
+            <a:lnSpc>
+              <a:spcPct val="90000"/>
+            </a:lnSpc>
+            <a:spcBef>
+              <a:spcPct val="0"/>
+            </a:spcBef>
+            <a:spcAft>
+              <a:spcPct val="35000"/>
+            </a:spcAft>
+            <a:buNone/>
+          </a:pPr>
+          <a:r>
+            <a:rPr lang="en-US" sz="1100" kern="1200" dirty="0"/>
+            <a:t>PCA ?</a:t>
+          </a:r>
+        </a:p>
+      </dsp:txBody>
+      <dsp:txXfrm>
+        <a:off x="4080446" y="1849200"/>
+        <a:ext cx="922838" cy="699369"/>
+      </dsp:txXfrm>
+    </dsp:sp>
+    <dsp:sp modelId="{E03B28B5-6B07-4BDF-B1B4-6937B85F9470}">
+      <dsp:nvSpPr>
+        <dsp:cNvPr id="0" name=""/>
+        <dsp:cNvSpPr/>
+      </dsp:nvSpPr>
+      <dsp:spPr>
+        <a:xfrm>
+          <a:off x="5121678" y="2079057"/>
+          <a:ext cx="204867" cy="239655"/>
+        </a:xfrm>
+        <a:prstGeom prst="rightArrow">
+          <a:avLst>
+            <a:gd name="adj1" fmla="val 60000"/>
+            <a:gd name="adj2" fmla="val 50000"/>
+          </a:avLst>
+        </a:prstGeom>
+        <a:gradFill rotWithShape="0">
+          <a:gsLst>
+            <a:gs pos="0">
+              <a:schemeClr val="accent1">
+                <a:tint val="60000"/>
+                <a:hueOff val="0"/>
+                <a:satOff val="0"/>
+                <a:lumOff val="0"/>
+                <a:alphaOff val="0"/>
+                <a:tint val="100000"/>
+                <a:shade val="100000"/>
+                <a:satMod val="130000"/>
+              </a:schemeClr>
+            </a:gs>
+            <a:gs pos="100000">
+              <a:schemeClr val="accent1">
+                <a:tint val="60000"/>
+                <a:hueOff val="0"/>
+                <a:satOff val="0"/>
+                <a:lumOff val="0"/>
+                <a:alphaOff val="0"/>
+                <a:tint val="50000"/>
+                <a:shade val="100000"/>
+                <a:satMod val="350000"/>
+              </a:schemeClr>
+            </a:gs>
+          </a:gsLst>
+          <a:lin ang="16200000" scaled="0"/>
+        </a:gradFill>
+        <a:ln>
+          <a:noFill/>
+        </a:ln>
+        <a:effectLst>
+          <a:outerShdw blurRad="40000" dist="23000" dir="5400000" rotWithShape="0">
+            <a:srgbClr val="000000">
+              <a:alpha val="35000"/>
+            </a:srgbClr>
+          </a:outerShdw>
+        </a:effectLst>
+        <a:scene3d>
+          <a:camera prst="orthographicFront">
+            <a:rot lat="0" lon="0" rev="0"/>
+          </a:camera>
+          <a:lightRig rig="threePt" dir="t">
+            <a:rot lat="0" lon="0" rev="1200000"/>
+          </a:lightRig>
+        </a:scene3d>
+        <a:sp3d>
+          <a:bevelT w="63500" h="25400"/>
+        </a:sp3d>
+      </dsp:spPr>
+      <dsp:style>
+        <a:lnRef idx="0">
+          <a:scrgbClr r="0" g="0" b="0"/>
+        </a:lnRef>
+        <a:fillRef idx="3">
+          <a:scrgbClr r="0" g="0" b="0"/>
+        </a:fillRef>
+        <a:effectRef idx="3">
+          <a:scrgbClr r="0" g="0" b="0"/>
+        </a:effectRef>
+        <a:fontRef idx="minor">
+          <a:schemeClr val="lt1"/>
+        </a:fontRef>
+      </dsp:style>
+      <dsp:txBody>
+        <a:bodyPr spcFirstLastPara="0" vert="horz" wrap="square" lIns="0" tIns="0" rIns="0" bIns="0" numCol="1" spcCol="1270" anchor="ctr" anchorCtr="0">
+          <a:noAutofit/>
+        </a:bodyPr>
+        <a:lstStyle/>
+        <a:p>
+          <a:pPr marL="0" lvl="0" indent="0" algn="ctr" defTabSz="400050">
+            <a:lnSpc>
+              <a:spcPct val="90000"/>
+            </a:lnSpc>
+            <a:spcBef>
+              <a:spcPct val="0"/>
+            </a:spcBef>
+            <a:spcAft>
+              <a:spcPct val="35000"/>
+            </a:spcAft>
+            <a:buNone/>
+          </a:pPr>
+          <a:endParaRPr lang="en-US" sz="900" kern="1200"/>
+        </a:p>
+      </dsp:txBody>
+      <dsp:txXfrm>
+        <a:off x="5121678" y="2126988"/>
+        <a:ext cx="143407" cy="143793"/>
+      </dsp:txXfrm>
+    </dsp:sp>
+    <dsp:sp modelId="{743AFEF7-DD53-47AF-A4E4-737632D4FABD}">
+      <dsp:nvSpPr>
+        <dsp:cNvPr id="0" name=""/>
+        <dsp:cNvSpPr/>
+      </dsp:nvSpPr>
+      <dsp:spPr>
+        <a:xfrm>
+          <a:off x="5411585" y="1827442"/>
+          <a:ext cx="966354" cy="742885"/>
+        </a:xfrm>
+        <a:prstGeom prst="roundRect">
+          <a:avLst>
+            <a:gd name="adj" fmla="val 10000"/>
+          </a:avLst>
+        </a:prstGeom>
+        <a:gradFill rotWithShape="0">
+          <a:gsLst>
+            <a:gs pos="0">
+              <a:schemeClr val="accent1">
+                <a:hueOff val="0"/>
+                <a:satOff val="0"/>
+                <a:lumOff val="0"/>
+                <a:alphaOff val="0"/>
+                <a:tint val="100000"/>
+                <a:shade val="100000"/>
+                <a:satMod val="130000"/>
+              </a:schemeClr>
+            </a:gs>
+            <a:gs pos="100000">
+              <a:schemeClr val="accent1">
+                <a:hueOff val="0"/>
+                <a:satOff val="0"/>
+                <a:lumOff val="0"/>
+                <a:alphaOff val="0"/>
+                <a:tint val="50000"/>
+                <a:shade val="100000"/>
+                <a:satMod val="350000"/>
+              </a:schemeClr>
+            </a:gs>
+          </a:gsLst>
+          <a:lin ang="16200000" scaled="0"/>
+        </a:gradFill>
+        <a:ln>
+          <a:noFill/>
+        </a:ln>
+        <a:effectLst>
+          <a:outerShdw blurRad="40000" dist="23000" dir="5400000" rotWithShape="0">
+            <a:srgbClr val="000000">
+              <a:alpha val="35000"/>
+            </a:srgbClr>
+          </a:outerShdw>
+        </a:effectLst>
+        <a:scene3d>
+          <a:camera prst="orthographicFront">
+            <a:rot lat="0" lon="0" rev="0"/>
+          </a:camera>
+          <a:lightRig rig="threePt" dir="t">
+            <a:rot lat="0" lon="0" rev="1200000"/>
+          </a:lightRig>
+        </a:scene3d>
+        <a:sp3d>
+          <a:bevelT w="63500" h="25400"/>
+        </a:sp3d>
+      </dsp:spPr>
+      <dsp:style>
+        <a:lnRef idx="0">
+          <a:scrgbClr r="0" g="0" b="0"/>
+        </a:lnRef>
+        <a:fillRef idx="3">
+          <a:scrgbClr r="0" g="0" b="0"/>
+        </a:fillRef>
+        <a:effectRef idx="3">
+          <a:scrgbClr r="0" g="0" b="0"/>
+        </a:effectRef>
+        <a:fontRef idx="minor">
+          <a:schemeClr val="lt1"/>
+        </a:fontRef>
+      </dsp:style>
+      <dsp:txBody>
+        <a:bodyPr spcFirstLastPara="0" vert="horz" wrap="square" lIns="41910" tIns="41910" rIns="41910" bIns="41910" numCol="1" spcCol="1270" anchor="ctr" anchorCtr="0">
+          <a:noAutofit/>
+        </a:bodyPr>
+        <a:lstStyle/>
+        <a:p>
+          <a:pPr marL="0" lvl="0" indent="0" algn="ctr" defTabSz="488950">
+            <a:lnSpc>
+              <a:spcPct val="90000"/>
+            </a:lnSpc>
+            <a:spcBef>
+              <a:spcPct val="0"/>
+            </a:spcBef>
+            <a:spcAft>
+              <a:spcPct val="35000"/>
+            </a:spcAft>
+            <a:buNone/>
+          </a:pPr>
+          <a:r>
+            <a:rPr lang="en-US" sz="1100" kern="1200" dirty="0"/>
+            <a:t>Interpret RGB Image from Multispectral</a:t>
+          </a:r>
+        </a:p>
+      </dsp:txBody>
+      <dsp:txXfrm>
+        <a:off x="5433343" y="1849200"/>
+        <a:ext cx="922838" cy="699369"/>
+      </dsp:txXfrm>
+    </dsp:sp>
+    <dsp:sp modelId="{A63D60B0-5CBA-45C6-AC94-C0D379BE740B}">
+      <dsp:nvSpPr>
+        <dsp:cNvPr id="0" name=""/>
+        <dsp:cNvSpPr/>
+      </dsp:nvSpPr>
+      <dsp:spPr>
+        <a:xfrm>
+          <a:off x="6474575" y="2079057"/>
+          <a:ext cx="204867" cy="239655"/>
+        </a:xfrm>
+        <a:prstGeom prst="rightArrow">
+          <a:avLst>
+            <a:gd name="adj1" fmla="val 60000"/>
+            <a:gd name="adj2" fmla="val 50000"/>
+          </a:avLst>
+        </a:prstGeom>
+        <a:gradFill rotWithShape="0">
+          <a:gsLst>
+            <a:gs pos="0">
+              <a:schemeClr val="accent1">
+                <a:tint val="60000"/>
+                <a:hueOff val="0"/>
+                <a:satOff val="0"/>
+                <a:lumOff val="0"/>
+                <a:alphaOff val="0"/>
+                <a:tint val="100000"/>
+                <a:shade val="100000"/>
+                <a:satMod val="130000"/>
+              </a:schemeClr>
+            </a:gs>
+            <a:gs pos="100000">
+              <a:schemeClr val="accent1">
+                <a:tint val="60000"/>
+                <a:hueOff val="0"/>
+                <a:satOff val="0"/>
+                <a:lumOff val="0"/>
+                <a:alphaOff val="0"/>
+                <a:tint val="50000"/>
+                <a:shade val="100000"/>
+                <a:satMod val="350000"/>
+              </a:schemeClr>
+            </a:gs>
+          </a:gsLst>
+          <a:lin ang="16200000" scaled="0"/>
+        </a:gradFill>
+        <a:ln>
+          <a:noFill/>
+        </a:ln>
+        <a:effectLst>
+          <a:outerShdw blurRad="40000" dist="23000" dir="5400000" rotWithShape="0">
+            <a:srgbClr val="000000">
+              <a:alpha val="35000"/>
+            </a:srgbClr>
+          </a:outerShdw>
+        </a:effectLst>
+        <a:scene3d>
+          <a:camera prst="orthographicFront">
+            <a:rot lat="0" lon="0" rev="0"/>
+          </a:camera>
+          <a:lightRig rig="threePt" dir="t">
+            <a:rot lat="0" lon="0" rev="1200000"/>
+          </a:lightRig>
+        </a:scene3d>
+        <a:sp3d>
+          <a:bevelT w="63500" h="25400"/>
+        </a:sp3d>
+      </dsp:spPr>
+      <dsp:style>
+        <a:lnRef idx="0">
+          <a:scrgbClr r="0" g="0" b="0"/>
+        </a:lnRef>
+        <a:fillRef idx="3">
+          <a:scrgbClr r="0" g="0" b="0"/>
+        </a:fillRef>
+        <a:effectRef idx="3">
+          <a:scrgbClr r="0" g="0" b="0"/>
+        </a:effectRef>
+        <a:fontRef idx="minor">
+          <a:schemeClr val="lt1"/>
+        </a:fontRef>
+      </dsp:style>
+      <dsp:txBody>
+        <a:bodyPr spcFirstLastPara="0" vert="horz" wrap="square" lIns="0" tIns="0" rIns="0" bIns="0" numCol="1" spcCol="1270" anchor="ctr" anchorCtr="0">
+          <a:noAutofit/>
+        </a:bodyPr>
+        <a:lstStyle/>
+        <a:p>
+          <a:pPr marL="0" lvl="0" indent="0" algn="ctr" defTabSz="400050">
+            <a:lnSpc>
+              <a:spcPct val="90000"/>
+            </a:lnSpc>
+            <a:spcBef>
+              <a:spcPct val="0"/>
+            </a:spcBef>
+            <a:spcAft>
+              <a:spcPct val="35000"/>
+            </a:spcAft>
+            <a:buNone/>
+          </a:pPr>
+          <a:endParaRPr lang="en-US" sz="900" kern="1200"/>
+        </a:p>
+      </dsp:txBody>
+      <dsp:txXfrm>
+        <a:off x="6474575" y="2126988"/>
+        <a:ext cx="143407" cy="143793"/>
+      </dsp:txXfrm>
+    </dsp:sp>
+    <dsp:sp modelId="{1FEDB56D-50DA-4C97-B119-82CB0F7F6F83}">
+      <dsp:nvSpPr>
+        <dsp:cNvPr id="0" name=""/>
+        <dsp:cNvSpPr/>
+      </dsp:nvSpPr>
+      <dsp:spPr>
+        <a:xfrm>
+          <a:off x="6764481" y="1827442"/>
+          <a:ext cx="966354" cy="742885"/>
+        </a:xfrm>
+        <a:prstGeom prst="roundRect">
+          <a:avLst>
+            <a:gd name="adj" fmla="val 10000"/>
+          </a:avLst>
+        </a:prstGeom>
+        <a:gradFill rotWithShape="0">
+          <a:gsLst>
+            <a:gs pos="0">
+              <a:schemeClr val="accent1">
+                <a:hueOff val="0"/>
+                <a:satOff val="0"/>
+                <a:lumOff val="0"/>
+                <a:alphaOff val="0"/>
+                <a:tint val="100000"/>
+                <a:shade val="100000"/>
+                <a:satMod val="130000"/>
+              </a:schemeClr>
+            </a:gs>
+            <a:gs pos="100000">
+              <a:schemeClr val="accent1">
+                <a:hueOff val="0"/>
+                <a:satOff val="0"/>
+                <a:lumOff val="0"/>
+                <a:alphaOff val="0"/>
+                <a:tint val="50000"/>
+                <a:shade val="100000"/>
+                <a:satMod val="350000"/>
+              </a:schemeClr>
+            </a:gs>
+          </a:gsLst>
+          <a:lin ang="16200000" scaled="0"/>
+        </a:gradFill>
+        <a:ln>
+          <a:noFill/>
+        </a:ln>
+        <a:effectLst>
+          <a:outerShdw blurRad="40000" dist="23000" dir="5400000" rotWithShape="0">
+            <a:srgbClr val="000000">
+              <a:alpha val="35000"/>
+            </a:srgbClr>
+          </a:outerShdw>
+        </a:effectLst>
+        <a:scene3d>
+          <a:camera prst="orthographicFront">
+            <a:rot lat="0" lon="0" rev="0"/>
+          </a:camera>
+          <a:lightRig rig="threePt" dir="t">
+            <a:rot lat="0" lon="0" rev="1200000"/>
+          </a:lightRig>
+        </a:scene3d>
+        <a:sp3d>
+          <a:bevelT w="63500" h="25400"/>
+        </a:sp3d>
+      </dsp:spPr>
+      <dsp:style>
+        <a:lnRef idx="0">
+          <a:scrgbClr r="0" g="0" b="0"/>
+        </a:lnRef>
+        <a:fillRef idx="3">
+          <a:scrgbClr r="0" g="0" b="0"/>
+        </a:fillRef>
+        <a:effectRef idx="3">
+          <a:scrgbClr r="0" g="0" b="0"/>
+        </a:effectRef>
+        <a:fontRef idx="minor">
+          <a:schemeClr val="lt1"/>
+        </a:fontRef>
+      </dsp:style>
+      <dsp:txBody>
+        <a:bodyPr spcFirstLastPara="0" vert="horz" wrap="square" lIns="41910" tIns="41910" rIns="41910" bIns="41910" numCol="1" spcCol="1270" anchor="ctr" anchorCtr="0">
+          <a:noAutofit/>
+        </a:bodyPr>
+        <a:lstStyle/>
+        <a:p>
+          <a:pPr marL="0" lvl="0" indent="0" algn="ctr" defTabSz="488950">
+            <a:lnSpc>
+              <a:spcPct val="90000"/>
+            </a:lnSpc>
+            <a:spcBef>
+              <a:spcPct val="0"/>
+            </a:spcBef>
+            <a:spcAft>
+              <a:spcPct val="35000"/>
+            </a:spcAft>
+            <a:buNone/>
+          </a:pPr>
+          <a:r>
+            <a:rPr lang="en-US" sz="1100" kern="1200" dirty="0"/>
+            <a:t>Color Segments Based from Labels</a:t>
+          </a:r>
+        </a:p>
+      </dsp:txBody>
+      <dsp:txXfrm>
+        <a:off x="6786239" y="1849200"/>
+        <a:ext cx="922838" cy="699369"/>
+      </dsp:txXfrm>
+    </dsp:sp>
+  </dsp:spTree>
+</dsp:drawing>
+</file>
+
+<file path=ppt/diagrams/layout1.xml><?xml version="1.0" encoding="utf-8"?>
+<dgm:layoutDef xmlns:dgm="http://schemas.openxmlformats.org/drawingml/2006/diagram" xmlns:a="http://schemas.openxmlformats.org/drawingml/2006/main" uniqueId="urn:microsoft.com/office/officeart/2005/8/layout/process1">
+  <dgm:title val=""/>
+  <dgm:desc val=""/>
+  <dgm:catLst>
+    <dgm:cat type="process" pri="1000"/>
+    <dgm:cat type="convert" pri="15000"/>
+  </dgm:catLst>
+  <dgm:sampData useDef="1">
+    <dgm:dataModel>
+      <dgm:ptLst/>
+      <dgm:bg/>
+      <dgm:whole/>
+    </dgm:dataModel>
+  </dgm:sampData>
+  <dgm:styleData>
+    <dgm:dataModel>
+      <dgm:ptLst>
+        <dgm:pt modelId="0" type="doc"/>
+        <dgm:pt modelId="1"/>
+        <dgm:pt modelId="2"/>
+      </dgm:ptLst>
+      <dgm:cxnLst>
+        <dgm:cxn modelId="3" srcId="0" destId="1" srcOrd="0" destOrd="0"/>
+        <dgm:cxn modelId="4" srcId="0" destId="2" srcOrd="1" destOrd="0"/>
+      </dgm:cxnLst>
+      <dgm:bg/>
+      <dgm:whole/>
+    </dgm:dataModel>
+  </dgm:styleData>
+  <dgm:clrData>
+    <dgm:dataModel>
+      <dgm:ptLst>
+        <dgm:pt modelId="0" type="doc"/>
+        <dgm:pt modelId="1"/>
+        <dgm:pt modelId="2"/>
+        <dgm:pt modelId="3"/>
+        <dgm:pt modelId="4"/>
+      </dgm:ptLst>
+      <dgm:cxnLst>
+        <dgm:cxn modelId="5" srcId="0" destId="1" srcOrd="0" destOrd="0"/>
+        <dgm:cxn modelId="6" srcId="0" destId="2" srcOrd="1" destOrd="0"/>
+        <dgm:cxn modelId="7" srcId="0" destId="3" srcOrd="2" destOrd="0"/>
+        <dgm:cxn modelId="8" srcId="0" destId="4" srcOrd="3" destOrd="0"/>
+      </dgm:cxnLst>
+      <dgm:bg/>
+      <dgm:whole/>
+    </dgm:dataModel>
+  </dgm:clrData>
+  <dgm:layoutNode name="Name0">
+    <dgm:varLst>
+      <dgm:dir/>
+      <dgm:resizeHandles val="exact"/>
+    </dgm:varLst>
+    <dgm:choose name="Name1">
+      <dgm:if name="Name2" func="var" arg="dir" op="equ" val="norm">
+        <dgm:alg type="lin"/>
+      </dgm:if>
+      <dgm:else name="Name3">
+        <dgm:alg type="lin">
+          <dgm:param type="linDir" val="fromR"/>
+        </dgm:alg>
+      </dgm:else>
+    </dgm:choose>
+    <dgm:shape xmlns:r="http://schemas.openxmlformats.org/officeDocument/2006/relationships" r:blip="">
+      <dgm:adjLst/>
+    </dgm:shape>
+    <dgm:presOf/>
+    <dgm:constrLst>
+      <dgm:constr type="w" for="ch" ptType="node" refType="w"/>
+      <dgm:constr type="h" for="ch" ptType="node" op="equ"/>
+      <dgm:constr type="primFontSz" for="ch" ptType="node" op="equ" val="65"/>
+      <dgm:constr type="w" for="ch" ptType="sibTrans" refType="w" refFor="ch" refPtType="node" op="equ" fact="0.4"/>
+      <dgm:constr type="h" for="ch" ptType="sibTrans" op="equ"/>
+      <dgm:constr type="primFontSz" for="des" forName="connectorText" op="equ" val="55"/>
+      <dgm:constr type="primFontSz" for="des" forName="connectorText" refType="primFontSz" refFor="ch" refPtType="node" op="lte" fact="0.8"/>
+    </dgm:constrLst>
+    <dgm:ruleLst/>
+    <dgm:forEach name="nodesForEach" axis="ch" ptType="node">
+      <dgm:layoutNode name="node">
+        <dgm:varLst>
+          <dgm:bulletEnabled val="1"/>
+        </dgm:varLst>
+        <dgm:alg type="tx"/>
+        <dgm:shape xmlns:r="http://schemas.openxmlformats.org/officeDocument/2006/relationships" type="roundRect" r:blip="">
+          <dgm:adjLst>
+            <dgm:adj idx="1" val="0.1"/>
+          </dgm:adjLst>
+        </dgm:shape>
+        <dgm:presOf axis="desOrSelf" ptType="node"/>
+        <dgm:constrLst>
+          <dgm:constr type="h" refType="w" fact="0.6"/>
+          <dgm:constr type="tMarg" refType="primFontSz" fact="0.3"/>
+          <dgm:constr type="bMarg" refType="primFontSz" fact="0.3"/>
+          <dgm:constr type="lMarg" refType="primFontSz" fact="0.3"/>
+          <dgm:constr type="rMarg" refType="primFontSz" fact="0.3"/>
+        </dgm:constrLst>
+        <dgm:ruleLst>
+          <dgm:rule type="primFontSz" val="18" fact="NaN" max="NaN"/>
+          <dgm:rule type="h" val="NaN" fact="1.5" max="NaN"/>
+          <dgm:rule type="primFontSz" val="5" fact="NaN" max="NaN"/>
+          <dgm:rule type="h" val="INF" fact="NaN" max="NaN"/>
+        </dgm:ruleLst>
+      </dgm:layoutNode>
+      <dgm:forEach name="sibTransForEach" axis="followSib" ptType="sibTrans" cnt="1">
+        <dgm:layoutNode name="sibTrans">
+          <dgm:alg type="conn">
+            <dgm:param type="begPts" val="auto"/>
+            <dgm:param type="endPts" val="auto"/>
+          </dgm:alg>
+          <dgm:shape xmlns:r="http://schemas.openxmlformats.org/officeDocument/2006/relationships" type="conn" r:blip="">
+            <dgm:adjLst/>
+          </dgm:shape>
+          <dgm:presOf axis="self"/>
+          <dgm:constrLst>
+            <dgm:constr type="h" refType="w" fact="0.62"/>
+            <dgm:constr type="connDist"/>
+            <dgm:constr type="begPad" refType="connDist" fact="0.25"/>
+            <dgm:constr type="endPad" refType="connDist" fact="0.22"/>
+          </dgm:constrLst>
+          <dgm:ruleLst/>
+          <dgm:layoutNode name="connectorText">
+            <dgm:alg type="tx">
+              <dgm:param type="autoTxRot" val="grav"/>
+            </dgm:alg>
+            <dgm:shape xmlns:r="http://schemas.openxmlformats.org/officeDocument/2006/relationships" type="conn" r:blip="" hideGeom="1">
+              <dgm:adjLst/>
+            </dgm:shape>
+            <dgm:presOf axis="self"/>
+            <dgm:constrLst>
+              <dgm:constr type="lMarg"/>
+              <dgm:constr type="rMarg"/>
+              <dgm:constr type="tMarg"/>
+              <dgm:constr type="bMarg"/>
+            </dgm:constrLst>
+            <dgm:ruleLst>
+              <dgm:rule type="primFontSz" val="5" fact="NaN" max="NaN"/>
+            </dgm:ruleLst>
+          </dgm:layoutNode>
+        </dgm:layoutNode>
+      </dgm:forEach>
+    </dgm:forEach>
+  </dgm:layoutNode>
+</dgm:layoutDef>
+</file>
+
+<file path=ppt/diagrams/quickStyle1.xml><?xml version="1.0" encoding="utf-8"?>
+<dgm:styleDef xmlns:dgm="http://schemas.openxmlformats.org/drawingml/2006/diagram" xmlns:a="http://schemas.openxmlformats.org/drawingml/2006/main" uniqueId="urn:microsoft.com/office/officeart/2005/8/quickstyle/simple5">
+  <dgm:title val=""/>
+  <dgm:desc val=""/>
+  <dgm:catLst>
+    <dgm:cat type="simple" pri="10500"/>
+  </dgm:catLst>
+  <dgm:scene3d>
+    <a:camera prst="orthographicFront"/>
+    <a:lightRig rig="threePt" dir="t"/>
+  </dgm:scene3d>
+  <dgm:styleLbl name="node0">
+    <dgm:scene3d>
+      <a:camera prst="orthographicFront"/>
+      <a:lightRig rig="threePt" dir="t"/>
+    </dgm:scene3d>
+    <dgm:sp3d/>
+    <dgm:txPr/>
+    <dgm:style>
+      <a:lnRef idx="0">
+        <a:scrgbClr r="0" g="0" b="0"/>
+      </a:lnRef>
+      <a:fillRef idx="3">
+        <a:scrgbClr r="0" g="0" b="0"/>
+      </a:fillRef>
+      <a:effectRef idx="3">
+        <a:scrgbClr r="0" g="0" b="0"/>
+      </a:effectRef>
+      <a:fontRef idx="minor">
+        <a:schemeClr val="lt1"/>
+      </a:fontRef>
+    </dgm:style>
+  </dgm:styleLbl>
+  <dgm:styleLbl name="lnNode1">
+    <dgm:scene3d>
+      <a:camera prst="orthographicFront"/>
+      <a:lightRig rig="threePt" dir="t"/>
+    </dgm:scene3d>
+    <dgm:sp3d/>
+    <dgm:txPr/>
+    <dgm:style>
+      <a:lnRef idx="0">
+        <a:scrgbClr r="0" g="0" b="0"/>
+      </a:lnRef>
+      <a:fillRef idx="3">
+        <a:scrgbClr r="0" g="0" b="0"/>
+      </a:fillRef>
+      <a:effectRef idx="3">
+        <a:scrgbClr r="0" g="0" b="0"/>
+      </a:effectRef>
+      <a:fontRef idx="minor">
+        <a:schemeClr val="lt1"/>
+      </a:fontRef>
+    </dgm:style>
+  </dgm:styleLbl>
+  <dgm:styleLbl name="vennNode1">
+    <dgm:scene3d>
+      <a:camera prst="orthographicFront"/>
+      <a:lightRig rig="threePt" dir="t"/>
+    </dgm:scene3d>
+    <dgm:sp3d/>
+    <dgm:txPr/>
+    <dgm:style>
+      <a:lnRef idx="0">
+        <a:scrgbClr r="0" g="0" b="0"/>
+      </a:lnRef>
+      <a:fillRef idx="3">
+        <a:scrgbClr r="0" g="0" b="0"/>
+      </a:fillRef>
+      <a:effectRef idx="3">
+        <a:scrgbClr r="0" g="0" b="0"/>
+      </a:effectRef>
+      <a:fontRef idx="minor">
+        <a:schemeClr val="tx1"/>
+      </a:fontRef>
+    </dgm:style>
+  </dgm:styleLbl>
+  <dgm:styleLbl name="alignNode1">
+    <dgm:scene3d>
+      <a:camera prst="orthographicFront"/>
+      <a:lightRig rig="threePt" dir="t"/>
+    </dgm:scene3d>
+    <dgm:sp3d/>
+    <dgm:txPr/>
+    <dgm:style>
+      <a:lnRef idx="1">
+        <a:scrgbClr r="0" g="0" b="0"/>
+      </a:lnRef>
+      <a:fillRef idx="3">
+        <a:scrgbClr r="0" g="0" b="0"/>
+      </a:fillRef>
+      <a:effectRef idx="3">
+        <a:scrgbClr r="0" g="0" b="0"/>
+      </a:effectRef>
+      <a:fontRef idx="minor">
+        <a:schemeClr val="lt1"/>
+      </a:fontRef>
+    </dgm:style>
+  </dgm:styleLbl>
+  <dgm:styleLbl name="node1">
+    <dgm:scene3d>
+      <a:camera prst="orthographicFront"/>
+      <a:lightRig rig="threePt" dir="t"/>
+    </dgm:scene3d>
+    <dgm:sp3d/>
+    <dgm:txPr/>
+    <dgm:style>
+      <a:lnRef idx="0">
+        <a:scrgbClr r="0" g="0" b="0"/>
+      </a:lnRef>
+      <a:fillRef idx="3">
+        <a:scrgbClr r="0" g="0" b="0"/>
+      </a:fillRef>
+      <a:effectRef idx="3">
+        <a:scrgbClr r="0" g="0" b="0"/>
+      </a:effectRef>
+      <a:fontRef idx="minor">
+        <a:schemeClr val="lt1"/>
+      </a:fontRef>
+    </dgm:style>
+  </dgm:styleLbl>
+  <dgm:styleLbl name="node2">
+    <dgm:scene3d>
+      <a:camera prst="orthographicFront"/>
+      <a:lightRig rig="threePt" dir="t"/>
+    </dgm:scene3d>
+    <dgm:sp3d/>
+    <dgm:txPr/>
+    <dgm:style>
+      <a:lnRef idx="0">
+        <a:scrgbClr r="0" g="0" b="0"/>
+      </a:lnRef>
+      <a:fillRef idx="3">
+        <a:scrgbClr r="0" g="0" b="0"/>
+      </a:fillRef>
+      <a:effectRef idx="3">
+        <a:scrgbClr r="0" g="0" b="0"/>
+      </a:effectRef>
+      <a:fontRef idx="minor">
+        <a:schemeClr val="lt1"/>
+      </a:fontRef>
+    </dgm:style>
+  </dgm:styleLbl>
+  <dgm:styleLbl name="node3">
+    <dgm:scene3d>
+      <a:camera prst="orthographicFront"/>
+      <a:lightRig rig="threePt" dir="t"/>
+    </dgm:scene3d>
+    <dgm:sp3d/>
+    <dgm:txPr/>
+    <dgm:style>
+      <a:lnRef idx="0">
+        <a:scrgbClr r="0" g="0" b="0"/>
+      </a:lnRef>
+      <a:fillRef idx="3">
+        <a:scrgbClr r="0" g="0" b="0"/>
+      </a:fillRef>
+      <a:effectRef idx="3">
+        <a:scrgbClr r="0" g="0" b="0"/>
+      </a:effectRef>
+      <a:fontRef idx="minor">
+        <a:schemeClr val="lt1"/>
+      </a:fontRef>
+    </dgm:style>
+  </dgm:styleLbl>
+  <dgm:styleLbl name="node4">
+    <dgm:scene3d>
+      <a:camera prst="orthographicFront"/>
+      <a:lightRig rig="threePt" dir="t"/>
+    </dgm:scene3d>
+    <dgm:sp3d/>
+    <dgm:txPr/>
+    <dgm:style>
+      <a:lnRef idx="0">
+        <a:scrgbClr r="0" g="0" b="0"/>
+      </a:lnRef>
+      <a:fillRef idx="3">
+        <a:scrgbClr r="0" g="0" b="0"/>
+      </a:fillRef>
+      <a:effectRef idx="3">
+        <a:scrgbClr r="0" g="0" b="0"/>
+      </a:effectRef>
+      <a:fontRef idx="minor">
+        <a:schemeClr val="lt1"/>
+      </a:fontRef>
+    </dgm:style>
+  </dgm:styleLbl>
+  <dgm:styleLbl name="fgImgPlace1">
+    <dgm:scene3d>
+      <a:camera prst="orthographicFront"/>
+      <a:lightRig rig="threePt" dir="t"/>
+    </dgm:scene3d>
+    <dgm:sp3d/>
+    <dgm:txPr/>
+    <dgm:style>
+      <a:lnRef idx="0">
+        <a:scrgbClr r="0" g="0" b="0"/>
+      </a:lnRef>
+      <a:fillRef idx="1">
+        <a:scrgbClr r="0" g="0" b="0"/>
+      </a:fillRef>
+      <a:effectRef idx="3">
+        <a:scrgbClr r="0" g="0" b="0"/>
+      </a:effectRef>
+      <a:fontRef idx="minor"/>
+    </dgm:style>
+  </dgm:styleLbl>
+  <dgm:styleLbl name="alignImgPlace1">
+    <dgm:scene3d>
+      <a:camera prst="orthographicFront"/>
+      <a:lightRig rig="threePt" dir="t"/>
+    </dgm:scene3d>
+    <dgm:sp3d/>
+    <dgm:txPr/>
+    <dgm:style>
+      <a:lnRef idx="0">
+        <a:scrgbClr r="0" g="0" b="0"/>
+      </a:lnRef>
+      <a:fillRef idx="1">
+        <a:scrgbClr r="0" g="0" b="0"/>
+      </a:fillRef>
+      <a:effectRef idx="3">
+        <a:scrgbClr r="0" g="0" b="0"/>
+      </a:effectRef>
+      <a:fontRef idx="minor"/>
+    </dgm:style>
+  </dgm:styleLbl>
+  <dgm:styleLbl name="bgImgPlace1">
+    <dgm:scene3d>
+      <a:camera prst="orthographicFront"/>
+      <a:lightRig rig="threePt" dir="t"/>
+    </dgm:scene3d>
+    <dgm:sp3d/>
+    <dgm:txPr/>
+    <dgm:style>
+      <a:lnRef idx="0">
+        <a:scrgbClr r="0" g="0" b="0"/>
+      </a:lnRef>
+      <a:fillRef idx="1">
+        <a:scrgbClr r="0" g="0" b="0"/>
+      </a:fillRef>
+      <a:effectRef idx="3">
+        <a:scrgbClr r="0" g="0" b="0"/>
+      </a:effectRef>
+      <a:fontRef idx="minor"/>
+    </dgm:style>
+  </dgm:styleLbl>
+  <dgm:styleLbl name="sibTrans2D1">
+    <dgm:scene3d>
+      <a:camera prst="orthographicFront"/>
+      <a:lightRig rig="threePt" dir="t"/>
+    </dgm:scene3d>
+    <dgm:sp3d/>
+    <dgm:txPr/>
+    <dgm:style>
+      <a:lnRef idx="0">
+        <a:scrgbClr r="0" g="0" b="0"/>
+      </a:lnRef>
+      <a:fillRef idx="3">
+        <a:scrgbClr r="0" g="0" b="0"/>
+      </a:fillRef>
+      <a:effectRef idx="3">
+        <a:scrgbClr r="0" g="0" b="0"/>
+      </a:effectRef>
+      <a:fontRef idx="minor">
+        <a:schemeClr val="lt1"/>
+      </a:fontRef>
+    </dgm:style>
+  </dgm:styleLbl>
+  <dgm:styleLbl name="fgSibTrans2D1">
+    <dgm:scene3d>
+      <a:camera prst="orthographicFront"/>
+      <a:lightRig rig="threePt" dir="t"/>
+    </dgm:scene3d>
+    <dgm:sp3d/>
+    <dgm:txPr/>
+    <dgm:style>
+      <a:lnRef idx="0">
+        <a:scrgbClr r="0" g="0" b="0"/>
+      </a:lnRef>
+      <a:fillRef idx="3">
+        <a:scrgbClr r="0" g="0" b="0"/>
+      </a:fillRef>
+      <a:effectRef idx="3">
+        <a:scrgbClr r="0" g="0" b="0"/>
+      </a:effectRef>
+      <a:fontRef idx="minor">
+        <a:schemeClr val="lt1"/>
+      </a:fontRef>
+    </dgm:style>
+  </dgm:styleLbl>
+  <dgm:styleLbl name="bgSibTrans2D1">
+    <dgm:scene3d>
+      <a:camera prst="orthographicFront"/>
+      <a:lightRig rig="threePt" dir="t"/>
+    </dgm:scene3d>
+    <dgm:sp3d/>
+    <dgm:txPr/>
+    <dgm:style>
+      <a:lnRef idx="0">
+        <a:scrgbClr r="0" g="0" b="0"/>
+      </a:lnRef>
+      <a:fillRef idx="3">
+        <a:scrgbClr r="0" g="0" b="0"/>
+      </a:fillRef>
+      <a:effectRef idx="3">
+        <a:scrgbClr r="0" g="0" b="0"/>
+      </a:effectRef>
+      <a:fontRef idx="minor">
+        <a:schemeClr val="lt1"/>
+      </a:fontRef>
+    </dgm:style>
+  </dgm:styleLbl>
+  <dgm:styleLbl name="sibTrans1D1">
+    <dgm:scene3d>
+      <a:camera prst="orthographicFront"/>
+      <a:lightRig rig="threePt" dir="t"/>
+    </dgm:scene3d>
+    <dgm:sp3d/>
+    <dgm:txPr/>
+    <dgm:style>
+      <a:lnRef idx="1">
+        <a:scrgbClr r="0" g="0" b="0"/>
+      </a:lnRef>
+      <a:fillRef idx="0">
+        <a:scrgbClr r="0" g="0" b="0"/>
+      </a:fillRef>
+      <a:effectRef idx="0">
+        <a:scrgbClr r="0" g="0" b="0"/>
+      </a:effectRef>
+      <a:fontRef idx="minor"/>
+    </dgm:style>
+  </dgm:styleLbl>
+  <dgm:styleLbl name="callout">
+    <dgm:scene3d>
+      <a:camera prst="orthographicFront"/>
+      <a:lightRig rig="threePt" dir="t"/>
+    </dgm:scene3d>
+    <dgm:sp3d/>
+    <dgm:txPr/>
+    <dgm:style>
+      <a:lnRef idx="1">
+        <a:scrgbClr r="0" g="0" b="0"/>
+      </a:lnRef>
+      <a:fillRef idx="0">
+        <a:scrgbClr r="0" g="0" b="0"/>
+      </a:fillRef>
+      <a:effectRef idx="1">
+        <a:scrgbClr r="0" g="0" b="0"/>
+      </a:effectRef>
+      <a:fontRef idx="minor"/>
+    </dgm:style>
+  </dgm:styleLbl>
+  <dgm:styleLbl name="asst0">
+    <dgm:scene3d>
+      <a:camera prst="orthographicFront"/>
+      <a:lightRig rig="threePt" dir="t"/>
+    </dgm:scene3d>
+    <dgm:sp3d/>
+    <dgm:txPr/>
+    <dgm:style>
+      <a:lnRef idx="0">
+        <a:scrgbClr r="0" g="0" b="0"/>
+      </a:lnRef>
+      <a:fillRef idx="3">
+        <a:scrgbClr r="0" g="0" b="0"/>
+      </a:fillRef>
+      <a:effectRef idx="3">
+        <a:scrgbClr r="0" g="0" b="0"/>
+      </a:effectRef>
+      <a:fontRef idx="minor">
+        <a:schemeClr val="lt1"/>
+      </a:fontRef>
+    </dgm:style>
+  </dgm:styleLbl>
+  <dgm:styleLbl name="asst1">
+    <dgm:scene3d>
+      <a:camera prst="orthographicFront"/>
+      <a:lightRig rig="threePt" dir="t"/>
+    </dgm:scene3d>
+    <dgm:sp3d/>
+    <dgm:txPr/>
+    <dgm:style>
+      <a:lnRef idx="0">
+        <a:scrgbClr r="0" g="0" b="0"/>
+      </a:lnRef>
+      <a:fillRef idx="3">
+        <a:scrgbClr r="0" g="0" b="0"/>
+      </a:fillRef>
+      <a:effectRef idx="3">
+        <a:scrgbClr r="0" g="0" b="0"/>
+      </a:effectRef>
+      <a:fontRef idx="minor">
+        <a:schemeClr val="lt1"/>
+      </a:fontRef>
+    </dgm:style>
+  </dgm:styleLbl>
+  <dgm:styleLbl name="asst2">
+    <dgm:scene3d>
+      <a:camera prst="orthographicFront"/>
+      <a:lightRig rig="threePt" dir="t"/>
+    </dgm:scene3d>
+    <dgm:sp3d/>
+    <dgm:txPr/>
+    <dgm:style>
+      <a:lnRef idx="0">
+        <a:scrgbClr r="0" g="0" b="0"/>
+      </a:lnRef>
+      <a:fillRef idx="3">
+        <a:scrgbClr r="0" g="0" b="0"/>
+      </a:fillRef>
+      <a:effectRef idx="3">
+        <a:scrgbClr r="0" g="0" b="0"/>
+      </a:effectRef>
+      <a:fontRef idx="minor">
+        <a:schemeClr val="lt1"/>
+      </a:fontRef>
+    </dgm:style>
+  </dgm:styleLbl>
+  <dgm:styleLbl name="asst3">
+    <dgm:scene3d>
+      <a:camera prst="orthographicFront"/>
+      <a:lightRig rig="threePt" dir="t"/>
+    </dgm:scene3d>
+    <dgm:sp3d/>
+    <dgm:txPr/>
+    <dgm:style>
+      <a:lnRef idx="0">
+        <a:scrgbClr r="0" g="0" b="0"/>
+      </a:lnRef>
+      <a:fillRef idx="3">
+        <a:scrgbClr r="0" g="0" b="0"/>
+      </a:fillRef>
+      <a:effectRef idx="3">
+        <a:scrgbClr r="0" g="0" b="0"/>
+      </a:effectRef>
+      <a:fontRef idx="minor">
+        <a:schemeClr val="lt1"/>
+      </a:fontRef>
+    </dgm:style>
+  </dgm:styleLbl>
+  <dgm:styleLbl name="asst4">
+    <dgm:scene3d>
+      <a:camera prst="orthographicFront"/>
+      <a:lightRig rig="threePt" dir="t"/>
+    </dgm:scene3d>
+    <dgm:sp3d/>
+    <dgm:txPr/>
+    <dgm:style>
+      <a:lnRef idx="0">
+        <a:scrgbClr r="0" g="0" b="0"/>
+      </a:lnRef>
+      <a:fillRef idx="3">
+        <a:scrgbClr r="0" g="0" b="0"/>
+      </a:fillRef>
+      <a:effectRef idx="3">
+        <a:scrgbClr r="0" g="0" b="0"/>
+      </a:effectRef>
+      <a:fontRef idx="minor">
+        <a:schemeClr val="lt1"/>
+      </a:fontRef>
+    </dgm:style>
+  </dgm:styleLbl>
+  <dgm:styleLbl name="parChTrans2D1">
+    <dgm:scene3d>
+      <a:camera prst="orthographicFront"/>
+      <a:lightRig rig="threePt" dir="t"/>
+    </dgm:scene3d>
+    <dgm:sp3d/>
+    <dgm:txPr/>
+    <dgm:style>
+      <a:lnRef idx="0">
+        <a:scrgbClr r="0" g="0" b="0"/>
+      </a:lnRef>
+      <a:fillRef idx="3">
+        <a:scrgbClr r="0" g="0" b="0"/>
+      </a:fillRef>
+      <a:effectRef idx="3">
+        <a:scrgbClr r="0" g="0" b="0"/>
+      </a:effectRef>
+      <a:fontRef idx="minor">
+        <a:schemeClr val="lt1"/>
+      </a:fontRef>
+    </dgm:style>
+  </dgm:styleLbl>
+  <dgm:styleLbl name="parChTrans2D2">
+    <dgm:scene3d>
+      <a:camera prst="orthographicFront"/>
+      <a:lightRig rig="threePt" dir="t"/>
+    </dgm:scene3d>
+    <dgm:sp3d/>
+    <dgm:txPr/>
+    <dgm:style>
+      <a:lnRef idx="0">
+        <a:scrgbClr r="0" g="0" b="0"/>
+      </a:lnRef>
+      <a:fillRef idx="3">
+        <a:scrgbClr r="0" g="0" b="0"/>
+      </a:fillRef>
+      <a:effectRef idx="3">
+        <a:scrgbClr r="0" g="0" b="0"/>
+      </a:effectRef>
+      <a:fontRef idx="minor">
+        <a:schemeClr val="lt1"/>
+      </a:fontRef>
+    </dgm:style>
+  </dgm:styleLbl>
+  <dgm:styleLbl name="parChTrans2D3">
+    <dgm:scene3d>
+      <a:camera prst="orthographicFront"/>
+      <a:lightRig rig="threePt" dir="t"/>
+    </dgm:scene3d>
+    <dgm:sp3d/>
+    <dgm:txPr/>
+    <dgm:style>
+      <a:lnRef idx="0">
+        <a:scrgbClr r="0" g="0" b="0"/>
+      </a:lnRef>
+      <a:fillRef idx="3">
+        <a:scrgbClr r="0" g="0" b="0"/>
+      </a:fillRef>
+      <a:effectRef idx="3">
+        <a:scrgbClr r="0" g="0" b="0"/>
+      </a:effectRef>
+      <a:fontRef idx="minor">
+        <a:schemeClr val="lt1"/>
+      </a:fontRef>
+    </dgm:style>
+  </dgm:styleLbl>
+  <dgm:styleLbl name="parChTrans2D4">
+    <dgm:scene3d>
+      <a:camera prst="orthographicFront"/>
+      <a:lightRig rig="threePt" dir="t"/>
+    </dgm:scene3d>
+    <dgm:sp3d/>
+    <dgm:txPr/>
+    <dgm:style>
+      <a:lnRef idx="0">
+        <a:scrgbClr r="0" g="0" b="0"/>
+      </a:lnRef>
+      <a:fillRef idx="3">
+        <a:scrgbClr r="0" g="0" b="0"/>
+      </a:fillRef>
+      <a:effectRef idx="3">
+        <a:scrgbClr r="0" g="0" b="0"/>
+      </a:effectRef>
+      <a:fontRef idx="minor">
+        <a:schemeClr val="lt1"/>
+      </a:fontRef>
+    </dgm:style>
+  </dgm:styleLbl>
+  <dgm:styleLbl name="parChTrans1D1">
+    <dgm:scene3d>
+      <a:camera prst="orthographicFront"/>
+      <a:lightRig rig="threePt" dir="t"/>
+    </dgm:scene3d>
+    <dgm:sp3d/>
+    <dgm:txPr/>
+    <dgm:style>
+      <a:lnRef idx="2">
+        <a:scrgbClr r="0" g="0" b="0"/>
+      </a:lnRef>
+      <a:fillRef idx="0">
+        <a:scrgbClr r="0" g="0" b="0"/>
+      </a:fillRef>
+      <a:effectRef idx="0">
+        <a:scrgbClr r="0" g="0" b="0"/>
+      </a:effectRef>
+      <a:fontRef idx="minor"/>
+    </dgm:style>
+  </dgm:styleLbl>
+  <dgm:styleLbl name="parChTrans1D2">
+    <dgm:scene3d>
+      <a:camera prst="orthographicFront"/>
+      <a:lightRig rig="threePt" dir="t"/>
+    </dgm:scene3d>
+    <dgm:sp3d/>
+    <dgm:txPr/>
+    <dgm:style>
+      <a:lnRef idx="2">
+        <a:scrgbClr r="0" g="0" b="0"/>
+      </a:lnRef>
+      <a:fillRef idx="0">
+        <a:scrgbClr r="0" g="0" b="0"/>
+      </a:fillRef>
+      <a:effectRef idx="0">
+        <a:scrgbClr r="0" g="0" b="0"/>
+      </a:effectRef>
+      <a:fontRef idx="minor"/>
+    </dgm:style>
+  </dgm:styleLbl>
+  <dgm:styleLbl name="parChTrans1D3">
+    <dgm:scene3d>
+      <a:camera prst="orthographicFront"/>
+      <a:lightRig rig="threePt" dir="t"/>
+    </dgm:scene3d>
+    <dgm:sp3d/>
+    <dgm:txPr/>
+    <dgm:style>
+      <a:lnRef idx="2">
+        <a:scrgbClr r="0" g="0" b="0"/>
+      </a:lnRef>
+      <a:fillRef idx="0">
+        <a:scrgbClr r="0" g="0" b="0"/>
+      </a:fillRef>
+      <a:effectRef idx="0">
+        <a:scrgbClr r="0" g="0" b="0"/>
+      </a:effectRef>
+      <a:fontRef idx="minor"/>
+    </dgm:style>
+  </dgm:styleLbl>
+  <dgm:styleLbl name="parChTrans1D4">
+    <dgm:scene3d>
+      <a:camera prst="orthographicFront"/>
+      <a:lightRig rig="threePt" dir="t"/>
+    </dgm:scene3d>
+    <dgm:sp3d/>
+    <dgm:txPr/>
+    <dgm:style>
+      <a:lnRef idx="2">
+        <a:scrgbClr r="0" g="0" b="0"/>
+      </a:lnRef>
+      <a:fillRef idx="0">
+        <a:scrgbClr r="0" g="0" b="0"/>
+      </a:fillRef>
+      <a:effectRef idx="0">
+        <a:scrgbClr r="0" g="0" b="0"/>
+      </a:effectRef>
+      <a:fontRef idx="minor"/>
+    </dgm:style>
+  </dgm:styleLbl>
+  <dgm:styleLbl name="fgAcc1">
+    <dgm:scene3d>
+      <a:camera prst="orthographicFront"/>
+      <a:lightRig rig="threePt" dir="t"/>
+    </dgm:scene3d>
+    <dgm:sp3d/>
+    <dgm:txPr/>
+    <dgm:style>
+      <a:lnRef idx="1">
+        <a:scrgbClr r="0" g="0" b="0"/>
+      </a:lnRef>
+      <a:fillRef idx="1">
+        <a:scrgbClr r="0" g="0" b="0"/>
+      </a:fillRef>
+      <a:effectRef idx="2">
+        <a:scrgbClr r="0" g="0" b="0"/>
+      </a:effectRef>
+      <a:fontRef idx="minor"/>
+    </dgm:style>
+  </dgm:styleLbl>
+  <dgm:styleLbl name="conFgAcc1">
+    <dgm:scene3d>
+      <a:camera prst="orthographicFront"/>
+      <a:lightRig rig="threePt" dir="t"/>
+    </dgm:scene3d>
+    <dgm:sp3d/>
+    <dgm:txPr/>
+    <dgm:style>
+      <a:lnRef idx="1">
+        <a:scrgbClr r="0" g="0" b="0"/>
+      </a:lnRef>
+      <a:fillRef idx="1">
+        <a:scrgbClr r="0" g="0" b="0"/>
+      </a:fillRef>
+      <a:effectRef idx="2">
+        <a:scrgbClr r="0" g="0" b="0"/>
+      </a:effectRef>
+      <a:fontRef idx="minor"/>
+    </dgm:style>
+  </dgm:styleLbl>
+  <dgm:styleLbl name="alignAcc1">
+    <dgm:scene3d>
+      <a:camera prst="orthographicFront"/>
+      <a:lightRig rig="threePt" dir="t"/>
+    </dgm:scene3d>
+    <dgm:sp3d/>
+    <dgm:txPr/>
+    <dgm:style>
+      <a:lnRef idx="1">
+        <a:scrgbClr r="0" g="0" b="0"/>
+      </a:lnRef>
+      <a:fillRef idx="1">
+        <a:scrgbClr r="0" g="0" b="0"/>
+      </a:fillRef>
+      <a:effectRef idx="2">
+        <a:scrgbClr r="0" g="0" b="0"/>
+      </a:effectRef>
+      <a:fontRef idx="minor"/>
+    </dgm:style>
+  </dgm:styleLbl>
+  <dgm:styleLbl name="trAlignAcc1">
+    <dgm:scene3d>
+      <a:camera prst="orthographicFront"/>
+      <a:lightRig rig="threePt" dir="t"/>
+    </dgm:scene3d>
+    <dgm:sp3d/>
+    <dgm:txPr/>
+    <dgm:style>
+      <a:lnRef idx="1">
+        <a:scrgbClr r="0" g="0" b="0"/>
+      </a:lnRef>
+      <a:fillRef idx="1">
+        <a:scrgbClr r="0" g="0" b="0"/>
+      </a:fillRef>
+      <a:effectRef idx="0">
+        <a:scrgbClr r="0" g="0" b="0"/>
+      </a:effectRef>
+      <a:fontRef idx="minor"/>
+    </dgm:style>
+  </dgm:styleLbl>
+  <dgm:styleLbl name="bgAcc1">
+    <dgm:scene3d>
+      <a:camera prst="orthographicFront"/>
+      <a:lightRig rig="threePt" dir="t"/>
+    </dgm:scene3d>
+    <dgm:sp3d/>
+    <dgm:txPr/>
+    <dgm:style>
+      <a:lnRef idx="1">
+        <a:scrgbClr r="0" g="0" b="0"/>
+      </a:lnRef>
+      <a:fillRef idx="1">
+        <a:scrgbClr r="0" g="0" b="0"/>
+      </a:fillRef>
+      <a:effectRef idx="2">
+        <a:scrgbClr r="0" g="0" b="0"/>
+      </a:effectRef>
+      <a:fontRef idx="minor"/>
+    </dgm:style>
+  </dgm:styleLbl>
+  <dgm:styleLbl name="solidFgAcc1">
+    <dgm:scene3d>
+      <a:camera prst="orthographicFront"/>
+      <a:lightRig rig="threePt" dir="t"/>
+    </dgm:scene3d>
+    <dgm:sp3d/>
+    <dgm:txPr/>
+    <dgm:style>
+      <a:lnRef idx="1">
+        <a:scrgbClr r="0" g="0" b="0"/>
+      </a:lnRef>
+      <a:fillRef idx="1">
+        <a:scrgbClr r="0" g="0" b="0"/>
+      </a:fillRef>
+      <a:effectRef idx="2">
+        <a:scrgbClr r="0" g="0" b="0"/>
+      </a:effectRef>
+      <a:fontRef idx="minor"/>
+    </dgm:style>
+  </dgm:styleLbl>
+  <dgm:styleLbl name="solidAlignAcc1">
+    <dgm:scene3d>
+      <a:camera prst="orthographicFront"/>
+      <a:lightRig rig="threePt" dir="t"/>
+    </dgm:scene3d>
+    <dgm:sp3d/>
+    <dgm:txPr/>
+    <dgm:style>
+      <a:lnRef idx="1">
+        <a:scrgbClr r="0" g="0" b="0"/>
+      </a:lnRef>
+      <a:fillRef idx="1">
+        <a:scrgbClr r="0" g="0" b="0"/>
+      </a:fillRef>
+      <a:effectRef idx="3">
+        <a:scrgbClr r="0" g="0" b="0"/>
+      </a:effectRef>
+      <a:fontRef idx="minor"/>
+    </dgm:style>
+  </dgm:styleLbl>
+  <dgm:styleLbl name="solidBgAcc1">
+    <dgm:scene3d>
+      <a:camera prst="orthographicFront"/>
+      <a:lightRig rig="threePt" dir="t"/>
+    </dgm:scene3d>
+    <dgm:sp3d/>
+    <dgm:txPr/>
+    <dgm:style>
+      <a:lnRef idx="1">
+        <a:scrgbClr r="0" g="0" b="0"/>
+      </a:lnRef>
+      <a:fillRef idx="1">
+        <a:scrgbClr r="0" g="0" b="0"/>
+      </a:fillRef>
+      <a:effectRef idx="3">
+        <a:scrgbClr r="0" g="0" b="0"/>
+      </a:effectRef>
+      <a:fontRef idx="minor"/>
+    </dgm:style>
+  </dgm:styleLbl>
+  <dgm:styleLbl name="fgAccFollowNode1">
+    <dgm:scene3d>
+      <a:camera prst="orthographicFront"/>
+      <a:lightRig rig="threePt" dir="t"/>
+    </dgm:scene3d>
+    <dgm:sp3d/>
+    <dgm:txPr/>
+    <dgm:style>
+      <a:lnRef idx="1">
+        <a:scrgbClr r="0" g="0" b="0"/>
+      </a:lnRef>
+      <a:fillRef idx="1">
+        <a:scrgbClr r="0" g="0" b="0"/>
+      </a:fillRef>
+      <a:effectRef idx="2">
+        <a:scrgbClr r="0" g="0" b="0"/>
+      </a:effectRef>
+      <a:fontRef idx="minor"/>
+    </dgm:style>
+  </dgm:styleLbl>
+  <dgm:styleLbl name="alignAccFollowNode1">
+    <dgm:scene3d>
+      <a:camera prst="orthographicFront"/>
+      <a:lightRig rig="threePt" dir="t"/>
+    </dgm:scene3d>
+    <dgm:sp3d/>
+    <dgm:txPr/>
+    <dgm:style>
+      <a:lnRef idx="1">
+        <a:scrgbClr r="0" g="0" b="0"/>
+      </a:lnRef>
+      <a:fillRef idx="1">
+        <a:scrgbClr r="0" g="0" b="0"/>
+      </a:fillRef>
+      <a:effectRef idx="2">
+        <a:scrgbClr r="0" g="0" b="0"/>
+      </a:effectRef>
+      <a:fontRef idx="minor"/>
+    </dgm:style>
+  </dgm:styleLbl>
+  <dgm:styleLbl name="bgAccFollowNode1">
+    <dgm:scene3d>
+      <a:camera prst="orthographicFront"/>
+      <a:lightRig rig="threePt" dir="t"/>
+    </dgm:scene3d>
+    <dgm:sp3d/>
+    <dgm:txPr/>
+    <dgm:style>
+      <a:lnRef idx="1">
+        <a:scrgbClr r="0" g="0" b="0"/>
+      </a:lnRef>
+      <a:fillRef idx="1">
+        <a:scrgbClr r="0" g="0" b="0"/>
+      </a:fillRef>
+      <a:effectRef idx="2">
+        <a:scrgbClr r="0" g="0" b="0"/>
+      </a:effectRef>
+      <a:fontRef idx="minor"/>
+    </dgm:style>
+  </dgm:styleLbl>
+  <dgm:styleLbl name="fgAcc0">
+    <dgm:scene3d>
+      <a:camera prst="orthographicFront"/>
+      <a:lightRig rig="threePt" dir="t"/>
+    </dgm:scene3d>
+    <dgm:sp3d/>
+    <dgm:txPr/>
+    <dgm:style>
+      <a:lnRef idx="1">
+        <a:scrgbClr r="0" g="0" b="0"/>
+      </a:lnRef>
+      <a:fillRef idx="1">
+        <a:scrgbClr r="0" g="0" b="0"/>
+      </a:fillRef>
+      <a:effectRef idx="2">
+        <a:scrgbClr r="0" g="0" b="0"/>
+      </a:effectRef>
+      <a:fontRef idx="minor"/>
+    </dgm:style>
+  </dgm:styleLbl>
+  <dgm:styleLbl name="fgAcc2">
+    <dgm:scene3d>
+      <a:camera prst="orthographicFront"/>
+      <a:lightRig rig="threePt" dir="t"/>
+    </dgm:scene3d>
+    <dgm:sp3d/>
+    <dgm:txPr/>
+    <dgm:style>
+      <a:lnRef idx="1">
+        <a:scrgbClr r="0" g="0" b="0"/>
+      </a:lnRef>
+      <a:fillRef idx="1">
+        <a:scrgbClr r="0" g="0" b="0"/>
+      </a:fillRef>
+      <a:effectRef idx="2">
+        <a:scrgbClr r="0" g="0" b="0"/>
+      </a:effectRef>
+      <a:fontRef idx="minor"/>
+    </dgm:style>
+  </dgm:styleLbl>
+  <dgm:styleLbl name="fgAcc3">
+    <dgm:scene3d>
+      <a:camera prst="orthographicFront"/>
+      <a:lightRig rig="threePt" dir="t"/>
+    </dgm:scene3d>
+    <dgm:sp3d/>
+    <dgm:txPr/>
+    <dgm:style>
+      <a:lnRef idx="1">
+        <a:scrgbClr r="0" g="0" b="0"/>
+      </a:lnRef>
+      <a:fillRef idx="1">
+        <a:scrgbClr r="0" g="0" b="0"/>
+      </a:fillRef>
+      <a:effectRef idx="2">
+        <a:scrgbClr r="0" g="0" b="0"/>
+      </a:effectRef>
+      <a:fontRef idx="minor"/>
+    </dgm:style>
+  </dgm:styleLbl>
+  <dgm:styleLbl name="fgAcc4">
+    <dgm:scene3d>
+      <a:camera prst="orthographicFront"/>
+      <a:lightRig rig="threePt" dir="t"/>
+    </dgm:scene3d>
+    <dgm:sp3d/>
+    <dgm:txPr/>
+    <dgm:style>
+      <a:lnRef idx="1">
+        <a:scrgbClr r="0" g="0" b="0"/>
+      </a:lnRef>
+      <a:fillRef idx="1">
+        <a:scrgbClr r="0" g="0" b="0"/>
+      </a:fillRef>
+      <a:effectRef idx="2">
+        <a:scrgbClr r="0" g="0" b="0"/>
+      </a:effectRef>
+      <a:fontRef idx="minor"/>
+    </dgm:style>
+  </dgm:styleLbl>
+  <dgm:styleLbl name="bgShp">
+    <dgm:scene3d>
+      <a:camera prst="orthographicFront"/>
+      <a:lightRig rig="threePt" dir="t"/>
+    </dgm:scene3d>
+    <dgm:sp3d/>
+    <dgm:txPr/>
+    <dgm:style>
+      <a:lnRef idx="0">
+        <a:scrgbClr r="0" g="0" b="0"/>
+      </a:lnRef>
+      <a:fillRef idx="1">
+        <a:scrgbClr r="0" g="0" b="0"/>
+      </a:fillRef>
+      <a:effectRef idx="2">
+        <a:scrgbClr r="0" g="0" b="0"/>
+      </a:effectRef>
+      <a:fontRef idx="minor"/>
+    </dgm:style>
+  </dgm:styleLbl>
+  <dgm:styleLbl name="dkBgShp">
+    <dgm:scene3d>
+      <a:camera prst="orthographicFront"/>
+      <a:lightRig rig="threePt" dir="t"/>
+    </dgm:scene3d>
+    <dgm:sp3d/>
+    <dgm:txPr/>
+    <dgm:style>
+      <a:lnRef idx="0">
+        <a:scrgbClr r="0" g="0" b="0"/>
+      </a:lnRef>
+      <a:fillRef idx="1">
+        <a:scrgbClr r="0" g="0" b="0"/>
+      </a:fillRef>
+      <a:effectRef idx="3">
+        <a:scrgbClr r="0" g="0" b="0"/>
+      </a:effectRef>
+      <a:fontRef idx="minor"/>
+    </dgm:style>
+  </dgm:styleLbl>
+  <dgm:styleLbl name="trBgShp">
+    <dgm:scene3d>
+      <a:camera prst="orthographicFront"/>
+      <a:lightRig rig="threePt" dir="t"/>
+    </dgm:scene3d>
+    <dgm:sp3d/>
+    <dgm:txPr/>
+    <dgm:style>
+      <a:lnRef idx="0">
+        <a:scrgbClr r="0" g="0" b="0"/>
+      </a:lnRef>
+      <a:fillRef idx="1">
+        <a:scrgbClr r="0" g="0" b="0"/>
+      </a:fillRef>
+      <a:effectRef idx="0">
+        <a:scrgbClr r="0" g="0" b="0"/>
+      </a:effectRef>
+      <a:fontRef idx="minor"/>
+    </dgm:style>
+  </dgm:styleLbl>
+  <dgm:styleLbl name="fgShp">
+    <dgm:scene3d>
+      <a:camera prst="orthographicFront"/>
+      <a:lightRig rig="threePt" dir="t"/>
+    </dgm:scene3d>
+    <dgm:sp3d/>
+    <dgm:txPr/>
+    <dgm:style>
+      <a:lnRef idx="0">
+        <a:scrgbClr r="0" g="0" b="0"/>
+      </a:lnRef>
+      <a:fillRef idx="3">
+        <a:scrgbClr r="0" g="0" b="0"/>
+      </a:fillRef>
+      <a:effectRef idx="3">
+        <a:scrgbClr r="0" g="0" b="0"/>
+      </a:effectRef>
+      <a:fontRef idx="minor"/>
+    </dgm:style>
+  </dgm:styleLbl>
+  <dgm:styleLbl name="revTx">
+    <dgm:scene3d>
+      <a:camera prst="orthographicFront"/>
+      <a:lightRig rig="threePt" dir="t"/>
+    </dgm:scene3d>
+    <dgm:sp3d/>
+    <dgm:txPr/>
+    <dgm:style>
+      <a:lnRef idx="0">
+        <a:scrgbClr r="0" g="0" b="0"/>
+      </a:lnRef>
+      <a:fillRef idx="0">
+        <a:scrgbClr r="0" g="0" b="0"/>
+      </a:fillRef>
+      <a:effectRef idx="0">
+        <a:scrgbClr r="0" g="0" b="0"/>
+      </a:effectRef>
+      <a:fontRef idx="minor"/>
+    </dgm:style>
+  </dgm:styleLbl>
+</dgm:styleDef>
 </file>
 
 <file path=ppt/slideLayouts/slideLayout1.xml><?xml version="1.0" encoding="utf-8"?>
@@ -6999,12 +10490,14 @@
         </p:nvSpPr>
         <p:spPr/>
         <p:txBody>
-          <a:bodyPr/>
+          <a:bodyPr>
+            <a:normAutofit fontScale="90000"/>
+          </a:bodyPr>
           <a:lstStyle/>
           <a:p>
             <a:r>
               <a:rPr lang="en-US" dirty="0"/>
-              <a:t>Slide Index</a:t>
+              <a:t>Slide Index – Kill this eventually</a:t>
             </a:r>
           </a:p>
         </p:txBody>
@@ -7312,7 +10805,7 @@
                   </a:extLst>
                 </a:hlinkClick>
               </a:rPr>
-              <a:t>https://en.wikipedia.org/wiki/Electromagnetic_spectrum</a:t>
+              <a:t>https://en.wikipedia.org/wiki/Bayer_filter</a:t>
             </a:r>
             <a:endParaRPr lang="en-US" dirty="0">
               <a:solidFill>
@@ -7347,8 +10840,8 @@
         </p:blipFill>
         <p:spPr>
           <a:xfrm>
-            <a:off x="3381828" y="949430"/>
-            <a:ext cx="5762172" cy="3469058"/>
+            <a:off x="4673269" y="1200151"/>
+            <a:ext cx="4470731" cy="2860570"/>
           </a:xfrm>
           <a:prstGeom prst="rect">
             <a:avLst/>
@@ -7372,7 +10865,7 @@
         <p:spPr>
           <a:xfrm>
             <a:off x="457200" y="1200151"/>
-            <a:ext cx="8229600" cy="3394472"/>
+            <a:ext cx="4216069" cy="3025485"/>
           </a:xfrm>
           <a:prstGeom prst="rect">
             <a:avLst/>
@@ -7380,7 +10873,7 @@
         </p:spPr>
         <p:txBody>
           <a:bodyPr vert="horz" lIns="91440" tIns="45720" rIns="91440" bIns="45720" rtlCol="0">
-            <a:normAutofit/>
+            <a:normAutofit fontScale="62500" lnSpcReduction="20000"/>
           </a:bodyPr>
           <a:lstStyle>
             <a:lvl1pPr marL="342900" indent="-342900" algn="l" defTabSz="457200" rtl="0" eaLnBrk="1" latinLnBrk="0" hangingPunct="1">
@@ -7521,10 +11014,29 @@
           </a:lstStyle>
           <a:p>
             <a:r>
+              <a:rPr lang="en-US" dirty="0"/>
+              <a:t>Standard digital cameras use a color filter array on-top of the sensor’s pixel array to quantize the color response from a scene</a:t>
+            </a:r>
+          </a:p>
+          <a:p>
+            <a:r>
+              <a:rPr lang="en-US" dirty="0"/>
+              <a:t>The filters accept common peak wavelengths for R,G and B responses (R=620nm, G</a:t>
+            </a:r>
+            <a:r>
               <a:rPr lang="en-US"/>
-              <a:t>Standard RGB</a:t>
+              <a:t>=550nm, </a:t>
             </a:r>
-            <a:endParaRPr lang="en-US" dirty="0"/>
+            <a:r>
+              <a:rPr lang="en-US" dirty="0"/>
+              <a:t>B=470nm)</a:t>
+            </a:r>
+          </a:p>
+          <a:p>
+            <a:r>
+              <a:rPr lang="en-US" dirty="0"/>
+              <a:t>This produces images in the RGB feature space we are familiar with</a:t>
+            </a:r>
           </a:p>
           <a:p>
             <a:endParaRPr lang="en-US" dirty="0"/>
@@ -7814,6 +11326,86 @@
           <a:p>
             <a:r>
               <a:rPr lang="en-US" dirty="0"/>
+              <a:t>Processing Pipeline</a:t>
+            </a:r>
+          </a:p>
+        </p:txBody>
+      </p:sp>
+      <p:graphicFrame>
+        <p:nvGraphicFramePr>
+          <p:cNvPr id="5" name="Diagram 4">
+            <a:extLst>
+              <a:ext uri="{FF2B5EF4-FFF2-40B4-BE49-F238E27FC236}">
+                <a16:creationId xmlns:a16="http://schemas.microsoft.com/office/drawing/2014/main" id="{5EC89E4B-418E-44E5-9FA2-DEFAFDBC80B1}"/>
+              </a:ext>
+            </a:extLst>
+          </p:cNvPr>
+          <p:cNvGraphicFramePr/>
+          <p:nvPr>
+            <p:extLst>
+              <p:ext uri="{D42A27DB-BD31-4B8C-83A1-F6EECF244321}">
+                <p14:modId xmlns:p14="http://schemas.microsoft.com/office/powerpoint/2010/main" val="3398595370"/>
+              </p:ext>
+            </p:extLst>
+          </p:nvPr>
+        </p:nvGraphicFramePr>
+        <p:xfrm>
+          <a:off x="706582" y="372864"/>
+          <a:ext cx="7730836" cy="4397771"/>
+        </p:xfrm>
+        <a:graphic>
+          <a:graphicData uri="http://schemas.openxmlformats.org/drawingml/2006/diagram">
+            <dgm:relIds xmlns:dgm="http://schemas.openxmlformats.org/drawingml/2006/diagram" xmlns:r="http://schemas.openxmlformats.org/officeDocument/2006/relationships" r:dm="rId2" r:lo="rId3" r:qs="rId4" r:cs="rId5"/>
+          </a:graphicData>
+        </a:graphic>
+      </p:graphicFrame>
+    </p:spTree>
+    <p:extLst>
+      <p:ext uri="{BB962C8B-B14F-4D97-AF65-F5344CB8AC3E}">
+        <p14:creationId xmlns:p14="http://schemas.microsoft.com/office/powerpoint/2010/main" val="3542805984"/>
+      </p:ext>
+    </p:extLst>
+  </p:cSld>
+  <p:clrMapOvr>
+    <a:masterClrMapping/>
+  </p:clrMapOvr>
+</p:sld>
+</file>
+
+<file path=ppt/slides/slide7.xml><?xml version="1.0" encoding="utf-8"?>
+<p:sld xmlns:a="http://schemas.openxmlformats.org/drawingml/2006/main" xmlns:r="http://schemas.openxmlformats.org/officeDocument/2006/relationships" xmlns:p="http://schemas.openxmlformats.org/presentationml/2006/main">
+  <p:cSld>
+    <p:spTree>
+      <p:nvGrpSpPr>
+        <p:cNvPr id="1" name=""/>
+        <p:cNvGrpSpPr/>
+        <p:nvPr/>
+      </p:nvGrpSpPr>
+      <p:grpSpPr>
+        <a:xfrm>
+          <a:off x="0" y="0"/>
+          <a:ext cx="0" cy="0"/>
+          <a:chOff x="0" y="0"/>
+          <a:chExt cx="0" cy="0"/>
+        </a:xfrm>
+      </p:grpSpPr>
+      <p:sp>
+        <p:nvSpPr>
+          <p:cNvPr id="2" name="Title 1"/>
+          <p:cNvSpPr>
+            <a:spLocks noGrp="1"/>
+          </p:cNvSpPr>
+          <p:nvPr>
+            <p:ph type="title"/>
+          </p:nvPr>
+        </p:nvSpPr>
+        <p:spPr/>
+        <p:txBody>
+          <a:bodyPr/>
+          <a:lstStyle/>
+          <a:p>
+            <a:r>
+              <a:rPr lang="en-US" dirty="0"/>
               <a:t>Multispectral Segmentation</a:t>
             </a:r>
           </a:p>
@@ -7854,7 +11446,7 @@
 </p:sld>
 </file>
 
-<file path=ppt/slides/slide7.xml><?xml version="1.0" encoding="utf-8"?>
+<file path=ppt/slides/slide8.xml><?xml version="1.0" encoding="utf-8"?>
 <p:sld xmlns:a="http://schemas.openxmlformats.org/drawingml/2006/main" xmlns:r="http://schemas.openxmlformats.org/officeDocument/2006/relationships" xmlns:p="http://schemas.openxmlformats.org/presentationml/2006/main">
   <p:cSld>
     <p:spTree>

</xml_diff>

<commit_message>
Whole lot of power pointing going on
</commit_message>
<xml_diff>
--- a/Documentation/Cornett_Leach_Presentation.pptx
+++ b/Documentation/Cornett_Leach_Presentation.pptx
@@ -9,13 +9,28 @@
   </p:sldMasterIdLst>
   <p:sldIdLst>
     <p:sldId id="256" r:id="rId5"/>
-    <p:sldId id="257" r:id="rId6"/>
+    <p:sldId id="269" r:id="rId6"/>
     <p:sldId id="266" r:id="rId7"/>
-    <p:sldId id="265" r:id="rId8"/>
-    <p:sldId id="263" r:id="rId9"/>
-    <p:sldId id="267" r:id="rId10"/>
-    <p:sldId id="264" r:id="rId11"/>
-    <p:sldId id="262" r:id="rId12"/>
+    <p:sldId id="263" r:id="rId8"/>
+    <p:sldId id="268" r:id="rId9"/>
+    <p:sldId id="281" r:id="rId10"/>
+    <p:sldId id="271" r:id="rId11"/>
+    <p:sldId id="274" r:id="rId12"/>
+    <p:sldId id="279" r:id="rId13"/>
+    <p:sldId id="273" r:id="rId14"/>
+    <p:sldId id="272" r:id="rId15"/>
+    <p:sldId id="275" r:id="rId16"/>
+    <p:sldId id="276" r:id="rId17"/>
+    <p:sldId id="277" r:id="rId18"/>
+    <p:sldId id="278" r:id="rId19"/>
+    <p:sldId id="280" r:id="rId20"/>
+    <p:sldId id="282" r:id="rId21"/>
+    <p:sldId id="267" r:id="rId22"/>
+    <p:sldId id="283" r:id="rId23"/>
+    <p:sldId id="285" r:id="rId24"/>
+    <p:sldId id="270" r:id="rId25"/>
+    <p:sldId id="262" r:id="rId26"/>
+    <p:sldId id="257" r:id="rId27"/>
   </p:sldIdLst>
   <p:sldSz cx="9144000" cy="5143500" type="screen16x9"/>
   <p:notesSz cx="6858000" cy="9144000"/>
@@ -10461,7 +10476,2082 @@
 </p:sld>
 </file>
 
+<file path=ppt/slides/slide10.xml><?xml version="1.0" encoding="utf-8"?>
+<p:sld xmlns:a="http://schemas.openxmlformats.org/drawingml/2006/main" xmlns:r="http://schemas.openxmlformats.org/officeDocument/2006/relationships" xmlns:p="http://schemas.openxmlformats.org/presentationml/2006/main">
+  <p:cSld>
+    <p:spTree>
+      <p:nvGrpSpPr>
+        <p:cNvPr id="1" name=""/>
+        <p:cNvGrpSpPr/>
+        <p:nvPr/>
+      </p:nvGrpSpPr>
+      <p:grpSpPr>
+        <a:xfrm>
+          <a:off x="0" y="0"/>
+          <a:ext cx="0" cy="0"/>
+          <a:chOff x="0" y="0"/>
+          <a:chExt cx="0" cy="0"/>
+        </a:xfrm>
+      </p:grpSpPr>
+      <p:sp>
+        <p:nvSpPr>
+          <p:cNvPr id="2" name="Title 1"/>
+          <p:cNvSpPr>
+            <a:spLocks noGrp="1"/>
+          </p:cNvSpPr>
+          <p:nvPr>
+            <p:ph type="title"/>
+          </p:nvPr>
+        </p:nvSpPr>
+        <p:spPr/>
+        <p:txBody>
+          <a:bodyPr/>
+          <a:lstStyle/>
+          <a:p>
+            <a:r>
+              <a:rPr lang="en-US" dirty="0"/>
+              <a:t>Dataset</a:t>
+            </a:r>
+          </a:p>
+        </p:txBody>
+      </p:sp>
+      <p:sp>
+        <p:nvSpPr>
+          <p:cNvPr id="3" name="Content Placeholder 2"/>
+          <p:cNvSpPr>
+            <a:spLocks noGrp="1"/>
+          </p:cNvSpPr>
+          <p:nvPr>
+            <p:ph idx="1"/>
+          </p:nvPr>
+        </p:nvSpPr>
+        <p:spPr/>
+        <p:txBody>
+          <a:bodyPr>
+            <a:normAutofit fontScale="85000" lnSpcReduction="10000"/>
+          </a:bodyPr>
+          <a:lstStyle/>
+          <a:p>
+            <a:r>
+              <a:rPr lang="en-US" dirty="0"/>
+              <a:t>The camera we used can capture responses 400nm to 720nm at 1nm steps (321 responses)</a:t>
+            </a:r>
+          </a:p>
+          <a:p>
+            <a:r>
+              <a:rPr lang="en-US" dirty="0"/>
+              <a:t>For our dataset, we used responses with 10nm steps producing images with 32 spectral features</a:t>
+            </a:r>
+          </a:p>
+          <a:p>
+            <a:r>
+              <a:rPr lang="en-US" dirty="0"/>
+              <a:t>We created 10 image example sets (32 images per example).  These sets are made up of clothing of various colors and fabric types</a:t>
+            </a:r>
+          </a:p>
+          <a:p>
+            <a:endParaRPr lang="en-US" dirty="0"/>
+          </a:p>
+          <a:p>
+            <a:endParaRPr lang="en-US" dirty="0"/>
+          </a:p>
+        </p:txBody>
+      </p:sp>
+    </p:spTree>
+    <p:extLst>
+      <p:ext uri="{BB962C8B-B14F-4D97-AF65-F5344CB8AC3E}">
+        <p14:creationId xmlns:p14="http://schemas.microsoft.com/office/powerpoint/2010/main" val="1114508588"/>
+      </p:ext>
+    </p:extLst>
+  </p:cSld>
+  <p:clrMapOvr>
+    <a:masterClrMapping/>
+  </p:clrMapOvr>
+</p:sld>
+</file>
+
+<file path=ppt/slides/slide11.xml><?xml version="1.0" encoding="utf-8"?>
+<p:sld xmlns:a="http://schemas.openxmlformats.org/drawingml/2006/main" xmlns:r="http://schemas.openxmlformats.org/officeDocument/2006/relationships" xmlns:p="http://schemas.openxmlformats.org/presentationml/2006/main">
+  <p:cSld>
+    <p:spTree>
+      <p:nvGrpSpPr>
+        <p:cNvPr id="1" name=""/>
+        <p:cNvGrpSpPr/>
+        <p:nvPr/>
+      </p:nvGrpSpPr>
+      <p:grpSpPr>
+        <a:xfrm>
+          <a:off x="0" y="0"/>
+          <a:ext cx="0" cy="0"/>
+          <a:chOff x="0" y="0"/>
+          <a:chExt cx="0" cy="0"/>
+        </a:xfrm>
+      </p:grpSpPr>
+      <p:sp>
+        <p:nvSpPr>
+          <p:cNvPr id="2" name="Title 1"/>
+          <p:cNvSpPr>
+            <a:spLocks noGrp="1"/>
+          </p:cNvSpPr>
+          <p:nvPr>
+            <p:ph type="title"/>
+          </p:nvPr>
+        </p:nvSpPr>
+        <p:spPr/>
+        <p:txBody>
+          <a:bodyPr/>
+          <a:lstStyle/>
+          <a:p>
+            <a:r>
+              <a:rPr lang="en-US" dirty="0"/>
+              <a:t>Dataset</a:t>
+            </a:r>
+          </a:p>
+        </p:txBody>
+      </p:sp>
+      <p:pic>
+        <p:nvPicPr>
+          <p:cNvPr id="8" name="Picture 7">
+            <a:extLst>
+              <a:ext uri="{FF2B5EF4-FFF2-40B4-BE49-F238E27FC236}">
+                <a16:creationId xmlns:a16="http://schemas.microsoft.com/office/drawing/2014/main" id="{5C36049A-3FE9-4F6C-B03C-265C6F1F3D6D}"/>
+              </a:ext>
+            </a:extLst>
+          </p:cNvPr>
+          <p:cNvPicPr>
+            <a:picLocks noChangeAspect="1"/>
+          </p:cNvPicPr>
+          <p:nvPr/>
+        </p:nvPicPr>
+        <p:blipFill>
+          <a:blip r:embed="rId2"/>
+          <a:stretch>
+            <a:fillRect/>
+          </a:stretch>
+        </p:blipFill>
+        <p:spPr>
+          <a:xfrm>
+            <a:off x="957263" y="1161435"/>
+            <a:ext cx="3525786" cy="2820629"/>
+          </a:xfrm>
+          <a:prstGeom prst="rect">
+            <a:avLst/>
+          </a:prstGeom>
+        </p:spPr>
+      </p:pic>
+      <p:pic>
+        <p:nvPicPr>
+          <p:cNvPr id="9" name="Picture 8">
+            <a:extLst>
+              <a:ext uri="{FF2B5EF4-FFF2-40B4-BE49-F238E27FC236}">
+                <a16:creationId xmlns:a16="http://schemas.microsoft.com/office/drawing/2014/main" id="{A8662521-AFE1-4306-BB08-574222167A44}"/>
+              </a:ext>
+            </a:extLst>
+          </p:cNvPr>
+          <p:cNvPicPr>
+            <a:picLocks noChangeAspect="1"/>
+          </p:cNvPicPr>
+          <p:nvPr/>
+        </p:nvPicPr>
+        <p:blipFill>
+          <a:blip r:embed="rId3"/>
+          <a:stretch>
+            <a:fillRect/>
+          </a:stretch>
+        </p:blipFill>
+        <p:spPr>
+          <a:xfrm>
+            <a:off x="4674780" y="1161435"/>
+            <a:ext cx="3525786" cy="2820628"/>
+          </a:xfrm>
+          <a:prstGeom prst="rect">
+            <a:avLst/>
+          </a:prstGeom>
+        </p:spPr>
+      </p:pic>
+      <p:sp>
+        <p:nvSpPr>
+          <p:cNvPr id="10" name="TextBox 9">
+            <a:extLst>
+              <a:ext uri="{FF2B5EF4-FFF2-40B4-BE49-F238E27FC236}">
+                <a16:creationId xmlns:a16="http://schemas.microsoft.com/office/drawing/2014/main" id="{D0AECAAB-A001-442A-B9B5-AFB2AB2ED516}"/>
+              </a:ext>
+            </a:extLst>
+          </p:cNvPr>
+          <p:cNvSpPr txBox="1"/>
+          <p:nvPr/>
+        </p:nvSpPr>
+        <p:spPr>
+          <a:xfrm>
+            <a:off x="2320046" y="3982063"/>
+            <a:ext cx="800219" cy="646331"/>
+          </a:xfrm>
+          <a:prstGeom prst="rect">
+            <a:avLst/>
+          </a:prstGeom>
+          <a:noFill/>
+        </p:spPr>
+        <p:txBody>
+          <a:bodyPr wrap="none" rtlCol="0">
+            <a:spAutoFit/>
+          </a:bodyPr>
+          <a:lstStyle/>
+          <a:p>
+            <a:pPr algn="ctr"/>
+            <a:r>
+              <a:rPr lang="en-US" dirty="0">
+                <a:latin typeface="Arial" panose="020B0604020202020204" pitchFamily="34" charset="0"/>
+                <a:cs typeface="Arial" panose="020B0604020202020204" pitchFamily="34" charset="0"/>
+              </a:rPr>
+              <a:t>Set 1</a:t>
+            </a:r>
+          </a:p>
+          <a:p>
+            <a:pPr algn="ctr"/>
+            <a:r>
+              <a:rPr lang="en-US" dirty="0">
+                <a:latin typeface="Arial" panose="020B0604020202020204" pitchFamily="34" charset="0"/>
+                <a:cs typeface="Arial" panose="020B0604020202020204" pitchFamily="34" charset="0"/>
+              </a:rPr>
+              <a:t>Grays</a:t>
+            </a:r>
+          </a:p>
+        </p:txBody>
+      </p:sp>
+      <p:sp>
+        <p:nvSpPr>
+          <p:cNvPr id="11" name="TextBox 10">
+            <a:extLst>
+              <a:ext uri="{FF2B5EF4-FFF2-40B4-BE49-F238E27FC236}">
+                <a16:creationId xmlns:a16="http://schemas.microsoft.com/office/drawing/2014/main" id="{8C4B4ED1-562A-4304-8DC5-A5CB09332C84}"/>
+              </a:ext>
+            </a:extLst>
+          </p:cNvPr>
+          <p:cNvSpPr txBox="1"/>
+          <p:nvPr/>
+        </p:nvSpPr>
+        <p:spPr>
+          <a:xfrm>
+            <a:off x="5819555" y="3979603"/>
+            <a:ext cx="1236237" cy="646331"/>
+          </a:xfrm>
+          <a:prstGeom prst="rect">
+            <a:avLst/>
+          </a:prstGeom>
+          <a:noFill/>
+        </p:spPr>
+        <p:txBody>
+          <a:bodyPr wrap="none" rtlCol="0">
+            <a:spAutoFit/>
+          </a:bodyPr>
+          <a:lstStyle/>
+          <a:p>
+            <a:pPr algn="ctr"/>
+            <a:r>
+              <a:rPr lang="en-US" dirty="0">
+                <a:latin typeface="Arial" panose="020B0604020202020204" pitchFamily="34" charset="0"/>
+                <a:cs typeface="Arial" panose="020B0604020202020204" pitchFamily="34" charset="0"/>
+              </a:rPr>
+              <a:t>Set 2</a:t>
+            </a:r>
+          </a:p>
+          <a:p>
+            <a:pPr algn="ctr"/>
+            <a:r>
+              <a:rPr lang="en-US" dirty="0">
+                <a:latin typeface="Arial" panose="020B0604020202020204" pitchFamily="34" charset="0"/>
+                <a:cs typeface="Arial" panose="020B0604020202020204" pitchFamily="34" charset="0"/>
+              </a:rPr>
+              <a:t>Six Colors</a:t>
+            </a:r>
+          </a:p>
+        </p:txBody>
+      </p:sp>
+    </p:spTree>
+    <p:extLst>
+      <p:ext uri="{BB962C8B-B14F-4D97-AF65-F5344CB8AC3E}">
+        <p14:creationId xmlns:p14="http://schemas.microsoft.com/office/powerpoint/2010/main" val="206603971"/>
+      </p:ext>
+    </p:extLst>
+  </p:cSld>
+  <p:clrMapOvr>
+    <a:masterClrMapping/>
+  </p:clrMapOvr>
+</p:sld>
+</file>
+
+<file path=ppt/slides/slide12.xml><?xml version="1.0" encoding="utf-8"?>
+<p:sld xmlns:a="http://schemas.openxmlformats.org/drawingml/2006/main" xmlns:r="http://schemas.openxmlformats.org/officeDocument/2006/relationships" xmlns:p="http://schemas.openxmlformats.org/presentationml/2006/main">
+  <p:cSld>
+    <p:spTree>
+      <p:nvGrpSpPr>
+        <p:cNvPr id="1" name=""/>
+        <p:cNvGrpSpPr/>
+        <p:nvPr/>
+      </p:nvGrpSpPr>
+      <p:grpSpPr>
+        <a:xfrm>
+          <a:off x="0" y="0"/>
+          <a:ext cx="0" cy="0"/>
+          <a:chOff x="0" y="0"/>
+          <a:chExt cx="0" cy="0"/>
+        </a:xfrm>
+      </p:grpSpPr>
+      <p:sp>
+        <p:nvSpPr>
+          <p:cNvPr id="2" name="Title 1"/>
+          <p:cNvSpPr>
+            <a:spLocks noGrp="1"/>
+          </p:cNvSpPr>
+          <p:nvPr>
+            <p:ph type="title"/>
+          </p:nvPr>
+        </p:nvSpPr>
+        <p:spPr/>
+        <p:txBody>
+          <a:bodyPr/>
+          <a:lstStyle/>
+          <a:p>
+            <a:r>
+              <a:rPr lang="en-US" dirty="0"/>
+              <a:t>Dataset</a:t>
+            </a:r>
+          </a:p>
+        </p:txBody>
+      </p:sp>
+      <p:pic>
+        <p:nvPicPr>
+          <p:cNvPr id="8" name="Picture 7">
+            <a:extLst>
+              <a:ext uri="{FF2B5EF4-FFF2-40B4-BE49-F238E27FC236}">
+                <a16:creationId xmlns:a16="http://schemas.microsoft.com/office/drawing/2014/main" id="{5C36049A-3FE9-4F6C-B03C-265C6F1F3D6D}"/>
+              </a:ext>
+            </a:extLst>
+          </p:cNvPr>
+          <p:cNvPicPr>
+            <a:picLocks noChangeAspect="1"/>
+          </p:cNvPicPr>
+          <p:nvPr/>
+        </p:nvPicPr>
+        <p:blipFill>
+          <a:blip r:embed="rId2"/>
+          <a:stretch>
+            <a:fillRect/>
+          </a:stretch>
+        </p:blipFill>
+        <p:spPr>
+          <a:xfrm>
+            <a:off x="957263" y="1161435"/>
+            <a:ext cx="3525786" cy="2820628"/>
+          </a:xfrm>
+          <a:prstGeom prst="rect">
+            <a:avLst/>
+          </a:prstGeom>
+        </p:spPr>
+      </p:pic>
+      <p:pic>
+        <p:nvPicPr>
+          <p:cNvPr id="9" name="Picture 8">
+            <a:extLst>
+              <a:ext uri="{FF2B5EF4-FFF2-40B4-BE49-F238E27FC236}">
+                <a16:creationId xmlns:a16="http://schemas.microsoft.com/office/drawing/2014/main" id="{A8662521-AFE1-4306-BB08-574222167A44}"/>
+              </a:ext>
+            </a:extLst>
+          </p:cNvPr>
+          <p:cNvPicPr>
+            <a:picLocks noChangeAspect="1"/>
+          </p:cNvPicPr>
+          <p:nvPr/>
+        </p:nvPicPr>
+        <p:blipFill>
+          <a:blip r:embed="rId3"/>
+          <a:stretch>
+            <a:fillRect/>
+          </a:stretch>
+        </p:blipFill>
+        <p:spPr>
+          <a:xfrm>
+            <a:off x="4674780" y="1161435"/>
+            <a:ext cx="3525785" cy="2820628"/>
+          </a:xfrm>
+          <a:prstGeom prst="rect">
+            <a:avLst/>
+          </a:prstGeom>
+        </p:spPr>
+      </p:pic>
+      <p:sp>
+        <p:nvSpPr>
+          <p:cNvPr id="10" name="TextBox 9">
+            <a:extLst>
+              <a:ext uri="{FF2B5EF4-FFF2-40B4-BE49-F238E27FC236}">
+                <a16:creationId xmlns:a16="http://schemas.microsoft.com/office/drawing/2014/main" id="{D0AECAAB-A001-442A-B9B5-AFB2AB2ED516}"/>
+              </a:ext>
+            </a:extLst>
+          </p:cNvPr>
+          <p:cNvSpPr txBox="1"/>
+          <p:nvPr/>
+        </p:nvSpPr>
+        <p:spPr>
+          <a:xfrm>
+            <a:off x="2339282" y="3982063"/>
+            <a:ext cx="761747" cy="646331"/>
+          </a:xfrm>
+          <a:prstGeom prst="rect">
+            <a:avLst/>
+          </a:prstGeom>
+          <a:noFill/>
+        </p:spPr>
+        <p:txBody>
+          <a:bodyPr wrap="none" rtlCol="0">
+            <a:spAutoFit/>
+          </a:bodyPr>
+          <a:lstStyle/>
+          <a:p>
+            <a:pPr algn="ctr"/>
+            <a:r>
+              <a:rPr lang="en-US" dirty="0">
+                <a:latin typeface="Arial" panose="020B0604020202020204" pitchFamily="34" charset="0"/>
+                <a:cs typeface="Arial" panose="020B0604020202020204" pitchFamily="34" charset="0"/>
+              </a:rPr>
+              <a:t>Set 3</a:t>
+            </a:r>
+          </a:p>
+          <a:p>
+            <a:pPr algn="ctr"/>
+            <a:r>
+              <a:rPr lang="en-US" dirty="0">
+                <a:latin typeface="Arial" panose="020B0604020202020204" pitchFamily="34" charset="0"/>
+                <a:cs typeface="Arial" panose="020B0604020202020204" pitchFamily="34" charset="0"/>
+              </a:rPr>
+              <a:t>Blues</a:t>
+            </a:r>
+          </a:p>
+        </p:txBody>
+      </p:sp>
+      <p:sp>
+        <p:nvSpPr>
+          <p:cNvPr id="11" name="TextBox 10">
+            <a:extLst>
+              <a:ext uri="{FF2B5EF4-FFF2-40B4-BE49-F238E27FC236}">
+                <a16:creationId xmlns:a16="http://schemas.microsoft.com/office/drawing/2014/main" id="{8C4B4ED1-562A-4304-8DC5-A5CB09332C84}"/>
+              </a:ext>
+            </a:extLst>
+          </p:cNvPr>
+          <p:cNvSpPr txBox="1"/>
+          <p:nvPr/>
+        </p:nvSpPr>
+        <p:spPr>
+          <a:xfrm>
+            <a:off x="5716966" y="3979603"/>
+            <a:ext cx="1441420" cy="646331"/>
+          </a:xfrm>
+          <a:prstGeom prst="rect">
+            <a:avLst/>
+          </a:prstGeom>
+          <a:noFill/>
+        </p:spPr>
+        <p:txBody>
+          <a:bodyPr wrap="none" rtlCol="0">
+            <a:spAutoFit/>
+          </a:bodyPr>
+          <a:lstStyle/>
+          <a:p>
+            <a:pPr algn="ctr"/>
+            <a:r>
+              <a:rPr lang="en-US" dirty="0">
+                <a:latin typeface="Arial" panose="020B0604020202020204" pitchFamily="34" charset="0"/>
+                <a:cs typeface="Arial" panose="020B0604020202020204" pitchFamily="34" charset="0"/>
+              </a:rPr>
+              <a:t>Set 4</a:t>
+            </a:r>
+          </a:p>
+          <a:p>
+            <a:pPr algn="ctr"/>
+            <a:r>
+              <a:rPr lang="en-US" dirty="0">
+                <a:latin typeface="Arial" panose="020B0604020202020204" pitchFamily="34" charset="0"/>
+                <a:cs typeface="Arial" panose="020B0604020202020204" pitchFamily="34" charset="0"/>
+              </a:rPr>
+              <a:t>Orange/Red</a:t>
+            </a:r>
+          </a:p>
+        </p:txBody>
+      </p:sp>
+    </p:spTree>
+    <p:extLst>
+      <p:ext uri="{BB962C8B-B14F-4D97-AF65-F5344CB8AC3E}">
+        <p14:creationId xmlns:p14="http://schemas.microsoft.com/office/powerpoint/2010/main" val="3643264457"/>
+      </p:ext>
+    </p:extLst>
+  </p:cSld>
+  <p:clrMapOvr>
+    <a:masterClrMapping/>
+  </p:clrMapOvr>
+</p:sld>
+</file>
+
+<file path=ppt/slides/slide13.xml><?xml version="1.0" encoding="utf-8"?>
+<p:sld xmlns:a="http://schemas.openxmlformats.org/drawingml/2006/main" xmlns:r="http://schemas.openxmlformats.org/officeDocument/2006/relationships" xmlns:p="http://schemas.openxmlformats.org/presentationml/2006/main">
+  <p:cSld>
+    <p:spTree>
+      <p:nvGrpSpPr>
+        <p:cNvPr id="1" name=""/>
+        <p:cNvGrpSpPr/>
+        <p:nvPr/>
+      </p:nvGrpSpPr>
+      <p:grpSpPr>
+        <a:xfrm>
+          <a:off x="0" y="0"/>
+          <a:ext cx="0" cy="0"/>
+          <a:chOff x="0" y="0"/>
+          <a:chExt cx="0" cy="0"/>
+        </a:xfrm>
+      </p:grpSpPr>
+      <p:sp>
+        <p:nvSpPr>
+          <p:cNvPr id="2" name="Title 1"/>
+          <p:cNvSpPr>
+            <a:spLocks noGrp="1"/>
+          </p:cNvSpPr>
+          <p:nvPr>
+            <p:ph type="title"/>
+          </p:nvPr>
+        </p:nvSpPr>
+        <p:spPr/>
+        <p:txBody>
+          <a:bodyPr/>
+          <a:lstStyle/>
+          <a:p>
+            <a:r>
+              <a:rPr lang="en-US" dirty="0"/>
+              <a:t>Dataset</a:t>
+            </a:r>
+          </a:p>
+        </p:txBody>
+      </p:sp>
+      <p:pic>
+        <p:nvPicPr>
+          <p:cNvPr id="8" name="Picture 7">
+            <a:extLst>
+              <a:ext uri="{FF2B5EF4-FFF2-40B4-BE49-F238E27FC236}">
+                <a16:creationId xmlns:a16="http://schemas.microsoft.com/office/drawing/2014/main" id="{5C36049A-3FE9-4F6C-B03C-265C6F1F3D6D}"/>
+              </a:ext>
+            </a:extLst>
+          </p:cNvPr>
+          <p:cNvPicPr>
+            <a:picLocks noChangeAspect="1"/>
+          </p:cNvPicPr>
+          <p:nvPr/>
+        </p:nvPicPr>
+        <p:blipFill>
+          <a:blip r:embed="rId2"/>
+          <a:stretch>
+            <a:fillRect/>
+          </a:stretch>
+        </p:blipFill>
+        <p:spPr>
+          <a:xfrm>
+            <a:off x="957263" y="1161435"/>
+            <a:ext cx="3525785" cy="2820628"/>
+          </a:xfrm>
+          <a:prstGeom prst="rect">
+            <a:avLst/>
+          </a:prstGeom>
+        </p:spPr>
+      </p:pic>
+      <p:pic>
+        <p:nvPicPr>
+          <p:cNvPr id="9" name="Picture 8">
+            <a:extLst>
+              <a:ext uri="{FF2B5EF4-FFF2-40B4-BE49-F238E27FC236}">
+                <a16:creationId xmlns:a16="http://schemas.microsoft.com/office/drawing/2014/main" id="{A8662521-AFE1-4306-BB08-574222167A44}"/>
+              </a:ext>
+            </a:extLst>
+          </p:cNvPr>
+          <p:cNvPicPr>
+            <a:picLocks noChangeAspect="1"/>
+          </p:cNvPicPr>
+          <p:nvPr/>
+        </p:nvPicPr>
+        <p:blipFill>
+          <a:blip r:embed="rId3"/>
+          <a:stretch>
+            <a:fillRect/>
+          </a:stretch>
+        </p:blipFill>
+        <p:spPr>
+          <a:xfrm>
+            <a:off x="4674780" y="1161435"/>
+            <a:ext cx="3525785" cy="2820628"/>
+          </a:xfrm>
+          <a:prstGeom prst="rect">
+            <a:avLst/>
+          </a:prstGeom>
+        </p:spPr>
+      </p:pic>
+      <p:sp>
+        <p:nvSpPr>
+          <p:cNvPr id="10" name="TextBox 9">
+            <a:extLst>
+              <a:ext uri="{FF2B5EF4-FFF2-40B4-BE49-F238E27FC236}">
+                <a16:creationId xmlns:a16="http://schemas.microsoft.com/office/drawing/2014/main" id="{D0AECAAB-A001-442A-B9B5-AFB2AB2ED516}"/>
+              </a:ext>
+            </a:extLst>
+          </p:cNvPr>
+          <p:cNvSpPr txBox="1"/>
+          <p:nvPr/>
+        </p:nvSpPr>
+        <p:spPr>
+          <a:xfrm>
+            <a:off x="1531373" y="3982063"/>
+            <a:ext cx="2377575" cy="646331"/>
+          </a:xfrm>
+          <a:prstGeom prst="rect">
+            <a:avLst/>
+          </a:prstGeom>
+          <a:noFill/>
+        </p:spPr>
+        <p:txBody>
+          <a:bodyPr wrap="none" rtlCol="0">
+            <a:spAutoFit/>
+          </a:bodyPr>
+          <a:lstStyle/>
+          <a:p>
+            <a:pPr algn="ctr"/>
+            <a:r>
+              <a:rPr lang="en-US" dirty="0">
+                <a:latin typeface="Arial" panose="020B0604020202020204" pitchFamily="34" charset="0"/>
+                <a:cs typeface="Arial" panose="020B0604020202020204" pitchFamily="34" charset="0"/>
+              </a:rPr>
+              <a:t>Set 5</a:t>
+            </a:r>
+          </a:p>
+          <a:p>
+            <a:pPr algn="ctr"/>
+            <a:r>
+              <a:rPr lang="en-US" dirty="0">
+                <a:latin typeface="Arial" panose="020B0604020202020204" pitchFamily="34" charset="0"/>
+                <a:cs typeface="Arial" panose="020B0604020202020204" pitchFamily="34" charset="0"/>
+              </a:rPr>
+              <a:t>Jeans, Hoodie, Shirts</a:t>
+            </a:r>
+          </a:p>
+        </p:txBody>
+      </p:sp>
+      <p:sp>
+        <p:nvSpPr>
+          <p:cNvPr id="11" name="TextBox 10">
+            <a:extLst>
+              <a:ext uri="{FF2B5EF4-FFF2-40B4-BE49-F238E27FC236}">
+                <a16:creationId xmlns:a16="http://schemas.microsoft.com/office/drawing/2014/main" id="{8C4B4ED1-562A-4304-8DC5-A5CB09332C84}"/>
+              </a:ext>
+            </a:extLst>
+          </p:cNvPr>
+          <p:cNvSpPr txBox="1"/>
+          <p:nvPr/>
+        </p:nvSpPr>
+        <p:spPr>
+          <a:xfrm>
+            <a:off x="5902912" y="3979603"/>
+            <a:ext cx="1069525" cy="646331"/>
+          </a:xfrm>
+          <a:prstGeom prst="rect">
+            <a:avLst/>
+          </a:prstGeom>
+          <a:noFill/>
+        </p:spPr>
+        <p:txBody>
+          <a:bodyPr wrap="none" rtlCol="0">
+            <a:spAutoFit/>
+          </a:bodyPr>
+          <a:lstStyle/>
+          <a:p>
+            <a:pPr algn="ctr"/>
+            <a:r>
+              <a:rPr lang="en-US" dirty="0">
+                <a:latin typeface="Arial" panose="020B0604020202020204" pitchFamily="34" charset="0"/>
+                <a:cs typeface="Arial" panose="020B0604020202020204" pitchFamily="34" charset="0"/>
+              </a:rPr>
+              <a:t>Set 6</a:t>
+            </a:r>
+          </a:p>
+          <a:p>
+            <a:pPr algn="ctr"/>
+            <a:r>
+              <a:rPr lang="en-US" dirty="0">
+                <a:latin typeface="Arial" panose="020B0604020202020204" pitchFamily="34" charset="0"/>
+                <a:cs typeface="Arial" panose="020B0604020202020204" pitchFamily="34" charset="0"/>
+              </a:rPr>
+              <a:t>Oranges</a:t>
+            </a:r>
+          </a:p>
+        </p:txBody>
+      </p:sp>
+    </p:spTree>
+    <p:extLst>
+      <p:ext uri="{BB962C8B-B14F-4D97-AF65-F5344CB8AC3E}">
+        <p14:creationId xmlns:p14="http://schemas.microsoft.com/office/powerpoint/2010/main" val="1677352863"/>
+      </p:ext>
+    </p:extLst>
+  </p:cSld>
+  <p:clrMapOvr>
+    <a:masterClrMapping/>
+  </p:clrMapOvr>
+</p:sld>
+</file>
+
+<file path=ppt/slides/slide14.xml><?xml version="1.0" encoding="utf-8"?>
+<p:sld xmlns:a="http://schemas.openxmlformats.org/drawingml/2006/main" xmlns:r="http://schemas.openxmlformats.org/officeDocument/2006/relationships" xmlns:p="http://schemas.openxmlformats.org/presentationml/2006/main">
+  <p:cSld>
+    <p:spTree>
+      <p:nvGrpSpPr>
+        <p:cNvPr id="1" name=""/>
+        <p:cNvGrpSpPr/>
+        <p:nvPr/>
+      </p:nvGrpSpPr>
+      <p:grpSpPr>
+        <a:xfrm>
+          <a:off x="0" y="0"/>
+          <a:ext cx="0" cy="0"/>
+          <a:chOff x="0" y="0"/>
+          <a:chExt cx="0" cy="0"/>
+        </a:xfrm>
+      </p:grpSpPr>
+      <p:sp>
+        <p:nvSpPr>
+          <p:cNvPr id="2" name="Title 1"/>
+          <p:cNvSpPr>
+            <a:spLocks noGrp="1"/>
+          </p:cNvSpPr>
+          <p:nvPr>
+            <p:ph type="title"/>
+          </p:nvPr>
+        </p:nvSpPr>
+        <p:spPr/>
+        <p:txBody>
+          <a:bodyPr/>
+          <a:lstStyle/>
+          <a:p>
+            <a:r>
+              <a:rPr lang="en-US" dirty="0"/>
+              <a:t>Dataset</a:t>
+            </a:r>
+          </a:p>
+        </p:txBody>
+      </p:sp>
+      <p:pic>
+        <p:nvPicPr>
+          <p:cNvPr id="8" name="Picture 7">
+            <a:extLst>
+              <a:ext uri="{FF2B5EF4-FFF2-40B4-BE49-F238E27FC236}">
+                <a16:creationId xmlns:a16="http://schemas.microsoft.com/office/drawing/2014/main" id="{5C36049A-3FE9-4F6C-B03C-265C6F1F3D6D}"/>
+              </a:ext>
+            </a:extLst>
+          </p:cNvPr>
+          <p:cNvPicPr>
+            <a:picLocks noChangeAspect="1"/>
+          </p:cNvPicPr>
+          <p:nvPr/>
+        </p:nvPicPr>
+        <p:blipFill>
+          <a:blip r:embed="rId2"/>
+          <a:stretch>
+            <a:fillRect/>
+          </a:stretch>
+        </p:blipFill>
+        <p:spPr>
+          <a:xfrm>
+            <a:off x="957263" y="1161435"/>
+            <a:ext cx="3525785" cy="2820628"/>
+          </a:xfrm>
+          <a:prstGeom prst="rect">
+            <a:avLst/>
+          </a:prstGeom>
+        </p:spPr>
+      </p:pic>
+      <p:pic>
+        <p:nvPicPr>
+          <p:cNvPr id="9" name="Picture 8">
+            <a:extLst>
+              <a:ext uri="{FF2B5EF4-FFF2-40B4-BE49-F238E27FC236}">
+                <a16:creationId xmlns:a16="http://schemas.microsoft.com/office/drawing/2014/main" id="{A8662521-AFE1-4306-BB08-574222167A44}"/>
+              </a:ext>
+            </a:extLst>
+          </p:cNvPr>
+          <p:cNvPicPr>
+            <a:picLocks noChangeAspect="1"/>
+          </p:cNvPicPr>
+          <p:nvPr/>
+        </p:nvPicPr>
+        <p:blipFill>
+          <a:blip r:embed="rId3"/>
+          <a:stretch>
+            <a:fillRect/>
+          </a:stretch>
+        </p:blipFill>
+        <p:spPr>
+          <a:xfrm>
+            <a:off x="4674780" y="1161435"/>
+            <a:ext cx="3525785" cy="2820628"/>
+          </a:xfrm>
+          <a:prstGeom prst="rect">
+            <a:avLst/>
+          </a:prstGeom>
+        </p:spPr>
+      </p:pic>
+      <p:sp>
+        <p:nvSpPr>
+          <p:cNvPr id="10" name="TextBox 9">
+            <a:extLst>
+              <a:ext uri="{FF2B5EF4-FFF2-40B4-BE49-F238E27FC236}">
+                <a16:creationId xmlns:a16="http://schemas.microsoft.com/office/drawing/2014/main" id="{D0AECAAB-A001-442A-B9B5-AFB2AB2ED516}"/>
+              </a:ext>
+            </a:extLst>
+          </p:cNvPr>
+          <p:cNvSpPr txBox="1"/>
+          <p:nvPr/>
+        </p:nvSpPr>
+        <p:spPr>
+          <a:xfrm>
+            <a:off x="1589082" y="3982063"/>
+            <a:ext cx="2262159" cy="646331"/>
+          </a:xfrm>
+          <a:prstGeom prst="rect">
+            <a:avLst/>
+          </a:prstGeom>
+          <a:noFill/>
+        </p:spPr>
+        <p:txBody>
+          <a:bodyPr wrap="none" rtlCol="0">
+            <a:spAutoFit/>
+          </a:bodyPr>
+          <a:lstStyle/>
+          <a:p>
+            <a:pPr algn="ctr"/>
+            <a:r>
+              <a:rPr lang="en-US" dirty="0">
+                <a:latin typeface="Arial" panose="020B0604020202020204" pitchFamily="34" charset="0"/>
+                <a:cs typeface="Arial" panose="020B0604020202020204" pitchFamily="34" charset="0"/>
+              </a:rPr>
+              <a:t>Set 7</a:t>
+            </a:r>
+          </a:p>
+          <a:p>
+            <a:pPr algn="ctr"/>
+            <a:r>
+              <a:rPr lang="en-US" dirty="0">
+                <a:latin typeface="Arial" panose="020B0604020202020204" pitchFamily="34" charset="0"/>
+                <a:cs typeface="Arial" panose="020B0604020202020204" pitchFamily="34" charset="0"/>
+              </a:rPr>
+              <a:t>Complex Segments </a:t>
+            </a:r>
+          </a:p>
+        </p:txBody>
+      </p:sp>
+      <p:sp>
+        <p:nvSpPr>
+          <p:cNvPr id="11" name="TextBox 10">
+            <a:extLst>
+              <a:ext uri="{FF2B5EF4-FFF2-40B4-BE49-F238E27FC236}">
+                <a16:creationId xmlns:a16="http://schemas.microsoft.com/office/drawing/2014/main" id="{8C4B4ED1-562A-4304-8DC5-A5CB09332C84}"/>
+              </a:ext>
+            </a:extLst>
+          </p:cNvPr>
+          <p:cNvSpPr txBox="1"/>
+          <p:nvPr/>
+        </p:nvSpPr>
+        <p:spPr>
+          <a:xfrm>
+            <a:off x="5967033" y="3979603"/>
+            <a:ext cx="941284" cy="646331"/>
+          </a:xfrm>
+          <a:prstGeom prst="rect">
+            <a:avLst/>
+          </a:prstGeom>
+          <a:noFill/>
+        </p:spPr>
+        <p:txBody>
+          <a:bodyPr wrap="none" rtlCol="0">
+            <a:spAutoFit/>
+          </a:bodyPr>
+          <a:lstStyle/>
+          <a:p>
+            <a:pPr algn="ctr"/>
+            <a:r>
+              <a:rPr lang="en-US" dirty="0">
+                <a:latin typeface="Arial" panose="020B0604020202020204" pitchFamily="34" charset="0"/>
+                <a:cs typeface="Arial" panose="020B0604020202020204" pitchFamily="34" charset="0"/>
+              </a:rPr>
+              <a:t>Set 8</a:t>
+            </a:r>
+          </a:p>
+          <a:p>
+            <a:pPr algn="ctr"/>
+            <a:r>
+              <a:rPr lang="en-US" dirty="0">
+                <a:latin typeface="Arial" panose="020B0604020202020204" pitchFamily="34" charset="0"/>
+                <a:cs typeface="Arial" panose="020B0604020202020204" pitchFamily="34" charset="0"/>
+              </a:rPr>
+              <a:t>Greens</a:t>
+            </a:r>
+          </a:p>
+        </p:txBody>
+      </p:sp>
+    </p:spTree>
+    <p:extLst>
+      <p:ext uri="{BB962C8B-B14F-4D97-AF65-F5344CB8AC3E}">
+        <p14:creationId xmlns:p14="http://schemas.microsoft.com/office/powerpoint/2010/main" val="559293328"/>
+      </p:ext>
+    </p:extLst>
+  </p:cSld>
+  <p:clrMapOvr>
+    <a:masterClrMapping/>
+  </p:clrMapOvr>
+</p:sld>
+</file>
+
+<file path=ppt/slides/slide15.xml><?xml version="1.0" encoding="utf-8"?>
+<p:sld xmlns:a="http://schemas.openxmlformats.org/drawingml/2006/main" xmlns:r="http://schemas.openxmlformats.org/officeDocument/2006/relationships" xmlns:p="http://schemas.openxmlformats.org/presentationml/2006/main">
+  <p:cSld>
+    <p:spTree>
+      <p:nvGrpSpPr>
+        <p:cNvPr id="1" name=""/>
+        <p:cNvGrpSpPr/>
+        <p:nvPr/>
+      </p:nvGrpSpPr>
+      <p:grpSpPr>
+        <a:xfrm>
+          <a:off x="0" y="0"/>
+          <a:ext cx="0" cy="0"/>
+          <a:chOff x="0" y="0"/>
+          <a:chExt cx="0" cy="0"/>
+        </a:xfrm>
+      </p:grpSpPr>
+      <p:sp>
+        <p:nvSpPr>
+          <p:cNvPr id="2" name="Title 1"/>
+          <p:cNvSpPr>
+            <a:spLocks noGrp="1"/>
+          </p:cNvSpPr>
+          <p:nvPr>
+            <p:ph type="title"/>
+          </p:nvPr>
+        </p:nvSpPr>
+        <p:spPr/>
+        <p:txBody>
+          <a:bodyPr/>
+          <a:lstStyle/>
+          <a:p>
+            <a:r>
+              <a:rPr lang="en-US" dirty="0"/>
+              <a:t>Dataset</a:t>
+            </a:r>
+          </a:p>
+        </p:txBody>
+      </p:sp>
+      <p:pic>
+        <p:nvPicPr>
+          <p:cNvPr id="8" name="Picture 7">
+            <a:extLst>
+              <a:ext uri="{FF2B5EF4-FFF2-40B4-BE49-F238E27FC236}">
+                <a16:creationId xmlns:a16="http://schemas.microsoft.com/office/drawing/2014/main" id="{5C36049A-3FE9-4F6C-B03C-265C6F1F3D6D}"/>
+              </a:ext>
+            </a:extLst>
+          </p:cNvPr>
+          <p:cNvPicPr>
+            <a:picLocks noChangeAspect="1"/>
+          </p:cNvPicPr>
+          <p:nvPr/>
+        </p:nvPicPr>
+        <p:blipFill>
+          <a:blip r:embed="rId2"/>
+          <a:stretch>
+            <a:fillRect/>
+          </a:stretch>
+        </p:blipFill>
+        <p:spPr>
+          <a:xfrm>
+            <a:off x="957263" y="1161435"/>
+            <a:ext cx="3525785" cy="2820628"/>
+          </a:xfrm>
+          <a:prstGeom prst="rect">
+            <a:avLst/>
+          </a:prstGeom>
+        </p:spPr>
+      </p:pic>
+      <p:pic>
+        <p:nvPicPr>
+          <p:cNvPr id="9" name="Picture 8">
+            <a:extLst>
+              <a:ext uri="{FF2B5EF4-FFF2-40B4-BE49-F238E27FC236}">
+                <a16:creationId xmlns:a16="http://schemas.microsoft.com/office/drawing/2014/main" id="{A8662521-AFE1-4306-BB08-574222167A44}"/>
+              </a:ext>
+            </a:extLst>
+          </p:cNvPr>
+          <p:cNvPicPr>
+            <a:picLocks noChangeAspect="1"/>
+          </p:cNvPicPr>
+          <p:nvPr/>
+        </p:nvPicPr>
+        <p:blipFill>
+          <a:blip r:embed="rId3"/>
+          <a:stretch>
+            <a:fillRect/>
+          </a:stretch>
+        </p:blipFill>
+        <p:spPr>
+          <a:xfrm>
+            <a:off x="4674780" y="1161435"/>
+            <a:ext cx="3525785" cy="2820628"/>
+          </a:xfrm>
+          <a:prstGeom prst="rect">
+            <a:avLst/>
+          </a:prstGeom>
+        </p:spPr>
+      </p:pic>
+      <p:sp>
+        <p:nvSpPr>
+          <p:cNvPr id="10" name="TextBox 9">
+            <a:extLst>
+              <a:ext uri="{FF2B5EF4-FFF2-40B4-BE49-F238E27FC236}">
+                <a16:creationId xmlns:a16="http://schemas.microsoft.com/office/drawing/2014/main" id="{D0AECAAB-A001-442A-B9B5-AFB2AB2ED516}"/>
+              </a:ext>
+            </a:extLst>
+          </p:cNvPr>
+          <p:cNvSpPr txBox="1"/>
+          <p:nvPr/>
+        </p:nvSpPr>
+        <p:spPr>
+          <a:xfrm>
+            <a:off x="1230012" y="3982063"/>
+            <a:ext cx="2980304" cy="646331"/>
+          </a:xfrm>
+          <a:prstGeom prst="rect">
+            <a:avLst/>
+          </a:prstGeom>
+          <a:noFill/>
+        </p:spPr>
+        <p:txBody>
+          <a:bodyPr wrap="none" rtlCol="0">
+            <a:spAutoFit/>
+          </a:bodyPr>
+          <a:lstStyle/>
+          <a:p>
+            <a:pPr algn="ctr"/>
+            <a:r>
+              <a:rPr lang="en-US" dirty="0">
+                <a:latin typeface="Arial" panose="020B0604020202020204" pitchFamily="34" charset="0"/>
+                <a:cs typeface="Arial" panose="020B0604020202020204" pitchFamily="34" charset="0"/>
+              </a:rPr>
+              <a:t>Set 9</a:t>
+            </a:r>
+          </a:p>
+          <a:p>
+            <a:pPr algn="ctr"/>
+            <a:r>
+              <a:rPr lang="en-US" dirty="0">
+                <a:latin typeface="Arial" panose="020B0604020202020204" pitchFamily="34" charset="0"/>
+                <a:cs typeface="Arial" panose="020B0604020202020204" pitchFamily="34" charset="0"/>
+              </a:rPr>
+              <a:t>Jeans/Shirt, Macbeth Chart</a:t>
+            </a:r>
+          </a:p>
+        </p:txBody>
+      </p:sp>
+      <p:sp>
+        <p:nvSpPr>
+          <p:cNvPr id="11" name="TextBox 10">
+            <a:extLst>
+              <a:ext uri="{FF2B5EF4-FFF2-40B4-BE49-F238E27FC236}">
+                <a16:creationId xmlns:a16="http://schemas.microsoft.com/office/drawing/2014/main" id="{8C4B4ED1-562A-4304-8DC5-A5CB09332C84}"/>
+              </a:ext>
+            </a:extLst>
+          </p:cNvPr>
+          <p:cNvSpPr txBox="1"/>
+          <p:nvPr/>
+        </p:nvSpPr>
+        <p:spPr>
+          <a:xfrm>
+            <a:off x="5289509" y="3979603"/>
+            <a:ext cx="2296334" cy="646331"/>
+          </a:xfrm>
+          <a:prstGeom prst="rect">
+            <a:avLst/>
+          </a:prstGeom>
+          <a:noFill/>
+        </p:spPr>
+        <p:txBody>
+          <a:bodyPr wrap="none" rtlCol="0">
+            <a:spAutoFit/>
+          </a:bodyPr>
+          <a:lstStyle/>
+          <a:p>
+            <a:pPr algn="ctr"/>
+            <a:r>
+              <a:rPr lang="en-US" dirty="0">
+                <a:latin typeface="Arial" panose="020B0604020202020204" pitchFamily="34" charset="0"/>
+                <a:cs typeface="Arial" panose="020B0604020202020204" pitchFamily="34" charset="0"/>
+              </a:rPr>
+              <a:t>Set 10</a:t>
+            </a:r>
+          </a:p>
+          <a:p>
+            <a:pPr algn="ctr"/>
+            <a:r>
+              <a:rPr lang="en-US" dirty="0">
+                <a:latin typeface="Arial" panose="020B0604020202020204" pitchFamily="34" charset="0"/>
+                <a:cs typeface="Arial" panose="020B0604020202020204" pitchFamily="34" charset="0"/>
+              </a:rPr>
+              <a:t>Lucy, Macbeth Chart</a:t>
+            </a:r>
+          </a:p>
+        </p:txBody>
+      </p:sp>
+    </p:spTree>
+    <p:extLst>
+      <p:ext uri="{BB962C8B-B14F-4D97-AF65-F5344CB8AC3E}">
+        <p14:creationId xmlns:p14="http://schemas.microsoft.com/office/powerpoint/2010/main" val="2803410390"/>
+      </p:ext>
+    </p:extLst>
+  </p:cSld>
+  <p:clrMapOvr>
+    <a:masterClrMapping/>
+  </p:clrMapOvr>
+</p:sld>
+</file>
+
+<file path=ppt/slides/slide16.xml><?xml version="1.0" encoding="utf-8"?>
+<p:sld xmlns:a="http://schemas.openxmlformats.org/drawingml/2006/main" xmlns:r="http://schemas.openxmlformats.org/officeDocument/2006/relationships" xmlns:p="http://schemas.openxmlformats.org/presentationml/2006/main">
+  <p:cSld>
+    <p:spTree>
+      <p:nvGrpSpPr>
+        <p:cNvPr id="1" name=""/>
+        <p:cNvGrpSpPr/>
+        <p:nvPr/>
+      </p:nvGrpSpPr>
+      <p:grpSpPr>
+        <a:xfrm>
+          <a:off x="0" y="0"/>
+          <a:ext cx="0" cy="0"/>
+          <a:chOff x="0" y="0"/>
+          <a:chExt cx="0" cy="0"/>
+        </a:xfrm>
+      </p:grpSpPr>
+      <p:sp>
+        <p:nvSpPr>
+          <p:cNvPr id="2" name="Title 1"/>
+          <p:cNvSpPr>
+            <a:spLocks noGrp="1"/>
+          </p:cNvSpPr>
+          <p:nvPr>
+            <p:ph type="title"/>
+          </p:nvPr>
+        </p:nvSpPr>
+        <p:spPr/>
+        <p:txBody>
+          <a:bodyPr/>
+          <a:lstStyle/>
+          <a:p>
+            <a:r>
+              <a:rPr lang="en-US" dirty="0"/>
+              <a:t>Segmentation Methods</a:t>
+            </a:r>
+          </a:p>
+        </p:txBody>
+      </p:sp>
+      <p:sp>
+        <p:nvSpPr>
+          <p:cNvPr id="3" name="Content Placeholder 2"/>
+          <p:cNvSpPr>
+            <a:spLocks noGrp="1"/>
+          </p:cNvSpPr>
+          <p:nvPr>
+            <p:ph idx="1"/>
+          </p:nvPr>
+        </p:nvSpPr>
+        <p:spPr>
+          <a:xfrm>
+            <a:off x="457200" y="1200151"/>
+            <a:ext cx="8229599" cy="3394472"/>
+          </a:xfrm>
+        </p:spPr>
+        <p:txBody>
+          <a:bodyPr>
+            <a:normAutofit fontScale="92500" lnSpcReduction="20000"/>
+          </a:bodyPr>
+          <a:lstStyle/>
+          <a:p>
+            <a:r>
+              <a:rPr lang="en-US" dirty="0"/>
+              <a:t>Our base implementation planned on using two traditional segmentation methods:</a:t>
+            </a:r>
+          </a:p>
+          <a:p>
+            <a:pPr marL="971550" lvl="1" indent="-514350">
+              <a:buFont typeface="+mj-lt"/>
+              <a:buAutoNum type="arabicPeriod"/>
+            </a:pPr>
+            <a:r>
+              <a:rPr lang="en-US" dirty="0"/>
+              <a:t>K-means</a:t>
+            </a:r>
+          </a:p>
+          <a:p>
+            <a:pPr marL="971550" lvl="1" indent="-514350">
+              <a:buFont typeface="+mj-lt"/>
+              <a:buAutoNum type="arabicPeriod"/>
+            </a:pPr>
+            <a:r>
+              <a:rPr lang="en-US" dirty="0"/>
+              <a:t>Mean Shift</a:t>
+            </a:r>
+          </a:p>
+          <a:p>
+            <a:r>
+              <a:rPr lang="en-US" dirty="0"/>
+              <a:t>If time allows, we will also implement two others methods:</a:t>
+            </a:r>
+          </a:p>
+          <a:p>
+            <a:pPr marL="971550" lvl="1" indent="-514350">
+              <a:buFont typeface="+mj-lt"/>
+              <a:buAutoNum type="arabicPeriod"/>
+            </a:pPr>
+            <a:r>
+              <a:rPr lang="en-US" dirty="0"/>
+              <a:t>Watershed</a:t>
+            </a:r>
+          </a:p>
+          <a:p>
+            <a:pPr marL="971550" lvl="1" indent="-514350">
+              <a:buFont typeface="+mj-lt"/>
+              <a:buAutoNum type="arabicPeriod"/>
+            </a:pPr>
+            <a:r>
+              <a:rPr lang="en-US" dirty="0"/>
+              <a:t>Graph Cuts</a:t>
+            </a:r>
+          </a:p>
+        </p:txBody>
+      </p:sp>
+    </p:spTree>
+    <p:extLst>
+      <p:ext uri="{BB962C8B-B14F-4D97-AF65-F5344CB8AC3E}">
+        <p14:creationId xmlns:p14="http://schemas.microsoft.com/office/powerpoint/2010/main" val="2729149706"/>
+      </p:ext>
+    </p:extLst>
+  </p:cSld>
+  <p:clrMapOvr>
+    <a:masterClrMapping/>
+  </p:clrMapOvr>
+</p:sld>
+</file>
+
+<file path=ppt/slides/slide17.xml><?xml version="1.0" encoding="utf-8"?>
+<p:sld xmlns:a="http://schemas.openxmlformats.org/drawingml/2006/main" xmlns:r="http://schemas.openxmlformats.org/officeDocument/2006/relationships" xmlns:p="http://schemas.openxmlformats.org/presentationml/2006/main">
+  <p:cSld>
+    <p:spTree>
+      <p:nvGrpSpPr>
+        <p:cNvPr id="1" name=""/>
+        <p:cNvGrpSpPr/>
+        <p:nvPr/>
+      </p:nvGrpSpPr>
+      <p:grpSpPr>
+        <a:xfrm>
+          <a:off x="0" y="0"/>
+          <a:ext cx="0" cy="0"/>
+          <a:chOff x="0" y="0"/>
+          <a:chExt cx="0" cy="0"/>
+        </a:xfrm>
+      </p:grpSpPr>
+      <p:sp>
+        <p:nvSpPr>
+          <p:cNvPr id="2" name="Title 1"/>
+          <p:cNvSpPr>
+            <a:spLocks noGrp="1"/>
+          </p:cNvSpPr>
+          <p:nvPr>
+            <p:ph type="title"/>
+          </p:nvPr>
+        </p:nvSpPr>
+        <p:spPr/>
+        <p:txBody>
+          <a:bodyPr/>
+          <a:lstStyle/>
+          <a:p>
+            <a:r>
+              <a:rPr lang="en-US" dirty="0"/>
+              <a:t>Feature Spaces</a:t>
+            </a:r>
+          </a:p>
+        </p:txBody>
+      </p:sp>
+      <p:sp>
+        <p:nvSpPr>
+          <p:cNvPr id="3" name="Content Placeholder 2"/>
+          <p:cNvSpPr>
+            <a:spLocks noGrp="1"/>
+          </p:cNvSpPr>
+          <p:nvPr>
+            <p:ph idx="1"/>
+          </p:nvPr>
+        </p:nvSpPr>
+        <p:spPr>
+          <a:xfrm>
+            <a:off x="457200" y="1200151"/>
+            <a:ext cx="8229599" cy="3394472"/>
+          </a:xfrm>
+        </p:spPr>
+        <p:txBody>
+          <a:bodyPr>
+            <a:normAutofit fontScale="92500" lnSpcReduction="20000"/>
+          </a:bodyPr>
+          <a:lstStyle/>
+          <a:p>
+            <a:r>
+              <a:rPr lang="en-US" dirty="0"/>
+              <a:t>Each segmentation method is tested with the following feature sets for performance comparison:</a:t>
+            </a:r>
+          </a:p>
+          <a:p>
+            <a:pPr marL="971550" lvl="1" indent="-514350">
+              <a:buFont typeface="+mj-lt"/>
+              <a:buAutoNum type="arabicPeriod"/>
+            </a:pPr>
+            <a:r>
+              <a:rPr lang="en-US" dirty="0"/>
+              <a:t>RGB</a:t>
+            </a:r>
+          </a:p>
+          <a:p>
+            <a:pPr marL="971550" lvl="1" indent="-514350">
+              <a:buFont typeface="+mj-lt"/>
+              <a:buAutoNum type="arabicPeriod"/>
+            </a:pPr>
+            <a:r>
+              <a:rPr lang="en-US" dirty="0"/>
+              <a:t>RGB + spatial</a:t>
+            </a:r>
+          </a:p>
+          <a:p>
+            <a:pPr marL="971550" lvl="1" indent="-514350">
+              <a:buFont typeface="+mj-lt"/>
+              <a:buAutoNum type="arabicPeriod"/>
+            </a:pPr>
+            <a:r>
+              <a:rPr lang="en-US" dirty="0"/>
+              <a:t>Full multispectral</a:t>
+            </a:r>
+          </a:p>
+          <a:p>
+            <a:pPr marL="971550" lvl="1" indent="-514350">
+              <a:buFont typeface="+mj-lt"/>
+              <a:buAutoNum type="arabicPeriod"/>
+            </a:pPr>
+            <a:r>
+              <a:rPr lang="en-US" dirty="0"/>
+              <a:t>Full multispectral + spatial</a:t>
+            </a:r>
+          </a:p>
+          <a:p>
+            <a:pPr marL="971550" lvl="1" indent="-514350">
+              <a:buFont typeface="+mj-lt"/>
+              <a:buAutoNum type="arabicPeriod"/>
+            </a:pPr>
+            <a:r>
+              <a:rPr lang="en-US" dirty="0"/>
+              <a:t>PCA reduced multispectral</a:t>
+            </a:r>
+          </a:p>
+        </p:txBody>
+      </p:sp>
+    </p:spTree>
+    <p:extLst>
+      <p:ext uri="{BB962C8B-B14F-4D97-AF65-F5344CB8AC3E}">
+        <p14:creationId xmlns:p14="http://schemas.microsoft.com/office/powerpoint/2010/main" val="2877819361"/>
+      </p:ext>
+    </p:extLst>
+  </p:cSld>
+  <p:clrMapOvr>
+    <a:masterClrMapping/>
+  </p:clrMapOvr>
+</p:sld>
+</file>
+
+<file path=ppt/slides/slide18.xml><?xml version="1.0" encoding="utf-8"?>
+<p:sld xmlns:a="http://schemas.openxmlformats.org/drawingml/2006/main" xmlns:r="http://schemas.openxmlformats.org/officeDocument/2006/relationships" xmlns:p="http://schemas.openxmlformats.org/presentationml/2006/main">
+  <p:cSld>
+    <p:spTree>
+      <p:nvGrpSpPr>
+        <p:cNvPr id="1" name=""/>
+        <p:cNvGrpSpPr/>
+        <p:nvPr/>
+      </p:nvGrpSpPr>
+      <p:grpSpPr>
+        <a:xfrm>
+          <a:off x="0" y="0"/>
+          <a:ext cx="0" cy="0"/>
+          <a:chOff x="0" y="0"/>
+          <a:chExt cx="0" cy="0"/>
+        </a:xfrm>
+      </p:grpSpPr>
+      <p:sp>
+        <p:nvSpPr>
+          <p:cNvPr id="2" name="Title 1"/>
+          <p:cNvSpPr>
+            <a:spLocks noGrp="1"/>
+          </p:cNvSpPr>
+          <p:nvPr>
+            <p:ph type="title"/>
+          </p:nvPr>
+        </p:nvSpPr>
+        <p:spPr/>
+        <p:txBody>
+          <a:bodyPr/>
+          <a:lstStyle/>
+          <a:p>
+            <a:r>
+              <a:rPr lang="en-US" dirty="0"/>
+              <a:t>Processing Pipeline</a:t>
+            </a:r>
+          </a:p>
+        </p:txBody>
+      </p:sp>
+      <p:graphicFrame>
+        <p:nvGraphicFramePr>
+          <p:cNvPr id="5" name="Diagram 4">
+            <a:extLst>
+              <a:ext uri="{FF2B5EF4-FFF2-40B4-BE49-F238E27FC236}">
+                <a16:creationId xmlns:a16="http://schemas.microsoft.com/office/drawing/2014/main" id="{5EC89E4B-418E-44E5-9FA2-DEFAFDBC80B1}"/>
+              </a:ext>
+            </a:extLst>
+          </p:cNvPr>
+          <p:cNvGraphicFramePr/>
+          <p:nvPr>
+            <p:extLst>
+              <p:ext uri="{D42A27DB-BD31-4B8C-83A1-F6EECF244321}">
+                <p14:modId xmlns:p14="http://schemas.microsoft.com/office/powerpoint/2010/main" val="3398595370"/>
+              </p:ext>
+            </p:extLst>
+          </p:nvPr>
+        </p:nvGraphicFramePr>
+        <p:xfrm>
+          <a:off x="706582" y="372864"/>
+          <a:ext cx="7730836" cy="4397771"/>
+        </p:xfrm>
+        <a:graphic>
+          <a:graphicData uri="http://schemas.openxmlformats.org/drawingml/2006/diagram">
+            <dgm:relIds xmlns:dgm="http://schemas.openxmlformats.org/drawingml/2006/diagram" xmlns:r="http://schemas.openxmlformats.org/officeDocument/2006/relationships" r:dm="rId2" r:lo="rId3" r:qs="rId4" r:cs="rId5"/>
+          </a:graphicData>
+        </a:graphic>
+      </p:graphicFrame>
+    </p:spTree>
+    <p:extLst>
+      <p:ext uri="{BB962C8B-B14F-4D97-AF65-F5344CB8AC3E}">
+        <p14:creationId xmlns:p14="http://schemas.microsoft.com/office/powerpoint/2010/main" val="3542805984"/>
+      </p:ext>
+    </p:extLst>
+  </p:cSld>
+  <p:clrMapOvr>
+    <a:masterClrMapping/>
+  </p:clrMapOvr>
+</p:sld>
+</file>
+
+<file path=ppt/slides/slide19.xml><?xml version="1.0" encoding="utf-8"?>
+<p:sld xmlns:a="http://schemas.openxmlformats.org/drawingml/2006/main" xmlns:r="http://schemas.openxmlformats.org/officeDocument/2006/relationships" xmlns:p="http://schemas.openxmlformats.org/presentationml/2006/main">
+  <p:cSld>
+    <p:spTree>
+      <p:nvGrpSpPr>
+        <p:cNvPr id="1" name=""/>
+        <p:cNvGrpSpPr/>
+        <p:nvPr/>
+      </p:nvGrpSpPr>
+      <p:grpSpPr>
+        <a:xfrm>
+          <a:off x="0" y="0"/>
+          <a:ext cx="0" cy="0"/>
+          <a:chOff x="0" y="0"/>
+          <a:chExt cx="0" cy="0"/>
+        </a:xfrm>
+      </p:grpSpPr>
+      <p:sp>
+        <p:nvSpPr>
+          <p:cNvPr id="2" name="Title 1"/>
+          <p:cNvSpPr>
+            <a:spLocks noGrp="1"/>
+          </p:cNvSpPr>
+          <p:nvPr>
+            <p:ph type="title"/>
+          </p:nvPr>
+        </p:nvSpPr>
+        <p:spPr/>
+        <p:txBody>
+          <a:bodyPr/>
+          <a:lstStyle/>
+          <a:p>
+            <a:r>
+              <a:rPr lang="en-US" dirty="0"/>
+              <a:t>Engineering Considerations</a:t>
+            </a:r>
+          </a:p>
+        </p:txBody>
+      </p:sp>
+      <p:sp>
+        <p:nvSpPr>
+          <p:cNvPr id="3" name="Content Placeholder 2"/>
+          <p:cNvSpPr>
+            <a:spLocks noGrp="1"/>
+          </p:cNvSpPr>
+          <p:nvPr>
+            <p:ph idx="1"/>
+          </p:nvPr>
+        </p:nvSpPr>
+        <p:spPr>
+          <a:xfrm>
+            <a:off x="457200" y="1200151"/>
+            <a:ext cx="8229599" cy="3394472"/>
+          </a:xfrm>
+        </p:spPr>
+        <p:txBody>
+          <a:bodyPr>
+            <a:normAutofit lnSpcReduction="10000"/>
+          </a:bodyPr>
+          <a:lstStyle/>
+          <a:p>
+            <a:r>
+              <a:rPr lang="en-US" dirty="0"/>
+              <a:t>The full 32 spectrum images are very large (1280 x 1024 = 1,310,720 pixels with 32 features)</a:t>
+            </a:r>
+          </a:p>
+          <a:p>
+            <a:r>
+              <a:rPr lang="en-US" dirty="0"/>
+              <a:t>Therefore, we wrapped our code in a script so that batch processing code be carried out on higher performance machine</a:t>
+            </a:r>
+          </a:p>
+        </p:txBody>
+      </p:sp>
+    </p:spTree>
+    <p:extLst>
+      <p:ext uri="{BB962C8B-B14F-4D97-AF65-F5344CB8AC3E}">
+        <p14:creationId xmlns:p14="http://schemas.microsoft.com/office/powerpoint/2010/main" val="2985324954"/>
+      </p:ext>
+    </p:extLst>
+  </p:cSld>
+  <p:clrMapOvr>
+    <a:masterClrMapping/>
+  </p:clrMapOvr>
+</p:sld>
+</file>
+
 <file path=ppt/slides/slide2.xml><?xml version="1.0" encoding="utf-8"?>
+<p:sld xmlns:a="http://schemas.openxmlformats.org/drawingml/2006/main" xmlns:r="http://schemas.openxmlformats.org/officeDocument/2006/relationships" xmlns:p="http://schemas.openxmlformats.org/presentationml/2006/main">
+  <p:cSld>
+    <p:spTree>
+      <p:nvGrpSpPr>
+        <p:cNvPr id="1" name=""/>
+        <p:cNvGrpSpPr/>
+        <p:nvPr/>
+      </p:nvGrpSpPr>
+      <p:grpSpPr>
+        <a:xfrm>
+          <a:off x="0" y="0"/>
+          <a:ext cx="0" cy="0"/>
+          <a:chOff x="0" y="0"/>
+          <a:chExt cx="0" cy="0"/>
+        </a:xfrm>
+      </p:grpSpPr>
+      <p:sp>
+        <p:nvSpPr>
+          <p:cNvPr id="2" name="Title 1"/>
+          <p:cNvSpPr>
+            <a:spLocks noGrp="1"/>
+          </p:cNvSpPr>
+          <p:nvPr>
+            <p:ph type="title"/>
+          </p:nvPr>
+        </p:nvSpPr>
+        <p:spPr/>
+        <p:txBody>
+          <a:bodyPr/>
+          <a:lstStyle/>
+          <a:p>
+            <a:r>
+              <a:rPr lang="en-US" dirty="0"/>
+              <a:t>Project Goals</a:t>
+            </a:r>
+          </a:p>
+        </p:txBody>
+      </p:sp>
+      <p:sp>
+        <p:nvSpPr>
+          <p:cNvPr id="3" name="Content Placeholder 2"/>
+          <p:cNvSpPr>
+            <a:spLocks noGrp="1"/>
+          </p:cNvSpPr>
+          <p:nvPr>
+            <p:ph idx="1"/>
+          </p:nvPr>
+        </p:nvSpPr>
+        <p:spPr/>
+        <p:txBody>
+          <a:bodyPr>
+            <a:normAutofit/>
+          </a:bodyPr>
+          <a:lstStyle/>
+          <a:p>
+            <a:pPr marL="514350" indent="-514350">
+              <a:buFont typeface="+mj-lt"/>
+              <a:buAutoNum type="arabicPeriod"/>
+            </a:pPr>
+            <a:r>
+              <a:rPr lang="en-US" dirty="0"/>
+              <a:t>Determine if the multispectral feature space provides greater accuracy than RGB for traditional image segmentation</a:t>
+            </a:r>
+          </a:p>
+          <a:p>
+            <a:pPr marL="514350" indent="-514350">
+              <a:buFont typeface="+mj-lt"/>
+              <a:buAutoNum type="arabicPeriod"/>
+            </a:pPr>
+            <a:r>
+              <a:rPr lang="en-US" dirty="0"/>
+              <a:t>Create a custom, multispectral image dataset composed of different fabrics and colors</a:t>
+            </a:r>
+          </a:p>
+          <a:p>
+            <a:endParaRPr lang="en-US" dirty="0"/>
+          </a:p>
+        </p:txBody>
+      </p:sp>
+    </p:spTree>
+    <p:extLst>
+      <p:ext uri="{BB962C8B-B14F-4D97-AF65-F5344CB8AC3E}">
+        <p14:creationId xmlns:p14="http://schemas.microsoft.com/office/powerpoint/2010/main" val="3327183425"/>
+      </p:ext>
+    </p:extLst>
+  </p:cSld>
+  <p:clrMapOvr>
+    <a:masterClrMapping/>
+  </p:clrMapOvr>
+</p:sld>
+</file>
+
+<file path=ppt/slides/slide20.xml><?xml version="1.0" encoding="utf-8"?>
+<p:sld xmlns:a="http://schemas.openxmlformats.org/drawingml/2006/main" xmlns:r="http://schemas.openxmlformats.org/officeDocument/2006/relationships" xmlns:p="http://schemas.openxmlformats.org/presentationml/2006/main">
+  <p:cSld>
+    <p:spTree>
+      <p:nvGrpSpPr>
+        <p:cNvPr id="1" name=""/>
+        <p:cNvGrpSpPr/>
+        <p:nvPr/>
+      </p:nvGrpSpPr>
+      <p:grpSpPr>
+        <a:xfrm>
+          <a:off x="0" y="0"/>
+          <a:ext cx="0" cy="0"/>
+          <a:chOff x="0" y="0"/>
+          <a:chExt cx="0" cy="0"/>
+        </a:xfrm>
+      </p:grpSpPr>
+      <p:sp>
+        <p:nvSpPr>
+          <p:cNvPr id="2" name="Title 1"/>
+          <p:cNvSpPr>
+            <a:spLocks noGrp="1"/>
+          </p:cNvSpPr>
+          <p:nvPr>
+            <p:ph type="title"/>
+          </p:nvPr>
+        </p:nvSpPr>
+        <p:spPr/>
+        <p:txBody>
+          <a:bodyPr/>
+          <a:lstStyle/>
+          <a:p>
+            <a:r>
+              <a:rPr lang="en-US" dirty="0"/>
+              <a:t>Example Results</a:t>
+            </a:r>
+          </a:p>
+        </p:txBody>
+      </p:sp>
+      <p:pic>
+        <p:nvPicPr>
+          <p:cNvPr id="8" name="Picture 7">
+            <a:extLst>
+              <a:ext uri="{FF2B5EF4-FFF2-40B4-BE49-F238E27FC236}">
+                <a16:creationId xmlns:a16="http://schemas.microsoft.com/office/drawing/2014/main" id="{5C36049A-3FE9-4F6C-B03C-265C6F1F3D6D}"/>
+              </a:ext>
+            </a:extLst>
+          </p:cNvPr>
+          <p:cNvPicPr>
+            <a:picLocks noChangeAspect="1"/>
+          </p:cNvPicPr>
+          <p:nvPr/>
+        </p:nvPicPr>
+        <p:blipFill>
+          <a:blip r:embed="rId2"/>
+          <a:stretch>
+            <a:fillRect/>
+          </a:stretch>
+        </p:blipFill>
+        <p:spPr>
+          <a:xfrm>
+            <a:off x="1273172" y="1161436"/>
+            <a:ext cx="6597655" cy="2820628"/>
+          </a:xfrm>
+          <a:prstGeom prst="rect">
+            <a:avLst/>
+          </a:prstGeom>
+        </p:spPr>
+      </p:pic>
+      <p:sp>
+        <p:nvSpPr>
+          <p:cNvPr id="10" name="TextBox 9">
+            <a:extLst>
+              <a:ext uri="{FF2B5EF4-FFF2-40B4-BE49-F238E27FC236}">
+                <a16:creationId xmlns:a16="http://schemas.microsoft.com/office/drawing/2014/main" id="{D0AECAAB-A001-442A-B9B5-AFB2AB2ED516}"/>
+              </a:ext>
+            </a:extLst>
+          </p:cNvPr>
+          <p:cNvSpPr txBox="1"/>
+          <p:nvPr/>
+        </p:nvSpPr>
+        <p:spPr>
+          <a:xfrm>
+            <a:off x="2831779" y="4058769"/>
+            <a:ext cx="3480440" cy="369332"/>
+          </a:xfrm>
+          <a:prstGeom prst="rect">
+            <a:avLst/>
+          </a:prstGeom>
+          <a:noFill/>
+        </p:spPr>
+        <p:txBody>
+          <a:bodyPr wrap="none" rtlCol="0">
+            <a:spAutoFit/>
+          </a:bodyPr>
+          <a:lstStyle/>
+          <a:p>
+            <a:pPr algn="ctr"/>
+            <a:r>
+              <a:rPr lang="en-US" dirty="0">
+                <a:latin typeface="Arial" panose="020B0604020202020204" pitchFamily="34" charset="0"/>
+                <a:cs typeface="Arial" panose="020B0604020202020204" pitchFamily="34" charset="0"/>
+              </a:rPr>
+              <a:t>Set ? – RGB and K-means RGB</a:t>
+            </a:r>
+          </a:p>
+        </p:txBody>
+      </p:sp>
+    </p:spTree>
+    <p:extLst>
+      <p:ext uri="{BB962C8B-B14F-4D97-AF65-F5344CB8AC3E}">
+        <p14:creationId xmlns:p14="http://schemas.microsoft.com/office/powerpoint/2010/main" val="3502551762"/>
+      </p:ext>
+    </p:extLst>
+  </p:cSld>
+  <p:clrMapOvr>
+    <a:masterClrMapping/>
+  </p:clrMapOvr>
+</p:sld>
+</file>
+
+<file path=ppt/slides/slide21.xml><?xml version="1.0" encoding="utf-8"?>
+<p:sld xmlns:a="http://schemas.openxmlformats.org/drawingml/2006/main" xmlns:r="http://schemas.openxmlformats.org/officeDocument/2006/relationships" xmlns:p="http://schemas.openxmlformats.org/presentationml/2006/main">
+  <p:cSld>
+    <p:spTree>
+      <p:nvGrpSpPr>
+        <p:cNvPr id="1" name=""/>
+        <p:cNvGrpSpPr/>
+        <p:nvPr/>
+      </p:nvGrpSpPr>
+      <p:grpSpPr>
+        <a:xfrm>
+          <a:off x="0" y="0"/>
+          <a:ext cx="0" cy="0"/>
+          <a:chOff x="0" y="0"/>
+          <a:chExt cx="0" cy="0"/>
+        </a:xfrm>
+      </p:grpSpPr>
+      <p:sp>
+        <p:nvSpPr>
+          <p:cNvPr id="2" name="Title 1"/>
+          <p:cNvSpPr>
+            <a:spLocks noGrp="1"/>
+          </p:cNvSpPr>
+          <p:nvPr>
+            <p:ph type="title"/>
+          </p:nvPr>
+        </p:nvSpPr>
+        <p:spPr/>
+        <p:txBody>
+          <a:bodyPr/>
+          <a:lstStyle/>
+          <a:p>
+            <a:r>
+              <a:rPr lang="en-US" dirty="0"/>
+              <a:t>Project Status</a:t>
+            </a:r>
+          </a:p>
+        </p:txBody>
+      </p:sp>
+      <p:sp>
+        <p:nvSpPr>
+          <p:cNvPr id="3" name="Content Placeholder 2"/>
+          <p:cNvSpPr>
+            <a:spLocks noGrp="1"/>
+          </p:cNvSpPr>
+          <p:nvPr>
+            <p:ph idx="1"/>
+          </p:nvPr>
+        </p:nvSpPr>
+        <p:spPr/>
+        <p:txBody>
+          <a:bodyPr>
+            <a:normAutofit fontScale="47500" lnSpcReduction="20000"/>
+          </a:bodyPr>
+          <a:lstStyle/>
+          <a:p>
+            <a:pPr marL="514350" indent="-514350">
+              <a:buFont typeface="+mj-lt"/>
+              <a:buAutoNum type="arabicPeriod"/>
+            </a:pPr>
+            <a:r>
+              <a:rPr lang="en-US" strike="sngStrike" dirty="0"/>
+              <a:t>Build multispectral dataset </a:t>
+            </a:r>
+          </a:p>
+          <a:p>
+            <a:pPr marL="514350" indent="-514350">
+              <a:buFont typeface="+mj-lt"/>
+              <a:buAutoNum type="arabicPeriod"/>
+            </a:pPr>
+            <a:r>
+              <a:rPr lang="en-US" strike="sngStrike" dirty="0"/>
+              <a:t>Ground truth dataset</a:t>
+            </a:r>
+          </a:p>
+          <a:p>
+            <a:pPr marL="514350" indent="-514350">
+              <a:buFont typeface="+mj-lt"/>
+              <a:buAutoNum type="arabicPeriod"/>
+            </a:pPr>
+            <a:r>
+              <a:rPr lang="en-US" strike="sngStrike" dirty="0"/>
+              <a:t>Multispectral to RGB equivalent</a:t>
+            </a:r>
+          </a:p>
+          <a:p>
+            <a:pPr marL="514350" indent="-514350">
+              <a:buFont typeface="+mj-lt"/>
+              <a:buAutoNum type="arabicPeriod"/>
+            </a:pPr>
+            <a:r>
+              <a:rPr lang="en-US" strike="sngStrike" dirty="0"/>
+              <a:t>K-means code</a:t>
+            </a:r>
+          </a:p>
+          <a:p>
+            <a:pPr marL="514350" indent="-514350">
+              <a:buFont typeface="+mj-lt"/>
+              <a:buAutoNum type="arabicPeriod"/>
+            </a:pPr>
+            <a:r>
+              <a:rPr lang="en-US" strike="sngStrike" dirty="0"/>
+              <a:t>Mean Shift code</a:t>
+            </a:r>
+          </a:p>
+          <a:p>
+            <a:pPr marL="514350" indent="-514350">
+              <a:buFont typeface="+mj-lt"/>
+              <a:buAutoNum type="arabicPeriod"/>
+            </a:pPr>
+            <a:r>
+              <a:rPr lang="en-US" strike="sngStrike" dirty="0"/>
+              <a:t>PCA code</a:t>
+            </a:r>
+          </a:p>
+          <a:p>
+            <a:pPr marL="514350" indent="-514350">
+              <a:buFont typeface="+mj-lt"/>
+              <a:buAutoNum type="arabicPeriod"/>
+            </a:pPr>
+            <a:r>
+              <a:rPr lang="en-US" strike="sngStrike" dirty="0"/>
+              <a:t>Pseudo color on labels to RGB equivalent</a:t>
+            </a:r>
+          </a:p>
+          <a:p>
+            <a:pPr marL="514350" indent="-514350">
+              <a:buFont typeface="+mj-lt"/>
+              <a:buAutoNum type="arabicPeriod"/>
+            </a:pPr>
+            <a:r>
+              <a:rPr lang="en-US" dirty="0"/>
+              <a:t>RGB segmentation results (K-mean, Mean Shift)</a:t>
+            </a:r>
+          </a:p>
+          <a:p>
+            <a:pPr marL="514350" indent="-514350">
+              <a:buFont typeface="+mj-lt"/>
+              <a:buAutoNum type="arabicPeriod"/>
+            </a:pPr>
+            <a:r>
+              <a:rPr lang="en-US" dirty="0"/>
+              <a:t>Multispectral results (K-means, Mean Shift)</a:t>
+            </a:r>
+          </a:p>
+          <a:p>
+            <a:pPr marL="514350" indent="-514350">
+              <a:buFont typeface="+mj-lt"/>
+              <a:buAutoNum type="arabicPeriod"/>
+            </a:pPr>
+            <a:r>
+              <a:rPr lang="en-US" dirty="0"/>
+              <a:t>Multispectral + spatial results (K-means, Mean Shift)</a:t>
+            </a:r>
+          </a:p>
+          <a:p>
+            <a:pPr marL="514350" indent="-514350">
+              <a:buFont typeface="+mj-lt"/>
+              <a:buAutoNum type="arabicPeriod"/>
+            </a:pPr>
+            <a:r>
+              <a:rPr lang="en-US" dirty="0"/>
+              <a:t>RGB + spatial results (K-means, Mean Shift)</a:t>
+            </a:r>
+          </a:p>
+          <a:p>
+            <a:pPr marL="514350" indent="-514350">
+              <a:buFont typeface="+mj-lt"/>
+              <a:buAutoNum type="arabicPeriod"/>
+            </a:pPr>
+            <a:r>
+              <a:rPr lang="en-US" dirty="0"/>
+              <a:t>Metrics</a:t>
+            </a:r>
+          </a:p>
+          <a:p>
+            <a:pPr marL="514350" indent="-514350">
+              <a:buFont typeface="+mj-lt"/>
+              <a:buAutoNum type="arabicPeriod"/>
+            </a:pPr>
+            <a:r>
+              <a:rPr lang="en-US" dirty="0"/>
+              <a:t>Stretch goals: Implement Watershed, Cross-cuts, etc. algorithms</a:t>
+            </a:r>
+          </a:p>
+        </p:txBody>
+      </p:sp>
+    </p:spTree>
+    <p:extLst>
+      <p:ext uri="{BB962C8B-B14F-4D97-AF65-F5344CB8AC3E}">
+        <p14:creationId xmlns:p14="http://schemas.microsoft.com/office/powerpoint/2010/main" val="3409320821"/>
+      </p:ext>
+    </p:extLst>
+  </p:cSld>
+  <p:clrMapOvr>
+    <a:masterClrMapping/>
+  </p:clrMapOvr>
+</p:sld>
+</file>
+
+<file path=ppt/slides/slide22.xml><?xml version="1.0" encoding="utf-8"?>
+<p:sld xmlns:a="http://schemas.openxmlformats.org/drawingml/2006/main" xmlns:r="http://schemas.openxmlformats.org/officeDocument/2006/relationships" xmlns:p="http://schemas.openxmlformats.org/presentationml/2006/main">
+  <p:cSld>
+    <p:spTree>
+      <p:nvGrpSpPr>
+        <p:cNvPr id="1" name=""/>
+        <p:cNvGrpSpPr/>
+        <p:nvPr/>
+      </p:nvGrpSpPr>
+      <p:grpSpPr>
+        <a:xfrm>
+          <a:off x="0" y="0"/>
+          <a:ext cx="0" cy="0"/>
+          <a:chOff x="0" y="0"/>
+          <a:chExt cx="0" cy="0"/>
+        </a:xfrm>
+      </p:grpSpPr>
+      <p:sp>
+        <p:nvSpPr>
+          <p:cNvPr id="3" name="Title 2">
+            <a:extLst>
+              <a:ext uri="{FF2B5EF4-FFF2-40B4-BE49-F238E27FC236}">
+                <a16:creationId xmlns:a16="http://schemas.microsoft.com/office/drawing/2014/main" id="{00F7D70A-1DC1-4D9A-AAB1-DEDEB559045A}"/>
+              </a:ext>
+            </a:extLst>
+          </p:cNvPr>
+          <p:cNvSpPr>
+            <a:spLocks noGrp="1"/>
+          </p:cNvSpPr>
+          <p:nvPr>
+            <p:ph type="title"/>
+          </p:nvPr>
+        </p:nvSpPr>
+        <p:spPr/>
+        <p:txBody>
+          <a:bodyPr/>
+          <a:lstStyle/>
+          <a:p>
+            <a:r>
+              <a:rPr lang="en-US" dirty="0"/>
+              <a:t>References</a:t>
+            </a:r>
+          </a:p>
+        </p:txBody>
+      </p:sp>
+      <p:sp>
+        <p:nvSpPr>
+          <p:cNvPr id="4" name="Content Placeholder 3">
+            <a:extLst>
+              <a:ext uri="{FF2B5EF4-FFF2-40B4-BE49-F238E27FC236}">
+                <a16:creationId xmlns:a16="http://schemas.microsoft.com/office/drawing/2014/main" id="{C322C9A1-75B7-4025-9CD6-D3D59DFFEC69}"/>
+              </a:ext>
+            </a:extLst>
+          </p:cNvPr>
+          <p:cNvSpPr>
+            <a:spLocks noGrp="1"/>
+          </p:cNvSpPr>
+          <p:nvPr>
+            <p:ph idx="1"/>
+          </p:nvPr>
+        </p:nvSpPr>
+        <p:spPr/>
+        <p:txBody>
+          <a:bodyPr>
+            <a:normAutofit/>
+          </a:bodyPr>
+          <a:lstStyle/>
+          <a:p>
+            <a:pPr marL="514350" indent="-514350">
+              <a:buFont typeface="+mj-lt"/>
+              <a:buAutoNum type="arabicPeriod"/>
+            </a:pPr>
+            <a:r>
+              <a:rPr lang="en-US" dirty="0"/>
+              <a:t>?</a:t>
+            </a:r>
+          </a:p>
+        </p:txBody>
+      </p:sp>
+    </p:spTree>
+    <p:extLst>
+      <p:ext uri="{BB962C8B-B14F-4D97-AF65-F5344CB8AC3E}">
+        <p14:creationId xmlns:p14="http://schemas.microsoft.com/office/powerpoint/2010/main" val="2260986536"/>
+      </p:ext>
+    </p:extLst>
+  </p:cSld>
+  <p:clrMapOvr>
+    <a:masterClrMapping/>
+  </p:clrMapOvr>
+</p:sld>
+</file>
+
+<file path=ppt/slides/slide23.xml><?xml version="1.0" encoding="utf-8"?>
 <p:sld xmlns:a="http://schemas.openxmlformats.org/drawingml/2006/main" xmlns:r="http://schemas.openxmlformats.org/officeDocument/2006/relationships" xmlns:p="http://schemas.openxmlformats.org/presentationml/2006/main">
   <p:cSld>
     <p:spTree>
@@ -10771,8 +12861,8 @@
         </p:nvSpPr>
         <p:spPr>
           <a:xfrm>
-            <a:off x="125362" y="4477481"/>
-            <a:ext cx="8229600" cy="174292"/>
+            <a:off x="4773562" y="4060721"/>
+            <a:ext cx="2458511" cy="174292"/>
           </a:xfrm>
         </p:spPr>
         <p:txBody>
@@ -11021,15 +13111,7 @@
           <a:p>
             <a:r>
               <a:rPr lang="en-US" dirty="0"/>
-              <a:t>The filters accept common peak wavelengths for R,G and B responses (R=620nm, G</a:t>
-            </a:r>
-            <a:r>
-              <a:rPr lang="en-US"/>
-              <a:t>=550nm, </a:t>
-            </a:r>
-            <a:r>
-              <a:rPr lang="en-US" dirty="0"/>
-              <a:t>B=470nm)</a:t>
+              <a:t>The filters accept common peak wavelengths for R,G and B responses (R=600nm, G=515nm, B=450nm)</a:t>
             </a:r>
           </a:p>
           <a:p>
@@ -11107,47 +13189,20 @@
         </p:nvSpPr>
         <p:spPr>
           <a:xfrm>
-            <a:off x="125362" y="4477481"/>
-            <a:ext cx="8229600" cy="174292"/>
+            <a:off x="457200" y="3925977"/>
+            <a:ext cx="8229600" cy="883338"/>
           </a:xfrm>
         </p:spPr>
         <p:txBody>
           <a:bodyPr>
-            <a:normAutofit fontScale="25000" lnSpcReduction="20000"/>
+            <a:normAutofit fontScale="62500" lnSpcReduction="20000"/>
           </a:bodyPr>
           <a:lstStyle/>
           <a:p>
-            <a:pPr marL="0" indent="0">
-              <a:buNone/>
-            </a:pPr>
-            <a:r>
-              <a:rPr lang="en-US" dirty="0">
-                <a:solidFill>
-                  <a:schemeClr val="tx1"/>
-                </a:solidFill>
-              </a:rPr>
-              <a:t>Source: </a:t>
-            </a:r>
-            <a:r>
-              <a:rPr lang="en-US" dirty="0">
-                <a:solidFill>
-                  <a:schemeClr val="tx1"/>
-                </a:solidFill>
-                <a:hlinkClick r:id="rId2">
-                  <a:extLst>
-                    <a:ext uri="{A12FA001-AC4F-418D-AE19-62706E023703}">
-                      <ahyp:hlinkClr xmlns:ahyp="http://schemas.microsoft.com/office/drawing/2018/hyperlinkcolor" val="tx"/>
-                    </a:ext>
-                  </a:extLst>
-                </a:hlinkClick>
-              </a:rPr>
-              <a:t>https://en.wikipedia.org/wiki/Electromagnetic_spectrum</a:t>
-            </a:r>
-            <a:endParaRPr lang="en-US" dirty="0">
-              <a:solidFill>
-                <a:schemeClr val="tx1"/>
-              </a:solidFill>
-            </a:endParaRPr>
+            <a:r>
+              <a:rPr lang="en-US" dirty="0"/>
+              <a:t>The scene response is captured at several specific wavelengths as opposed to an average response per sensor filter color</a:t>
+            </a:r>
           </a:p>
           <a:p>
             <a:endParaRPr lang="en-US" dirty="0"/>
@@ -11156,10 +13211,10 @@
       </p:sp>
       <p:pic>
         <p:nvPicPr>
-          <p:cNvPr id="7" name="Picture 6">
+          <p:cNvPr id="5" name="Picture 4">
             <a:extLst>
               <a:ext uri="{FF2B5EF4-FFF2-40B4-BE49-F238E27FC236}">
-                <a16:creationId xmlns:a16="http://schemas.microsoft.com/office/drawing/2014/main" id="{BF95880C-C7C8-45E1-BB26-B1676C6AF2F7}"/>
+                <a16:creationId xmlns:a16="http://schemas.microsoft.com/office/drawing/2014/main" id="{C13E6394-7E51-4740-88FD-CE1318E0ED00}"/>
               </a:ext>
             </a:extLst>
           </p:cNvPr>
@@ -11169,25 +13224,208 @@
           <p:nvPr/>
         </p:nvPicPr>
         <p:blipFill>
-          <a:blip r:embed="rId3"/>
+          <a:blip r:embed="rId2"/>
           <a:stretch>
             <a:fillRect/>
           </a:stretch>
         </p:blipFill>
         <p:spPr>
           <a:xfrm>
-            <a:off x="1359076" y="1008423"/>
-            <a:ext cx="5762172" cy="3469058"/>
+            <a:off x="1852318" y="1013060"/>
+            <a:ext cx="5439363" cy="2886941"/>
           </a:xfrm>
           <a:prstGeom prst="rect">
             <a:avLst/>
           </a:prstGeom>
         </p:spPr>
       </p:pic>
+      <p:sp>
+        <p:nvSpPr>
+          <p:cNvPr id="6" name="Content Placeholder 2">
+            <a:extLst>
+              <a:ext uri="{FF2B5EF4-FFF2-40B4-BE49-F238E27FC236}">
+                <a16:creationId xmlns:a16="http://schemas.microsoft.com/office/drawing/2014/main" id="{1CFE77C2-8B7C-4B2F-BA12-871EB32F4F8A}"/>
+              </a:ext>
+            </a:extLst>
+          </p:cNvPr>
+          <p:cNvSpPr txBox="1">
+            <a:spLocks/>
+          </p:cNvSpPr>
+          <p:nvPr/>
+        </p:nvSpPr>
+        <p:spPr>
+          <a:xfrm>
+            <a:off x="7038781" y="3738697"/>
+            <a:ext cx="2458511" cy="174292"/>
+          </a:xfrm>
+          <a:prstGeom prst="rect">
+            <a:avLst/>
+          </a:prstGeom>
+        </p:spPr>
+        <p:txBody>
+          <a:bodyPr vert="horz" lIns="91440" tIns="45720" rIns="91440" bIns="45720" rtlCol="0">
+            <a:normAutofit fontScale="25000" lnSpcReduction="20000"/>
+          </a:bodyPr>
+          <a:lstStyle>
+            <a:lvl1pPr marL="342900" indent="-342900" algn="l" defTabSz="457200" rtl="0" eaLnBrk="1" latinLnBrk="0" hangingPunct="1">
+              <a:spcBef>
+                <a:spcPct val="20000"/>
+              </a:spcBef>
+              <a:buFont typeface="Arial"/>
+              <a:buChar char="•"/>
+              <a:defRPr sz="3200" kern="1200">
+                <a:solidFill>
+                  <a:srgbClr val="3B3C3E"/>
+                </a:solidFill>
+                <a:latin typeface="Arial"/>
+                <a:ea typeface="+mn-ea"/>
+                <a:cs typeface="Arial"/>
+              </a:defRPr>
+            </a:lvl1pPr>
+            <a:lvl2pPr marL="742950" indent="-285750" algn="l" defTabSz="457200" rtl="0" eaLnBrk="1" latinLnBrk="0" hangingPunct="1">
+              <a:spcBef>
+                <a:spcPct val="20000"/>
+              </a:spcBef>
+              <a:buFont typeface="Arial"/>
+              <a:buChar char="•"/>
+              <a:defRPr sz="2800" kern="1200">
+                <a:solidFill>
+                  <a:srgbClr val="3B3C3E"/>
+                </a:solidFill>
+                <a:latin typeface="Arial"/>
+                <a:ea typeface="+mn-ea"/>
+                <a:cs typeface="Arial"/>
+              </a:defRPr>
+            </a:lvl2pPr>
+            <a:lvl3pPr marL="1143000" indent="-228600" algn="l" defTabSz="457200" rtl="0" eaLnBrk="1" latinLnBrk="0" hangingPunct="1">
+              <a:spcBef>
+                <a:spcPct val="20000"/>
+              </a:spcBef>
+              <a:buFont typeface="Arial"/>
+              <a:buChar char="•"/>
+              <a:defRPr sz="2400" kern="1200">
+                <a:solidFill>
+                  <a:srgbClr val="3B3C3E"/>
+                </a:solidFill>
+                <a:latin typeface="Arial"/>
+                <a:ea typeface="+mn-ea"/>
+                <a:cs typeface="Arial"/>
+              </a:defRPr>
+            </a:lvl3pPr>
+            <a:lvl4pPr marL="1600200" indent="-228600" algn="l" defTabSz="457200" rtl="0" eaLnBrk="1" latinLnBrk="0" hangingPunct="1">
+              <a:spcBef>
+                <a:spcPct val="20000"/>
+              </a:spcBef>
+              <a:buFont typeface="Arial"/>
+              <a:buChar char="•"/>
+              <a:defRPr sz="2000" kern="1200">
+                <a:solidFill>
+                  <a:srgbClr val="3B3C3E"/>
+                </a:solidFill>
+                <a:latin typeface="Arial"/>
+                <a:ea typeface="+mn-ea"/>
+                <a:cs typeface="Arial"/>
+              </a:defRPr>
+            </a:lvl4pPr>
+            <a:lvl5pPr marL="2057400" indent="-228600" algn="l" defTabSz="457200" rtl="0" eaLnBrk="1" latinLnBrk="0" hangingPunct="1">
+              <a:spcBef>
+                <a:spcPct val="20000"/>
+              </a:spcBef>
+              <a:buFont typeface="Arial"/>
+              <a:buChar char="•"/>
+              <a:defRPr sz="2000" kern="1200">
+                <a:solidFill>
+                  <a:srgbClr val="3B3C3E"/>
+                </a:solidFill>
+                <a:latin typeface="Arial"/>
+                <a:ea typeface="+mn-ea"/>
+                <a:cs typeface="Arial"/>
+              </a:defRPr>
+            </a:lvl5pPr>
+            <a:lvl6pPr marL="2514600" indent="-228600" algn="l" defTabSz="457200" rtl="0" eaLnBrk="1" latinLnBrk="0" hangingPunct="1">
+              <a:spcBef>
+                <a:spcPct val="20000"/>
+              </a:spcBef>
+              <a:buFont typeface="Arial"/>
+              <a:buChar char="•"/>
+              <a:defRPr sz="2000" kern="1200">
+                <a:solidFill>
+                  <a:schemeClr val="tx1"/>
+                </a:solidFill>
+                <a:latin typeface="+mn-lt"/>
+                <a:ea typeface="+mn-ea"/>
+                <a:cs typeface="+mn-cs"/>
+              </a:defRPr>
+            </a:lvl6pPr>
+            <a:lvl7pPr marL="2971800" indent="-228600" algn="l" defTabSz="457200" rtl="0" eaLnBrk="1" latinLnBrk="0" hangingPunct="1">
+              <a:spcBef>
+                <a:spcPct val="20000"/>
+              </a:spcBef>
+              <a:buFont typeface="Arial"/>
+              <a:buChar char="•"/>
+              <a:defRPr sz="2000" kern="1200">
+                <a:solidFill>
+                  <a:schemeClr val="tx1"/>
+                </a:solidFill>
+                <a:latin typeface="+mn-lt"/>
+                <a:ea typeface="+mn-ea"/>
+                <a:cs typeface="+mn-cs"/>
+              </a:defRPr>
+            </a:lvl7pPr>
+            <a:lvl8pPr marL="3429000" indent="-228600" algn="l" defTabSz="457200" rtl="0" eaLnBrk="1" latinLnBrk="0" hangingPunct="1">
+              <a:spcBef>
+                <a:spcPct val="20000"/>
+              </a:spcBef>
+              <a:buFont typeface="Arial"/>
+              <a:buChar char="•"/>
+              <a:defRPr sz="2000" kern="1200">
+                <a:solidFill>
+                  <a:schemeClr val="tx1"/>
+                </a:solidFill>
+                <a:latin typeface="+mn-lt"/>
+                <a:ea typeface="+mn-ea"/>
+                <a:cs typeface="+mn-cs"/>
+              </a:defRPr>
+            </a:lvl8pPr>
+            <a:lvl9pPr marL="3886200" indent="-228600" algn="l" defTabSz="457200" rtl="0" eaLnBrk="1" latinLnBrk="0" hangingPunct="1">
+              <a:spcBef>
+                <a:spcPct val="20000"/>
+              </a:spcBef>
+              <a:buFont typeface="Arial"/>
+              <a:buChar char="•"/>
+              <a:defRPr sz="2000" kern="1200">
+                <a:solidFill>
+                  <a:schemeClr val="tx1"/>
+                </a:solidFill>
+                <a:latin typeface="+mn-lt"/>
+                <a:ea typeface="+mn-ea"/>
+                <a:cs typeface="+mn-cs"/>
+              </a:defRPr>
+            </a:lvl9pPr>
+          </a:lstStyle>
+          <a:p>
+            <a:pPr marL="0" indent="0">
+              <a:buNone/>
+            </a:pPr>
+            <a:r>
+              <a:rPr lang="en-US" dirty="0">
+                <a:solidFill>
+                  <a:schemeClr val="tx1"/>
+                </a:solidFill>
+              </a:rPr>
+              <a:t>Source: </a:t>
+            </a:r>
+            <a:r>
+              <a:rPr lang="en-US" dirty="0"/>
+              <a:t>http://media.factmyth.com/2016/07/</a:t>
+            </a:r>
+          </a:p>
+        </p:txBody>
+      </p:sp>
     </p:spTree>
     <p:extLst>
       <p:ext uri="{BB962C8B-B14F-4D97-AF65-F5344CB8AC3E}">
-        <p14:creationId xmlns:p14="http://schemas.microsoft.com/office/powerpoint/2010/main" val="2499689886"/>
+        <p14:creationId xmlns:p14="http://schemas.microsoft.com/office/powerpoint/2010/main" val="2909358238"/>
       </p:ext>
     </p:extLst>
   </p:cSld>
@@ -11231,7 +13469,7 @@
           <a:p>
             <a:r>
               <a:rPr lang="en-US" dirty="0"/>
-              <a:t>Multispectral Imaging</a:t>
+              <a:t>Multispectral Uses</a:t>
             </a:r>
           </a:p>
         </p:txBody>
@@ -11248,31 +13486,24 @@
         </p:nvSpPr>
         <p:spPr/>
         <p:txBody>
-          <a:bodyPr/>
+          <a:bodyPr>
+            <a:normAutofit fontScale="92500" lnSpcReduction="20000"/>
+          </a:bodyPr>
           <a:lstStyle/>
           <a:p>
             <a:r>
               <a:rPr lang="en-US" dirty="0"/>
-              <a:t>EM spectrum image</a:t>
+              <a:t>Traditionally, multispectral imaging is used for satellite imaging, military applications, astronomical imaging and chemical imaging (due to cost limitations)</a:t>
             </a:r>
           </a:p>
           <a:p>
             <a:r>
               <a:rPr lang="en-US" dirty="0"/>
-              <a:t>Visible spectrum image</a:t>
-            </a:r>
-          </a:p>
-          <a:p>
-            <a:r>
-              <a:rPr lang="en-US" dirty="0"/>
-              <a:t>Typical sampling range for RGB sensors</a:t>
-            </a:r>
-          </a:p>
-          <a:p>
-            <a:r>
-              <a:rPr lang="en-US" dirty="0"/>
-              <a:t>Uses</a:t>
-            </a:r>
+              <a:t>Current applications include drones with specific multispectral filters for farming applications and multispectral facial recognition</a:t>
+            </a:r>
+          </a:p>
+          <a:p>
+            <a:endParaRPr lang="en-US" dirty="0"/>
           </a:p>
           <a:p>
             <a:endParaRPr lang="en-US" dirty="0"/>
@@ -11282,7 +13513,7 @@
     </p:spTree>
     <p:extLst>
       <p:ext uri="{BB962C8B-B14F-4D97-AF65-F5344CB8AC3E}">
-        <p14:creationId xmlns:p14="http://schemas.microsoft.com/office/powerpoint/2010/main" val="2909358238"/>
+        <p14:creationId xmlns:p14="http://schemas.microsoft.com/office/powerpoint/2010/main" val="4280662979"/>
       </p:ext>
     </p:extLst>
   </p:cSld>
@@ -11326,43 +13557,49 @@
           <a:p>
             <a:r>
               <a:rPr lang="en-US" dirty="0"/>
-              <a:t>Processing Pipeline</a:t>
-            </a:r>
-          </a:p>
-        </p:txBody>
-      </p:sp>
-      <p:graphicFrame>
-        <p:nvGraphicFramePr>
-          <p:cNvPr id="5" name="Diagram 4">
-            <a:extLst>
-              <a:ext uri="{FF2B5EF4-FFF2-40B4-BE49-F238E27FC236}">
-                <a16:creationId xmlns:a16="http://schemas.microsoft.com/office/drawing/2014/main" id="{5EC89E4B-418E-44E5-9FA2-DEFAFDBC80B1}"/>
-              </a:ext>
-            </a:extLst>
-          </p:cNvPr>
-          <p:cNvGraphicFramePr/>
+              <a:t>Multispectral Camera</a:t>
+            </a:r>
+          </a:p>
+        </p:txBody>
+      </p:sp>
+      <p:sp>
+        <p:nvSpPr>
+          <p:cNvPr id="3" name="Content Placeholder 2"/>
+          <p:cNvSpPr>
+            <a:spLocks noGrp="1"/>
+          </p:cNvSpPr>
           <p:nvPr>
-            <p:extLst>
-              <p:ext uri="{D42A27DB-BD31-4B8C-83A1-F6EECF244321}">
-                <p14:modId xmlns:p14="http://schemas.microsoft.com/office/powerpoint/2010/main" val="3398595370"/>
-              </p:ext>
-            </p:extLst>
+            <p:ph idx="1"/>
           </p:nvPr>
-        </p:nvGraphicFramePr>
-        <p:xfrm>
-          <a:off x="706582" y="372864"/>
-          <a:ext cx="7730836" cy="4397771"/>
-        </p:xfrm>
-        <a:graphic>
-          <a:graphicData uri="http://schemas.openxmlformats.org/drawingml/2006/diagram">
-            <dgm:relIds xmlns:dgm="http://schemas.openxmlformats.org/drawingml/2006/diagram" xmlns:r="http://schemas.openxmlformats.org/officeDocument/2006/relationships" r:dm="rId2" r:lo="rId3" r:qs="rId4" r:cs="rId5"/>
-          </a:graphicData>
-        </a:graphic>
-      </p:graphicFrame>
+        </p:nvSpPr>
+        <p:spPr/>
+        <p:txBody>
+          <a:bodyPr/>
+          <a:lstStyle/>
+          <a:p>
+            <a:r>
+              <a:rPr lang="en-US" dirty="0"/>
+              <a:t>The camera we used can capture responses 400nm to 720nm at 1nm steps (321 responses)</a:t>
+            </a:r>
+          </a:p>
+          <a:p>
+            <a:r>
+              <a:rPr lang="en-US" dirty="0"/>
+              <a:t>For our dataset, we used responses with 10nm steps producing images with 32 spectral features</a:t>
+            </a:r>
+          </a:p>
+          <a:p>
+            <a:endParaRPr lang="en-US" dirty="0"/>
+          </a:p>
+          <a:p>
+            <a:endParaRPr lang="en-US" dirty="0"/>
+          </a:p>
+        </p:txBody>
+      </p:sp>
     </p:spTree>
     <p:extLst>
       <p:ext uri="{BB962C8B-B14F-4D97-AF65-F5344CB8AC3E}">
-        <p14:creationId xmlns:p14="http://schemas.microsoft.com/office/powerpoint/2010/main" val="3542805984"/>
+        <p14:creationId xmlns:p14="http://schemas.microsoft.com/office/powerpoint/2010/main" val="563471211"/>
       </p:ext>
     </p:extLst>
   </p:cSld>
@@ -11406,7 +13643,7 @@
           <a:p>
             <a:r>
               <a:rPr lang="en-US" dirty="0"/>
-              <a:t>Multispectral Segmentation</a:t>
+              <a:t>Multispectral Camera</a:t>
             </a:r>
           </a:p>
         </p:txBody>
@@ -11428,15 +13665,27 @@
           <a:p>
             <a:r>
               <a:rPr lang="en-US" dirty="0"/>
-              <a:t>Heavily used in satellite imaging</a:t>
-            </a:r>
+              <a:t>The camera we used can capture responses 400nm to 720nm at 1nm steps (321 responses)</a:t>
+            </a:r>
+          </a:p>
+          <a:p>
+            <a:r>
+              <a:rPr lang="en-US" dirty="0"/>
+              <a:t>For our dataset, we used responses with 10nm steps producing images with 32 spectral features</a:t>
+            </a:r>
+          </a:p>
+          <a:p>
+            <a:endParaRPr lang="en-US" dirty="0"/>
+          </a:p>
+          <a:p>
+            <a:endParaRPr lang="en-US" dirty="0"/>
           </a:p>
         </p:txBody>
       </p:sp>
     </p:spTree>
     <p:extLst>
       <p:ext uri="{BB962C8B-B14F-4D97-AF65-F5344CB8AC3E}">
-        <p14:creationId xmlns:p14="http://schemas.microsoft.com/office/powerpoint/2010/main" val="2317852217"/>
+        <p14:creationId xmlns:p14="http://schemas.microsoft.com/office/powerpoint/2010/main" val="1149575059"/>
       </p:ext>
     </p:extLst>
   </p:cSld>
@@ -11465,13 +13714,7 @@
       </p:grpSpPr>
       <p:sp>
         <p:nvSpPr>
-          <p:cNvPr id="3" name="Title 2">
-            <a:extLst>
-              <a:ext uri="{FF2B5EF4-FFF2-40B4-BE49-F238E27FC236}">
-                <a16:creationId xmlns:a16="http://schemas.microsoft.com/office/drawing/2014/main" id="{00F7D70A-1DC1-4D9A-AAB1-DEDEB559045A}"/>
-              </a:ext>
-            </a:extLst>
-          </p:cNvPr>
+          <p:cNvPr id="2" name="Title 1"/>
           <p:cNvSpPr>
             <a:spLocks noGrp="1"/>
           </p:cNvSpPr>
@@ -11486,20 +13729,96 @@
           <a:p>
             <a:r>
               <a:rPr lang="en-US" dirty="0"/>
-              <a:t>References</a:t>
-            </a:r>
-          </a:p>
-        </p:txBody>
-      </p:sp>
-      <p:sp>
-        <p:nvSpPr>
-          <p:cNvPr id="4" name="Content Placeholder 3">
+              <a:t>Multispectral Camera</a:t>
+            </a:r>
+          </a:p>
+        </p:txBody>
+      </p:sp>
+      <p:pic>
+        <p:nvPicPr>
+          <p:cNvPr id="6" name="Picture 5">
             <a:extLst>
               <a:ext uri="{FF2B5EF4-FFF2-40B4-BE49-F238E27FC236}">
-                <a16:creationId xmlns:a16="http://schemas.microsoft.com/office/drawing/2014/main" id="{C322C9A1-75B7-4025-9CD6-D3D59DFFEC69}"/>
+                <a16:creationId xmlns:a16="http://schemas.microsoft.com/office/drawing/2014/main" id="{3D1A4FFC-0016-46DF-80DF-520C23C3ED9E}"/>
               </a:ext>
             </a:extLst>
           </p:cNvPr>
+          <p:cNvPicPr>
+            <a:picLocks noChangeAspect="1"/>
+          </p:cNvPicPr>
+          <p:nvPr/>
+        </p:nvPicPr>
+        <p:blipFill>
+          <a:blip r:embed="rId2"/>
+          <a:stretch>
+            <a:fillRect/>
+          </a:stretch>
+        </p:blipFill>
+        <p:spPr>
+          <a:xfrm>
+            <a:off x="1998932" y="1010266"/>
+            <a:ext cx="5146136" cy="3546986"/>
+          </a:xfrm>
+          <a:prstGeom prst="rect">
+            <a:avLst/>
+          </a:prstGeom>
+        </p:spPr>
+      </p:pic>
+    </p:spTree>
+    <p:extLst>
+      <p:ext uri="{BB962C8B-B14F-4D97-AF65-F5344CB8AC3E}">
+        <p14:creationId xmlns:p14="http://schemas.microsoft.com/office/powerpoint/2010/main" val="3804807291"/>
+      </p:ext>
+    </p:extLst>
+  </p:cSld>
+  <p:clrMapOvr>
+    <a:masterClrMapping/>
+  </p:clrMapOvr>
+</p:sld>
+</file>
+
+<file path=ppt/slides/slide9.xml><?xml version="1.0" encoding="utf-8"?>
+<p:sld xmlns:a="http://schemas.openxmlformats.org/drawingml/2006/main" xmlns:r="http://schemas.openxmlformats.org/officeDocument/2006/relationships" xmlns:p="http://schemas.openxmlformats.org/presentationml/2006/main">
+  <p:cSld>
+    <p:spTree>
+      <p:nvGrpSpPr>
+        <p:cNvPr id="1" name=""/>
+        <p:cNvGrpSpPr/>
+        <p:nvPr/>
+      </p:nvGrpSpPr>
+      <p:grpSpPr>
+        <a:xfrm>
+          <a:off x="0" y="0"/>
+          <a:ext cx="0" cy="0"/>
+          <a:chOff x="0" y="0"/>
+          <a:chExt cx="0" cy="0"/>
+        </a:xfrm>
+      </p:grpSpPr>
+      <p:sp>
+        <p:nvSpPr>
+          <p:cNvPr id="2" name="Title 1"/>
+          <p:cNvSpPr>
+            <a:spLocks noGrp="1"/>
+          </p:cNvSpPr>
+          <p:nvPr>
+            <p:ph type="title"/>
+          </p:nvPr>
+        </p:nvSpPr>
+        <p:spPr/>
+        <p:txBody>
+          <a:bodyPr/>
+          <a:lstStyle/>
+          <a:p>
+            <a:r>
+              <a:rPr lang="en-US" dirty="0"/>
+              <a:t>Macbeth Chart Responses</a:t>
+            </a:r>
+          </a:p>
+        </p:txBody>
+      </p:sp>
+      <p:sp>
+        <p:nvSpPr>
+          <p:cNvPr id="3" name="Content Placeholder 2"/>
           <p:cNvSpPr>
             <a:spLocks noGrp="1"/>
           </p:cNvSpPr>
@@ -11514,21 +13833,20 @@
           </a:bodyPr>
           <a:lstStyle/>
           <a:p>
-            <a:pPr marL="514350" indent="-514350">
-              <a:buFont typeface="+mj-lt"/>
-              <a:buAutoNum type="arabicPeriod"/>
-            </a:pPr>
             <a:r>
               <a:rPr lang="en-US" dirty="0"/>
-              <a:t>?</a:t>
-            </a:r>
+              <a:t>Derp</a:t>
+            </a:r>
+          </a:p>
+          <a:p>
+            <a:endParaRPr lang="en-US" dirty="0"/>
           </a:p>
         </p:txBody>
       </p:sp>
     </p:spTree>
     <p:extLst>
       <p:ext uri="{BB962C8B-B14F-4D97-AF65-F5344CB8AC3E}">
-        <p14:creationId xmlns:p14="http://schemas.microsoft.com/office/powerpoint/2010/main" val="2260986536"/>
+        <p14:creationId xmlns:p14="http://schemas.microsoft.com/office/powerpoint/2010/main" val="1667883247"/>
       </p:ext>
     </p:extLst>
   </p:cSld>

</xml_diff>